<commit_message>
Add Info for compileParams function in report
</commit_message>
<xml_diff>
--- a/BaoCao/Nhom3.pptx
+++ b/BaoCao/Nhom3.pptx
@@ -23,9 +23,11 @@
     <p:sldId id="282" r:id="rId17"/>
     <p:sldId id="283" r:id="rId18"/>
     <p:sldId id="284" r:id="rId19"/>
-    <p:sldId id="285" r:id="rId20"/>
-    <p:sldId id="286" r:id="rId21"/>
-    <p:sldId id="258" r:id="rId22"/>
+    <p:sldId id="292" r:id="rId20"/>
+    <p:sldId id="290" r:id="rId21"/>
+    <p:sldId id="286" r:id="rId22"/>
+    <p:sldId id="291" r:id="rId23"/>
+    <p:sldId id="258" r:id="rId24"/>
   </p:sldIdLst>
   <p:sldSz cx="9144000" cy="6858000" type="screen4x3"/>
   <p:notesSz cx="6858000" cy="9144000"/>
@@ -315,7 +317,7 @@
           <a:p>
             <a:fld id="{A0EC2761-52B0-42C5-B01B-DF8F69615AE5}" type="datetimeFigureOut">
               <a:rPr lang="en-US" smtClean="0"/>
-              <a:t>4/21/2019</a:t>
+              <a:t>4/22/2019</a:t>
             </a:fld>
             <a:endParaRPr lang="en-US"/>
           </a:p>
@@ -483,7 +485,7 @@
           <a:p>
             <a:fld id="{A0EC2761-52B0-42C5-B01B-DF8F69615AE5}" type="datetimeFigureOut">
               <a:rPr lang="en-US" smtClean="0"/>
-              <a:t>4/21/2019</a:t>
+              <a:t>4/22/2019</a:t>
             </a:fld>
             <a:endParaRPr lang="en-US"/>
           </a:p>
@@ -661,7 +663,7 @@
           <a:p>
             <a:fld id="{A0EC2761-52B0-42C5-B01B-DF8F69615AE5}" type="datetimeFigureOut">
               <a:rPr lang="en-US" smtClean="0"/>
-              <a:t>4/21/2019</a:t>
+              <a:t>4/22/2019</a:t>
             </a:fld>
             <a:endParaRPr lang="en-US"/>
           </a:p>
@@ -829,7 +831,7 @@
           <a:p>
             <a:fld id="{A0EC2761-52B0-42C5-B01B-DF8F69615AE5}" type="datetimeFigureOut">
               <a:rPr lang="en-US" smtClean="0"/>
-              <a:t>4/21/2019</a:t>
+              <a:t>4/22/2019</a:t>
             </a:fld>
             <a:endParaRPr lang="en-US"/>
           </a:p>
@@ -1074,7 +1076,7 @@
           <a:p>
             <a:fld id="{A0EC2761-52B0-42C5-B01B-DF8F69615AE5}" type="datetimeFigureOut">
               <a:rPr lang="en-US" smtClean="0"/>
-              <a:t>4/21/2019</a:t>
+              <a:t>4/22/2019</a:t>
             </a:fld>
             <a:endParaRPr lang="en-US"/>
           </a:p>
@@ -1303,7 +1305,7 @@
           <a:p>
             <a:fld id="{A0EC2761-52B0-42C5-B01B-DF8F69615AE5}" type="datetimeFigureOut">
               <a:rPr lang="en-US" smtClean="0"/>
-              <a:t>4/21/2019</a:t>
+              <a:t>4/22/2019</a:t>
             </a:fld>
             <a:endParaRPr lang="en-US"/>
           </a:p>
@@ -1667,7 +1669,7 @@
           <a:p>
             <a:fld id="{A0EC2761-52B0-42C5-B01B-DF8F69615AE5}" type="datetimeFigureOut">
               <a:rPr lang="en-US" smtClean="0"/>
-              <a:t>4/21/2019</a:t>
+              <a:t>4/22/2019</a:t>
             </a:fld>
             <a:endParaRPr lang="en-US"/>
           </a:p>
@@ -1776,7 +1778,7 @@
           <a:p>
             <a:fld id="{A0EC2761-52B0-42C5-B01B-DF8F69615AE5}" type="datetimeFigureOut">
               <a:rPr lang="en-US" smtClean="0"/>
-              <a:t>4/21/2019</a:t>
+              <a:t>4/22/2019</a:t>
             </a:fld>
             <a:endParaRPr lang="en-US"/>
           </a:p>
@@ -1885,7 +1887,7 @@
           <a:p>
             <a:fld id="{A0EC2761-52B0-42C5-B01B-DF8F69615AE5}" type="datetimeFigureOut">
               <a:rPr lang="en-US" smtClean="0"/>
-              <a:t>4/21/2019</a:t>
+              <a:t>4/22/2019</a:t>
             </a:fld>
             <a:endParaRPr lang="en-US"/>
           </a:p>
@@ -2160,7 +2162,7 @@
           <a:p>
             <a:fld id="{A0EC2761-52B0-42C5-B01B-DF8F69615AE5}" type="datetimeFigureOut">
               <a:rPr lang="en-US" smtClean="0"/>
-              <a:t>4/21/2019</a:t>
+              <a:t>4/22/2019</a:t>
             </a:fld>
             <a:endParaRPr lang="en-US"/>
           </a:p>
@@ -2415,7 +2417,7 @@
           <a:p>
             <a:fld id="{A0EC2761-52B0-42C5-B01B-DF8F69615AE5}" type="datetimeFigureOut">
               <a:rPr lang="en-US" smtClean="0"/>
-              <a:t>4/21/2019</a:t>
+              <a:t>4/22/2019</a:t>
             </a:fld>
             <a:endParaRPr lang="en-US"/>
           </a:p>
@@ -2635,7 +2637,7 @@
           <a:p>
             <a:fld id="{A0EC2761-52B0-42C5-B01B-DF8F69615AE5}" type="datetimeFigureOut">
               <a:rPr lang="en-US" smtClean="0"/>
-              <a:t>4/21/2019</a:t>
+              <a:t>4/22/2019</a:t>
             </a:fld>
             <a:endParaRPr lang="en-US"/>
           </a:p>
@@ -4336,13 +4338,154 @@
           <a:lstStyle/>
           <a:p>
             <a:r>
-              <a:rPr lang="en-US"/>
-              <a:t>Đây là hàm xử lý cú pháp các tham số trong một hàm của KPL</a:t>
-            </a:r>
-            <a:endParaRPr lang="vi-VN"/>
-          </a:p>
-        </p:txBody>
-      </p:sp>
+              <a:rPr lang="en-US">
+                <a:solidFill>
+                  <a:schemeClr val="tx1"/>
+                </a:solidFill>
+              </a:rPr>
+              <a:t>Đây là hàm xử lý cú pháp các tham số trong một thủ tục hoặc một hàm của KPL</a:t>
+            </a:r>
+          </a:p>
+          <a:p>
+            <a:r>
+              <a:rPr lang="en-US">
+                <a:solidFill>
+                  <a:schemeClr val="tx1"/>
+                </a:solidFill>
+              </a:rPr>
+              <a:t>Một thủ tục hoặc một hàm có thể có tham số hoặc không theo s</a:t>
+            </a:r>
+            <a:r>
+              <a:rPr lang="vi-VN">
+                <a:solidFill>
+                  <a:schemeClr val="tx1"/>
+                </a:solidFill>
+              </a:rPr>
+              <a:t>ơ</a:t>
+            </a:r>
+            <a:r>
+              <a:rPr lang="en-US">
+                <a:solidFill>
+                  <a:schemeClr val="tx1"/>
+                </a:solidFill>
+              </a:rPr>
+              <a:t> đồ</a:t>
+            </a:r>
+          </a:p>
+          <a:p>
+            <a:endParaRPr lang="en-US">
+              <a:solidFill>
+                <a:schemeClr val="tx1"/>
+              </a:solidFill>
+            </a:endParaRPr>
+          </a:p>
+          <a:p>
+            <a:endParaRPr lang="en-US">
+              <a:solidFill>
+                <a:schemeClr val="tx1"/>
+              </a:solidFill>
+            </a:endParaRPr>
+          </a:p>
+          <a:p>
+            <a:endParaRPr lang="en-US">
+              <a:solidFill>
+                <a:schemeClr val="tx1"/>
+              </a:solidFill>
+            </a:endParaRPr>
+          </a:p>
+          <a:p>
+            <a:endParaRPr lang="en-US">
+              <a:solidFill>
+                <a:schemeClr val="tx1"/>
+              </a:solidFill>
+            </a:endParaRPr>
+          </a:p>
+          <a:p>
+            <a:r>
+              <a:rPr lang="en-US">
+                <a:solidFill>
+                  <a:schemeClr val="tx1"/>
+                </a:solidFill>
+              </a:rPr>
+              <a:t>Sơ đồ ứng với hàm compileParamlist:</a:t>
+            </a:r>
+          </a:p>
+          <a:p>
+            <a:endParaRPr lang="en-US">
+              <a:solidFill>
+                <a:schemeClr val="tx1"/>
+              </a:solidFill>
+            </a:endParaRPr>
+          </a:p>
+          <a:p>
+            <a:endParaRPr lang="vi-VN">
+              <a:solidFill>
+                <a:schemeClr val="tx1"/>
+              </a:solidFill>
+            </a:endParaRPr>
+          </a:p>
+        </p:txBody>
+      </p:sp>
+      <p:pic>
+        <p:nvPicPr>
+          <p:cNvPr id="3" name="Hình ảnh 2">
+            <a:extLst>
+              <a:ext uri="{FF2B5EF4-FFF2-40B4-BE49-F238E27FC236}">
+                <a16:creationId xmlns:a16="http://schemas.microsoft.com/office/drawing/2014/main" id="{F7A698DA-C062-4A19-AD9C-FDE8B240B6D4}"/>
+              </a:ext>
+            </a:extLst>
+          </p:cNvPr>
+          <p:cNvPicPr>
+            <a:picLocks noChangeAspect="1"/>
+          </p:cNvPicPr>
+          <p:nvPr/>
+        </p:nvPicPr>
+        <p:blipFill>
+          <a:blip r:embed="rId2"/>
+          <a:stretch>
+            <a:fillRect/>
+          </a:stretch>
+        </p:blipFill>
+        <p:spPr>
+          <a:xfrm>
+            <a:off x="1269444" y="2463986"/>
+            <a:ext cx="6605112" cy="1428132"/>
+          </a:xfrm>
+          <a:prstGeom prst="rect">
+            <a:avLst/>
+          </a:prstGeom>
+        </p:spPr>
+      </p:pic>
+      <p:pic>
+        <p:nvPicPr>
+          <p:cNvPr id="5" name="Hình ảnh 4">
+            <a:extLst>
+              <a:ext uri="{FF2B5EF4-FFF2-40B4-BE49-F238E27FC236}">
+                <a16:creationId xmlns:a16="http://schemas.microsoft.com/office/drawing/2014/main" id="{8633F968-44C4-4278-806D-B737BCF29216}"/>
+              </a:ext>
+            </a:extLst>
+          </p:cNvPr>
+          <p:cNvPicPr>
+            <a:picLocks noChangeAspect="1"/>
+          </p:cNvPicPr>
+          <p:nvPr/>
+        </p:nvPicPr>
+        <p:blipFill>
+          <a:blip r:embed="rId3"/>
+          <a:stretch>
+            <a:fillRect/>
+          </a:stretch>
+        </p:blipFill>
+        <p:spPr>
+          <a:xfrm>
+            <a:off x="1509204" y="4559958"/>
+            <a:ext cx="6303915" cy="1266289"/>
+          </a:xfrm>
+          <a:prstGeom prst="rect">
+            <a:avLst/>
+          </a:prstGeom>
+        </p:spPr>
+      </p:pic>
     </p:spTree>
     <p:extLst>
       <p:ext uri="{BB962C8B-B14F-4D97-AF65-F5344CB8AC3E}">
@@ -4396,7 +4539,7 @@
           <a:p>
             <a:r>
               <a:rPr lang="en-US"/>
-              <a:t>Giải thích 3 lệnh if lồng nhau</a:t>
+              <a:t>Giới thiệu hàm compileParamlist (tiếp)</a:t>
             </a:r>
             <a:endParaRPr lang="en-US" dirty="0"/>
           </a:p>
@@ -4423,14 +4566,143 @@
           <a:bodyPr/>
           <a:lstStyle/>
           <a:p>
+            <a:endParaRPr lang="en-US"/>
+          </a:p>
+          <a:p>
             <a:endParaRPr lang="vi-VN"/>
+          </a:p>
+        </p:txBody>
+      </p:sp>
+      <p:pic>
+        <p:nvPicPr>
+          <p:cNvPr id="6" name="Hình ảnh 5">
+            <a:extLst>
+              <a:ext uri="{FF2B5EF4-FFF2-40B4-BE49-F238E27FC236}">
+                <a16:creationId xmlns:a16="http://schemas.microsoft.com/office/drawing/2014/main" id="{0DEE32F3-97A6-4FC5-9AEC-59868DAD4015}"/>
+              </a:ext>
+            </a:extLst>
+          </p:cNvPr>
+          <p:cNvPicPr>
+            <a:picLocks noChangeAspect="1"/>
+          </p:cNvPicPr>
+          <p:nvPr/>
+        </p:nvPicPr>
+        <p:blipFill>
+          <a:blip r:embed="rId2"/>
+          <a:stretch>
+            <a:fillRect/>
+          </a:stretch>
+        </p:blipFill>
+        <p:spPr>
+          <a:xfrm>
+            <a:off x="710215" y="1378089"/>
+            <a:ext cx="2468208" cy="1927006"/>
+          </a:xfrm>
+          <a:prstGeom prst="rect">
+            <a:avLst/>
+          </a:prstGeom>
+        </p:spPr>
+      </p:pic>
+      <p:pic>
+        <p:nvPicPr>
+          <p:cNvPr id="7" name="Hình ảnh 6">
+            <a:extLst>
+              <a:ext uri="{FF2B5EF4-FFF2-40B4-BE49-F238E27FC236}">
+                <a16:creationId xmlns:a16="http://schemas.microsoft.com/office/drawing/2014/main" id="{4DF761AF-121F-402B-A042-AFF3F2ED7C95}"/>
+              </a:ext>
+            </a:extLst>
+          </p:cNvPr>
+          <p:cNvPicPr>
+            <a:picLocks noChangeAspect="1"/>
+          </p:cNvPicPr>
+          <p:nvPr/>
+        </p:nvPicPr>
+        <p:blipFill>
+          <a:blip r:embed="rId3"/>
+          <a:stretch>
+            <a:fillRect/>
+          </a:stretch>
+        </p:blipFill>
+        <p:spPr>
+          <a:xfrm>
+            <a:off x="3870508" y="1409977"/>
+            <a:ext cx="4726959" cy="2279370"/>
+          </a:xfrm>
+          <a:prstGeom prst="rect">
+            <a:avLst/>
+          </a:prstGeom>
+        </p:spPr>
+      </p:pic>
+      <p:pic>
+        <p:nvPicPr>
+          <p:cNvPr id="9" name="Hình ảnh 8">
+            <a:extLst>
+              <a:ext uri="{FF2B5EF4-FFF2-40B4-BE49-F238E27FC236}">
+                <a16:creationId xmlns:a16="http://schemas.microsoft.com/office/drawing/2014/main" id="{521A33BB-96ED-4313-A2B4-DBFF004538E8}"/>
+              </a:ext>
+            </a:extLst>
+          </p:cNvPr>
+          <p:cNvPicPr>
+            <a:picLocks noChangeAspect="1"/>
+          </p:cNvPicPr>
+          <p:nvPr/>
+        </p:nvPicPr>
+        <p:blipFill>
+          <a:blip r:embed="rId4"/>
+          <a:stretch>
+            <a:fillRect/>
+          </a:stretch>
+        </p:blipFill>
+        <p:spPr>
+          <a:xfrm>
+            <a:off x="3870509" y="3797299"/>
+            <a:ext cx="4726958" cy="2878760"/>
+          </a:xfrm>
+          <a:prstGeom prst="rect">
+            <a:avLst/>
+          </a:prstGeom>
+        </p:spPr>
+      </p:pic>
+      <p:sp>
+        <p:nvSpPr>
+          <p:cNvPr id="10" name="Hộp Văn bản 9">
+            <a:extLst>
+              <a:ext uri="{FF2B5EF4-FFF2-40B4-BE49-F238E27FC236}">
+                <a16:creationId xmlns:a16="http://schemas.microsoft.com/office/drawing/2014/main" id="{494E8589-E9FE-4B5E-B8AD-99939A4259E5}"/>
+              </a:ext>
+            </a:extLst>
+          </p:cNvPr>
+          <p:cNvSpPr txBox="1"/>
+          <p:nvPr/>
+        </p:nvSpPr>
+        <p:spPr>
+          <a:xfrm>
+            <a:off x="710215" y="3689347"/>
+            <a:ext cx="2468208" cy="1061829"/>
+          </a:xfrm>
+          <a:prstGeom prst="rect">
+            <a:avLst/>
+          </a:prstGeom>
+          <a:noFill/>
+        </p:spPr>
+        <p:txBody>
+          <a:bodyPr wrap="square" rtlCol="0">
+            <a:spAutoFit/>
+          </a:bodyPr>
+          <a:lstStyle/>
+          <a:p>
+            <a:r>
+              <a:rPr lang="en-US" sz="2100"/>
+              <a:t>Khi nào thì xảy ra lỗi ERR_INVALIDPARAM ???</a:t>
+            </a:r>
+            <a:endParaRPr lang="vi-VN" sz="2100"/>
           </a:p>
         </p:txBody>
       </p:sp>
     </p:spTree>
     <p:extLst>
       <p:ext uri="{BB962C8B-B14F-4D97-AF65-F5344CB8AC3E}">
-        <p14:creationId xmlns:p14="http://schemas.microsoft.com/office/powerpoint/2010/main" val="1213660596"/>
+        <p14:creationId xmlns:p14="http://schemas.microsoft.com/office/powerpoint/2010/main" val="2942387361"/>
       </p:ext>
     </p:extLst>
   </p:cSld>
@@ -4518,25 +4790,41 @@
           <a:lstStyle/>
           <a:p>
             <a:r>
-              <a:rPr lang="vi-VN"/>
+              <a:rPr lang="vi-VN">
+                <a:solidFill>
+                  <a:schemeClr val="tx1"/>
+                </a:solidFill>
+              </a:rPr>
               <a:t>Nhận chuỗi các token từ bộ phân tích từ vựng</a:t>
             </a:r>
           </a:p>
           <a:p>
             <a:r>
-              <a:rPr lang="vi-VN"/>
+              <a:rPr lang="vi-VN">
+                <a:solidFill>
+                  <a:schemeClr val="tx1"/>
+                </a:solidFill>
+              </a:rPr>
               <a:t>Xác nhận rằng chuỗi này có thể được sinh ra từ văn phạm của ngôn ngữ nguồn </a:t>
             </a:r>
           </a:p>
           <a:p>
             <a:r>
-              <a:rPr lang="vi-VN"/>
+              <a:rPr lang="vi-VN">
+                <a:solidFill>
+                  <a:schemeClr val="tx1"/>
+                </a:solidFill>
+              </a:rPr>
               <a:t>Bằng cách tạo ra cây phân tích cú pháp cho chuỗi</a:t>
             </a:r>
           </a:p>
           <a:p>
             <a:r>
-              <a:rPr lang="vi-VN"/>
+              <a:rPr lang="vi-VN">
+                <a:solidFill>
+                  <a:schemeClr val="tx1"/>
+                </a:solidFill>
+              </a:rPr>
               <a:t>Có cơ chế ghi nhận các lỗi cú pháp</a:t>
             </a:r>
           </a:p>
@@ -4571,8 +4859,8 @@
         </p:blipFill>
         <p:spPr bwMode="auto">
           <a:xfrm>
-            <a:off x="865078" y="3284622"/>
-            <a:ext cx="7413844" cy="2484020"/>
+            <a:off x="1146037" y="3429000"/>
+            <a:ext cx="7000538" cy="2345541"/>
           </a:xfrm>
           <a:prstGeom prst="rect">
             <a:avLst/>
@@ -4676,7 +4964,1035 @@
           <a:p>
             <a:r>
               <a:rPr lang="en-US"/>
-              <a:t>Tập Follow</a:t>
+              <a:t>Giải thích 3 lệnh if lồng nhau</a:t>
+            </a:r>
+            <a:endParaRPr lang="en-US" dirty="0"/>
+          </a:p>
+        </p:txBody>
+      </p:sp>
+      <p:sp>
+        <p:nvSpPr>
+          <p:cNvPr id="11" name="Content Placeholder 10">
+            <a:extLst>
+              <a:ext uri="{FF2B5EF4-FFF2-40B4-BE49-F238E27FC236}">
+                <a16:creationId xmlns:a16="http://schemas.microsoft.com/office/drawing/2014/main" id="{8B7FD5CB-296B-4C10-9CFB-0B78F9D496AC}"/>
+              </a:ext>
+            </a:extLst>
+          </p:cNvPr>
+          <p:cNvSpPr>
+            <a:spLocks noGrp="1"/>
+          </p:cNvSpPr>
+          <p:nvPr>
+            <p:ph idx="1"/>
+          </p:nvPr>
+        </p:nvSpPr>
+        <p:spPr>
+          <a:xfrm>
+            <a:off x="488951" y="1346200"/>
+            <a:ext cx="5006327" cy="4902199"/>
+          </a:xfrm>
+        </p:spPr>
+        <p:txBody>
+          <a:bodyPr/>
+          <a:lstStyle/>
+          <a:p>
+            <a:r>
+              <a:rPr lang="en-US" dirty="0" err="1">
+                <a:solidFill>
+                  <a:schemeClr val="tx1"/>
+                </a:solidFill>
+              </a:rPr>
+              <a:t>Trong</a:t>
+            </a:r>
+            <a:r>
+              <a:rPr lang="en-US" dirty="0">
+                <a:solidFill>
+                  <a:schemeClr val="tx1"/>
+                </a:solidFill>
+              </a:rPr>
+              <a:t> </a:t>
+            </a:r>
+            <a:r>
+              <a:rPr lang="en-US" dirty="0" err="1">
+                <a:solidFill>
+                  <a:schemeClr val="tx1"/>
+                </a:solidFill>
+              </a:rPr>
+              <a:t>hàm</a:t>
+            </a:r>
+            <a:r>
+              <a:rPr lang="en-US" dirty="0">
+                <a:solidFill>
+                  <a:schemeClr val="tx1"/>
+                </a:solidFill>
+              </a:rPr>
+              <a:t> </a:t>
+            </a:r>
+            <a:r>
+              <a:rPr lang="en-US" dirty="0" err="1">
+                <a:solidFill>
+                  <a:schemeClr val="tx1"/>
+                </a:solidFill>
+              </a:rPr>
+              <a:t>compileIfst</a:t>
+            </a:r>
+            <a:r>
+              <a:rPr lang="en-US" dirty="0">
+                <a:solidFill>
+                  <a:schemeClr val="tx1"/>
+                </a:solidFill>
+              </a:rPr>
+              <a:t>() </a:t>
+            </a:r>
+            <a:r>
+              <a:rPr lang="en-US" dirty="0" err="1">
+                <a:solidFill>
+                  <a:schemeClr val="tx1"/>
+                </a:solidFill>
+              </a:rPr>
+              <a:t>kiểm</a:t>
+            </a:r>
+            <a:r>
+              <a:rPr lang="en-US" dirty="0">
+                <a:solidFill>
+                  <a:schemeClr val="tx1"/>
+                </a:solidFill>
+              </a:rPr>
+              <a:t> </a:t>
+            </a:r>
+            <a:r>
+              <a:rPr lang="en-US" dirty="0" err="1">
+                <a:solidFill>
+                  <a:schemeClr val="tx1"/>
+                </a:solidFill>
+              </a:rPr>
+              <a:t>tra</a:t>
+            </a:r>
+            <a:r>
+              <a:rPr lang="en-US" dirty="0">
+                <a:solidFill>
+                  <a:schemeClr val="tx1"/>
+                </a:solidFill>
+              </a:rPr>
+              <a:t> </a:t>
+            </a:r>
+            <a:r>
+              <a:rPr lang="en-US" dirty="0" err="1">
+                <a:solidFill>
+                  <a:schemeClr val="tx1"/>
+                </a:solidFill>
+              </a:rPr>
+              <a:t>từ</a:t>
+            </a:r>
+            <a:r>
+              <a:rPr lang="en-US" dirty="0">
+                <a:solidFill>
+                  <a:schemeClr val="tx1"/>
+                </a:solidFill>
+              </a:rPr>
+              <a:t> </a:t>
+            </a:r>
+            <a:r>
+              <a:rPr lang="en-US" dirty="0" err="1">
+                <a:solidFill>
+                  <a:schemeClr val="tx1"/>
+                </a:solidFill>
+              </a:rPr>
+              <a:t>khóa</a:t>
+            </a:r>
+            <a:r>
+              <a:rPr lang="en-US" dirty="0">
+                <a:solidFill>
+                  <a:schemeClr val="tx1"/>
+                </a:solidFill>
+              </a:rPr>
+              <a:t> THEN </a:t>
+            </a:r>
+            <a:r>
+              <a:rPr lang="en-US" dirty="0" err="1">
+                <a:solidFill>
+                  <a:schemeClr val="tx1"/>
+                </a:solidFill>
+              </a:rPr>
+              <a:t>sau</a:t>
+            </a:r>
+            <a:r>
+              <a:rPr lang="en-US" dirty="0">
+                <a:solidFill>
+                  <a:schemeClr val="tx1"/>
+                </a:solidFill>
+              </a:rPr>
+              <a:t> </a:t>
+            </a:r>
+            <a:r>
+              <a:rPr lang="en-US" dirty="0" err="1">
+                <a:solidFill>
+                  <a:schemeClr val="tx1"/>
+                </a:solidFill>
+              </a:rPr>
+              <a:t>đó</a:t>
+            </a:r>
+            <a:r>
+              <a:rPr lang="en-US" dirty="0">
+                <a:solidFill>
+                  <a:schemeClr val="tx1"/>
+                </a:solidFill>
+              </a:rPr>
+              <a:t> </a:t>
+            </a:r>
+            <a:r>
+              <a:rPr lang="en-US" dirty="0" err="1">
+                <a:solidFill>
+                  <a:schemeClr val="tx1"/>
+                </a:solidFill>
+              </a:rPr>
+              <a:t>gọi</a:t>
+            </a:r>
+            <a:r>
+              <a:rPr lang="en-US" dirty="0">
+                <a:solidFill>
+                  <a:schemeClr val="tx1"/>
+                </a:solidFill>
+              </a:rPr>
+              <a:t> </a:t>
+            </a:r>
+            <a:r>
+              <a:rPr lang="en-US" dirty="0" err="1">
+                <a:solidFill>
+                  <a:schemeClr val="tx1"/>
+                </a:solidFill>
+              </a:rPr>
+              <a:t>hàm</a:t>
+            </a:r>
+            <a:r>
+              <a:rPr lang="en-US" dirty="0">
+                <a:solidFill>
+                  <a:schemeClr val="tx1"/>
+                </a:solidFill>
+              </a:rPr>
+              <a:t> </a:t>
+            </a:r>
+            <a:r>
+              <a:rPr lang="en-US" dirty="0" err="1">
+                <a:solidFill>
+                  <a:schemeClr val="tx1"/>
+                </a:solidFill>
+              </a:rPr>
+              <a:t>compileStatement</a:t>
+            </a:r>
+            <a:r>
+              <a:rPr lang="en-US" dirty="0">
+                <a:solidFill>
+                  <a:schemeClr val="tx1"/>
+                </a:solidFill>
+              </a:rPr>
+              <a:t>() </a:t>
+            </a:r>
+            <a:r>
+              <a:rPr lang="en-US" dirty="0" err="1">
+                <a:solidFill>
+                  <a:schemeClr val="tx1"/>
+                </a:solidFill>
+              </a:rPr>
+              <a:t>rồi</a:t>
+            </a:r>
+            <a:r>
+              <a:rPr lang="en-US" dirty="0">
+                <a:solidFill>
+                  <a:schemeClr val="tx1"/>
+                </a:solidFill>
+              </a:rPr>
+              <a:t> </a:t>
+            </a:r>
+            <a:r>
+              <a:rPr lang="en-US" dirty="0" err="1">
+                <a:solidFill>
+                  <a:schemeClr val="tx1"/>
+                </a:solidFill>
+              </a:rPr>
+              <a:t>mới</a:t>
+            </a:r>
+            <a:r>
+              <a:rPr lang="en-US" dirty="0">
+                <a:solidFill>
+                  <a:schemeClr val="tx1"/>
+                </a:solidFill>
+              </a:rPr>
+              <a:t> </a:t>
+            </a:r>
+            <a:r>
+              <a:rPr lang="en-US" dirty="0" err="1">
+                <a:solidFill>
+                  <a:schemeClr val="tx1"/>
+                </a:solidFill>
+              </a:rPr>
+              <a:t>kiểm</a:t>
+            </a:r>
+            <a:r>
+              <a:rPr lang="en-US" dirty="0">
+                <a:solidFill>
+                  <a:schemeClr val="tx1"/>
+                </a:solidFill>
+              </a:rPr>
+              <a:t> </a:t>
+            </a:r>
+            <a:r>
+              <a:rPr lang="en-US" dirty="0" err="1">
+                <a:solidFill>
+                  <a:schemeClr val="tx1"/>
+                </a:solidFill>
+              </a:rPr>
+              <a:t>tra</a:t>
+            </a:r>
+            <a:r>
+              <a:rPr lang="en-US" dirty="0">
+                <a:solidFill>
+                  <a:schemeClr val="tx1"/>
+                </a:solidFill>
+              </a:rPr>
+              <a:t> </a:t>
+            </a:r>
+            <a:r>
+              <a:rPr lang="en-US" dirty="0" err="1">
+                <a:solidFill>
+                  <a:schemeClr val="tx1"/>
+                </a:solidFill>
+              </a:rPr>
+              <a:t>từ</a:t>
+            </a:r>
+            <a:r>
+              <a:rPr lang="en-US" dirty="0">
+                <a:solidFill>
+                  <a:schemeClr val="tx1"/>
+                </a:solidFill>
+              </a:rPr>
+              <a:t> </a:t>
+            </a:r>
+            <a:r>
+              <a:rPr lang="en-US" dirty="0" err="1">
+                <a:solidFill>
+                  <a:schemeClr val="tx1"/>
+                </a:solidFill>
+              </a:rPr>
+              <a:t>khóa</a:t>
+            </a:r>
+            <a:r>
+              <a:rPr lang="en-US" dirty="0">
+                <a:solidFill>
+                  <a:schemeClr val="tx1"/>
+                </a:solidFill>
+              </a:rPr>
+              <a:t> ELSE</a:t>
+            </a:r>
+          </a:p>
+          <a:p>
+            <a:r>
+              <a:rPr lang="en-US">
+                <a:solidFill>
+                  <a:schemeClr val="tx1"/>
+                </a:solidFill>
+              </a:rPr>
+              <a:t>Vì </a:t>
+            </a:r>
+            <a:r>
+              <a:rPr lang="en-US" dirty="0" err="1">
+                <a:solidFill>
+                  <a:schemeClr val="tx1"/>
+                </a:solidFill>
+              </a:rPr>
+              <a:t>vậy</a:t>
+            </a:r>
+            <a:r>
+              <a:rPr lang="en-US" dirty="0">
+                <a:solidFill>
+                  <a:schemeClr val="tx1"/>
+                </a:solidFill>
+              </a:rPr>
+              <a:t> </a:t>
+            </a:r>
+            <a:r>
+              <a:rPr lang="en-US" dirty="0" err="1">
+                <a:solidFill>
+                  <a:schemeClr val="tx1"/>
+                </a:solidFill>
+              </a:rPr>
+              <a:t>nếu</a:t>
+            </a:r>
+            <a:r>
+              <a:rPr lang="en-US" dirty="0">
+                <a:solidFill>
+                  <a:schemeClr val="tx1"/>
+                </a:solidFill>
+              </a:rPr>
+              <a:t> </a:t>
+            </a:r>
+            <a:r>
+              <a:rPr lang="en-US" dirty="0" err="1">
+                <a:solidFill>
+                  <a:schemeClr val="tx1"/>
+                </a:solidFill>
+              </a:rPr>
+              <a:t>có</a:t>
+            </a:r>
+            <a:r>
+              <a:rPr lang="en-US" dirty="0">
+                <a:solidFill>
+                  <a:schemeClr val="tx1"/>
+                </a:solidFill>
+              </a:rPr>
+              <a:t> </a:t>
+            </a:r>
+            <a:r>
+              <a:rPr lang="en-US" dirty="0" err="1">
+                <a:solidFill>
+                  <a:schemeClr val="tx1"/>
+                </a:solidFill>
+              </a:rPr>
+              <a:t>từ</a:t>
+            </a:r>
+            <a:r>
+              <a:rPr lang="en-US" dirty="0">
+                <a:solidFill>
+                  <a:schemeClr val="tx1"/>
+                </a:solidFill>
+              </a:rPr>
+              <a:t> </a:t>
+            </a:r>
+            <a:r>
+              <a:rPr lang="en-US" dirty="0" err="1">
+                <a:solidFill>
+                  <a:schemeClr val="tx1"/>
+                </a:solidFill>
+              </a:rPr>
+              <a:t>khóa</a:t>
+            </a:r>
+            <a:r>
+              <a:rPr lang="en-US" dirty="0">
+                <a:solidFill>
+                  <a:schemeClr val="tx1"/>
+                </a:solidFill>
+              </a:rPr>
+              <a:t> ELSE </a:t>
+            </a:r>
+            <a:r>
+              <a:rPr lang="en-US" dirty="0" err="1">
+                <a:solidFill>
+                  <a:schemeClr val="tx1"/>
+                </a:solidFill>
+              </a:rPr>
+              <a:t>thì</a:t>
+            </a:r>
+            <a:r>
+              <a:rPr lang="en-US" dirty="0">
+                <a:solidFill>
+                  <a:schemeClr val="tx1"/>
+                </a:solidFill>
+              </a:rPr>
+              <a:t> </a:t>
+            </a:r>
+            <a:r>
+              <a:rPr lang="en-US" dirty="0" err="1">
+                <a:solidFill>
+                  <a:schemeClr val="tx1"/>
+                </a:solidFill>
+              </a:rPr>
+              <a:t>từ</a:t>
+            </a:r>
+            <a:r>
+              <a:rPr lang="en-US" dirty="0">
+                <a:solidFill>
+                  <a:schemeClr val="tx1"/>
+                </a:solidFill>
+              </a:rPr>
+              <a:t> </a:t>
+            </a:r>
+            <a:r>
+              <a:rPr lang="en-US" dirty="0" err="1">
+                <a:solidFill>
+                  <a:schemeClr val="tx1"/>
+                </a:solidFill>
+              </a:rPr>
+              <a:t>khóa</a:t>
+            </a:r>
+            <a:r>
+              <a:rPr lang="en-US" dirty="0">
+                <a:solidFill>
+                  <a:schemeClr val="tx1"/>
+                </a:solidFill>
+              </a:rPr>
+              <a:t> ELSE </a:t>
+            </a:r>
+            <a:r>
+              <a:rPr lang="en-US" dirty="0" err="1">
+                <a:solidFill>
+                  <a:schemeClr val="tx1"/>
+                </a:solidFill>
+              </a:rPr>
+              <a:t>đó</a:t>
+            </a:r>
+            <a:r>
+              <a:rPr lang="en-US" dirty="0">
+                <a:solidFill>
+                  <a:schemeClr val="tx1"/>
+                </a:solidFill>
+              </a:rPr>
+              <a:t> </a:t>
+            </a:r>
+            <a:r>
+              <a:rPr lang="en-US" dirty="0" err="1">
+                <a:solidFill>
+                  <a:schemeClr val="tx1"/>
+                </a:solidFill>
+              </a:rPr>
+              <a:t>sẽ</a:t>
+            </a:r>
+            <a:r>
+              <a:rPr lang="en-US" dirty="0">
+                <a:solidFill>
+                  <a:schemeClr val="tx1"/>
+                </a:solidFill>
+              </a:rPr>
+              <a:t> đ</a:t>
+            </a:r>
+            <a:r>
+              <a:rPr lang="vi-VN" dirty="0">
+                <a:solidFill>
+                  <a:schemeClr val="tx1"/>
+                </a:solidFill>
+              </a:rPr>
+              <a:t>ư</a:t>
+            </a:r>
+            <a:r>
+              <a:rPr lang="en-US" dirty="0" err="1">
+                <a:solidFill>
+                  <a:schemeClr val="tx1"/>
+                </a:solidFill>
+              </a:rPr>
+              <a:t>ợc</a:t>
+            </a:r>
+            <a:r>
+              <a:rPr lang="en-US" dirty="0">
+                <a:solidFill>
+                  <a:schemeClr val="tx1"/>
+                </a:solidFill>
+              </a:rPr>
+              <a:t> </a:t>
+            </a:r>
+            <a:r>
+              <a:rPr lang="en-US" dirty="0" err="1">
+                <a:solidFill>
+                  <a:schemeClr val="tx1"/>
+                </a:solidFill>
+              </a:rPr>
+              <a:t>kiểm</a:t>
+            </a:r>
+            <a:r>
+              <a:rPr lang="en-US" dirty="0">
+                <a:solidFill>
+                  <a:schemeClr val="tx1"/>
+                </a:solidFill>
+              </a:rPr>
+              <a:t> </a:t>
+            </a:r>
+            <a:r>
+              <a:rPr lang="en-US" dirty="0" err="1">
+                <a:solidFill>
+                  <a:schemeClr val="tx1"/>
+                </a:solidFill>
+              </a:rPr>
+              <a:t>tra</a:t>
+            </a:r>
+            <a:r>
+              <a:rPr lang="en-US" dirty="0">
+                <a:solidFill>
+                  <a:schemeClr val="tx1"/>
+                </a:solidFill>
+              </a:rPr>
+              <a:t> </a:t>
+            </a:r>
+            <a:r>
+              <a:rPr lang="en-US" dirty="0" err="1">
+                <a:solidFill>
+                  <a:schemeClr val="tx1"/>
+                </a:solidFill>
+              </a:rPr>
+              <a:t>trong</a:t>
+            </a:r>
+            <a:r>
+              <a:rPr lang="en-US" dirty="0">
+                <a:solidFill>
+                  <a:schemeClr val="tx1"/>
+                </a:solidFill>
+              </a:rPr>
+              <a:t> </a:t>
+            </a:r>
+            <a:r>
+              <a:rPr lang="en-US" dirty="0" err="1">
+                <a:solidFill>
+                  <a:schemeClr val="tx1"/>
+                </a:solidFill>
+              </a:rPr>
+              <a:t>hàm</a:t>
+            </a:r>
+            <a:r>
+              <a:rPr lang="en-US" dirty="0">
+                <a:solidFill>
+                  <a:schemeClr val="tx1"/>
+                </a:solidFill>
+              </a:rPr>
+              <a:t> </a:t>
+            </a:r>
+            <a:r>
+              <a:rPr lang="en-US" dirty="0" err="1">
+                <a:solidFill>
+                  <a:schemeClr val="tx1"/>
+                </a:solidFill>
+              </a:rPr>
+              <a:t>compileStatement</a:t>
+            </a:r>
+            <a:r>
+              <a:rPr lang="en-US" dirty="0">
+                <a:solidFill>
+                  <a:schemeClr val="tx1"/>
+                </a:solidFill>
+              </a:rPr>
+              <a:t>() </a:t>
+            </a:r>
+            <a:r>
+              <a:rPr lang="en-US" dirty="0" err="1">
+                <a:solidFill>
+                  <a:schemeClr val="tx1"/>
+                </a:solidFill>
+              </a:rPr>
+              <a:t>trước</a:t>
+            </a:r>
+            <a:r>
+              <a:rPr lang="en-US" dirty="0">
+                <a:solidFill>
+                  <a:schemeClr val="tx1"/>
+                </a:solidFill>
+              </a:rPr>
+              <a:t>. </a:t>
+            </a:r>
+          </a:p>
+          <a:p>
+            <a:r>
+              <a:rPr lang="en-US" dirty="0" err="1">
+                <a:solidFill>
+                  <a:schemeClr val="tx1"/>
+                </a:solidFill>
+              </a:rPr>
+              <a:t>Nếu</a:t>
+            </a:r>
+            <a:r>
+              <a:rPr lang="en-US" dirty="0">
+                <a:solidFill>
+                  <a:schemeClr val="tx1"/>
+                </a:solidFill>
+              </a:rPr>
+              <a:t> </a:t>
+            </a:r>
+            <a:r>
+              <a:rPr lang="en-US" dirty="0" err="1">
+                <a:solidFill>
+                  <a:schemeClr val="tx1"/>
+                </a:solidFill>
+              </a:rPr>
+              <a:t>chúng</a:t>
+            </a:r>
+            <a:r>
+              <a:rPr lang="en-US" dirty="0">
+                <a:solidFill>
+                  <a:schemeClr val="tx1"/>
+                </a:solidFill>
+              </a:rPr>
+              <a:t> ta </a:t>
+            </a:r>
+            <a:r>
+              <a:rPr lang="en-US" dirty="0" err="1">
+                <a:solidFill>
+                  <a:schemeClr val="tx1"/>
+                </a:solidFill>
+              </a:rPr>
+              <a:t>có</a:t>
+            </a:r>
+            <a:r>
+              <a:rPr lang="en-US" dirty="0">
+                <a:solidFill>
+                  <a:schemeClr val="tx1"/>
+                </a:solidFill>
+              </a:rPr>
+              <a:t> 3 </a:t>
+            </a:r>
+            <a:r>
+              <a:rPr lang="en-US" dirty="0" err="1">
+                <a:solidFill>
+                  <a:schemeClr val="tx1"/>
+                </a:solidFill>
+              </a:rPr>
+              <a:t>hàm</a:t>
+            </a:r>
+            <a:r>
+              <a:rPr lang="en-US" dirty="0">
+                <a:solidFill>
+                  <a:schemeClr val="tx1"/>
+                </a:solidFill>
+              </a:rPr>
+              <a:t> IF </a:t>
+            </a:r>
+            <a:r>
+              <a:rPr lang="en-US" dirty="0" err="1">
+                <a:solidFill>
+                  <a:schemeClr val="tx1"/>
+                </a:solidFill>
+              </a:rPr>
+              <a:t>lồng</a:t>
+            </a:r>
+            <a:r>
+              <a:rPr lang="en-US" dirty="0">
+                <a:solidFill>
+                  <a:schemeClr val="tx1"/>
+                </a:solidFill>
+              </a:rPr>
+              <a:t> </a:t>
+            </a:r>
+            <a:r>
+              <a:rPr lang="en-US" dirty="0" err="1">
+                <a:solidFill>
+                  <a:schemeClr val="tx1"/>
+                </a:solidFill>
+              </a:rPr>
+              <a:t>nhau</a:t>
+            </a:r>
+            <a:r>
+              <a:rPr lang="en-US" dirty="0">
+                <a:solidFill>
+                  <a:schemeClr val="tx1"/>
+                </a:solidFill>
+              </a:rPr>
+              <a:t> </a:t>
+            </a:r>
+            <a:r>
+              <a:rPr lang="en-US" dirty="0" err="1">
+                <a:solidFill>
+                  <a:schemeClr val="tx1"/>
+                </a:solidFill>
+              </a:rPr>
+              <a:t>và</a:t>
+            </a:r>
+            <a:r>
+              <a:rPr lang="en-US" dirty="0">
+                <a:solidFill>
+                  <a:schemeClr val="tx1"/>
+                </a:solidFill>
+              </a:rPr>
+              <a:t> 1 </a:t>
+            </a:r>
+            <a:r>
+              <a:rPr lang="en-US" dirty="0" err="1">
+                <a:solidFill>
+                  <a:schemeClr val="tx1"/>
+                </a:solidFill>
+              </a:rPr>
+              <a:t>từ</a:t>
+            </a:r>
+            <a:r>
+              <a:rPr lang="en-US" dirty="0">
+                <a:solidFill>
+                  <a:schemeClr val="tx1"/>
+                </a:solidFill>
+              </a:rPr>
+              <a:t> </a:t>
+            </a:r>
+            <a:r>
+              <a:rPr lang="en-US" dirty="0" err="1">
+                <a:solidFill>
+                  <a:schemeClr val="tx1"/>
+                </a:solidFill>
+              </a:rPr>
+              <a:t>khóa</a:t>
+            </a:r>
+            <a:r>
+              <a:rPr lang="en-US" dirty="0">
+                <a:solidFill>
+                  <a:schemeClr val="tx1"/>
+                </a:solidFill>
+              </a:rPr>
+              <a:t> ELSE </a:t>
+            </a:r>
+            <a:r>
+              <a:rPr lang="en-US" dirty="0" err="1">
+                <a:solidFill>
+                  <a:schemeClr val="tx1"/>
+                </a:solidFill>
+              </a:rPr>
+              <a:t>thì</a:t>
+            </a:r>
+            <a:r>
+              <a:rPr lang="en-US" dirty="0">
+                <a:solidFill>
+                  <a:schemeClr val="tx1"/>
+                </a:solidFill>
+              </a:rPr>
+              <a:t> </a:t>
+            </a:r>
+            <a:r>
+              <a:rPr lang="en-US" dirty="0" err="1">
+                <a:solidFill>
+                  <a:schemeClr val="tx1"/>
+                </a:solidFill>
+              </a:rPr>
+              <a:t>từ</a:t>
+            </a:r>
+            <a:r>
+              <a:rPr lang="en-US" dirty="0">
+                <a:solidFill>
+                  <a:schemeClr val="tx1"/>
+                </a:solidFill>
+              </a:rPr>
+              <a:t> </a:t>
+            </a:r>
+            <a:r>
+              <a:rPr lang="en-US" dirty="0" err="1">
+                <a:solidFill>
+                  <a:schemeClr val="tx1"/>
+                </a:solidFill>
+              </a:rPr>
+              <a:t>khóa</a:t>
+            </a:r>
+            <a:r>
+              <a:rPr lang="en-US" dirty="0">
+                <a:solidFill>
+                  <a:schemeClr val="tx1"/>
+                </a:solidFill>
+              </a:rPr>
+              <a:t> ELSE </a:t>
+            </a:r>
+            <a:r>
+              <a:rPr lang="en-US" dirty="0" err="1">
+                <a:solidFill>
+                  <a:schemeClr val="tx1"/>
+                </a:solidFill>
+              </a:rPr>
+              <a:t>sẽ</a:t>
+            </a:r>
+            <a:r>
+              <a:rPr lang="en-US" dirty="0">
+                <a:solidFill>
+                  <a:schemeClr val="tx1"/>
+                </a:solidFill>
+              </a:rPr>
+              <a:t> </a:t>
+            </a:r>
+            <a:r>
+              <a:rPr lang="en-US" dirty="0" err="1">
+                <a:solidFill>
+                  <a:schemeClr val="tx1"/>
+                </a:solidFill>
+              </a:rPr>
+              <a:t>là</a:t>
+            </a:r>
+            <a:r>
+              <a:rPr lang="en-US" dirty="0">
+                <a:solidFill>
+                  <a:schemeClr val="tx1"/>
+                </a:solidFill>
+              </a:rPr>
+              <a:t> </a:t>
+            </a:r>
+            <a:r>
+              <a:rPr lang="en-US" dirty="0" err="1">
+                <a:solidFill>
+                  <a:schemeClr val="tx1"/>
+                </a:solidFill>
+              </a:rPr>
+              <a:t>của</a:t>
+            </a:r>
+            <a:r>
+              <a:rPr lang="en-US" dirty="0">
+                <a:solidFill>
+                  <a:schemeClr val="tx1"/>
+                </a:solidFill>
+              </a:rPr>
+              <a:t> </a:t>
+            </a:r>
+            <a:r>
+              <a:rPr lang="en-US" dirty="0" err="1">
+                <a:solidFill>
+                  <a:schemeClr val="tx1"/>
+                </a:solidFill>
+              </a:rPr>
+              <a:t>hàm</a:t>
+            </a:r>
+            <a:r>
+              <a:rPr lang="en-US" dirty="0">
+                <a:solidFill>
+                  <a:schemeClr val="tx1"/>
+                </a:solidFill>
+              </a:rPr>
+              <a:t> IF </a:t>
+            </a:r>
+            <a:r>
+              <a:rPr lang="en-US" dirty="0" err="1">
+                <a:solidFill>
+                  <a:schemeClr val="tx1"/>
+                </a:solidFill>
+              </a:rPr>
+              <a:t>trong</a:t>
+            </a:r>
+            <a:r>
+              <a:rPr lang="en-US" dirty="0">
+                <a:solidFill>
+                  <a:schemeClr val="tx1"/>
+                </a:solidFill>
+              </a:rPr>
+              <a:t> </a:t>
+            </a:r>
+            <a:r>
+              <a:rPr lang="en-US" dirty="0" err="1">
+                <a:solidFill>
+                  <a:schemeClr val="tx1"/>
+                </a:solidFill>
+              </a:rPr>
+              <a:t>cùng</a:t>
+            </a:r>
+            <a:r>
+              <a:rPr lang="en-US" dirty="0">
+                <a:solidFill>
+                  <a:schemeClr val="tx1"/>
+                </a:solidFill>
+              </a:rPr>
+              <a:t>.</a:t>
+            </a:r>
+          </a:p>
+        </p:txBody>
+      </p:sp>
+      <p:pic>
+        <p:nvPicPr>
+          <p:cNvPr id="13" name="Picture 12">
+            <a:extLst>
+              <a:ext uri="{FF2B5EF4-FFF2-40B4-BE49-F238E27FC236}">
+                <a16:creationId xmlns:a16="http://schemas.microsoft.com/office/drawing/2014/main" id="{C7B5BF98-9B33-4E7B-9AAF-5FE3D8AA6B68}"/>
+              </a:ext>
+            </a:extLst>
+          </p:cNvPr>
+          <p:cNvPicPr>
+            <a:picLocks noChangeAspect="1"/>
+          </p:cNvPicPr>
+          <p:nvPr/>
+        </p:nvPicPr>
+        <p:blipFill>
+          <a:blip r:embed="rId2">
+            <a:extLst>
+              <a:ext uri="{28A0092B-C50C-407E-A947-70E740481C1C}">
+                <a14:useLocalDpi xmlns:a14="http://schemas.microsoft.com/office/drawing/2010/main" val="0"/>
+              </a:ext>
+            </a:extLst>
+          </a:blip>
+          <a:stretch>
+            <a:fillRect/>
+          </a:stretch>
+        </p:blipFill>
+        <p:spPr>
+          <a:xfrm>
+            <a:off x="1867532" y="5119777"/>
+            <a:ext cx="6647818" cy="784045"/>
+          </a:xfrm>
+          <a:prstGeom prst="rect">
+            <a:avLst/>
+          </a:prstGeom>
+        </p:spPr>
+      </p:pic>
+      <p:pic>
+        <p:nvPicPr>
+          <p:cNvPr id="15" name="Picture 14" descr="A screenshot of a cell phone&#10;&#10;Description generated with very high confidence">
+            <a:extLst>
+              <a:ext uri="{FF2B5EF4-FFF2-40B4-BE49-F238E27FC236}">
+                <a16:creationId xmlns:a16="http://schemas.microsoft.com/office/drawing/2014/main" id="{65C5D60E-28F2-4DA9-9547-747FD23EEA18}"/>
+              </a:ext>
+            </a:extLst>
+          </p:cNvPr>
+          <p:cNvPicPr>
+            <a:picLocks noChangeAspect="1"/>
+          </p:cNvPicPr>
+          <p:nvPr/>
+        </p:nvPicPr>
+        <p:blipFill>
+          <a:blip r:embed="rId3">
+            <a:extLst>
+              <a:ext uri="{28A0092B-C50C-407E-A947-70E740481C1C}">
+                <a14:useLocalDpi xmlns:a14="http://schemas.microsoft.com/office/drawing/2010/main" val="0"/>
+              </a:ext>
+            </a:extLst>
+          </a:blip>
+          <a:stretch>
+            <a:fillRect/>
+          </a:stretch>
+        </p:blipFill>
+        <p:spPr>
+          <a:xfrm>
+            <a:off x="5508185" y="2192784"/>
+            <a:ext cx="3224778" cy="1723711"/>
+          </a:xfrm>
+          <a:prstGeom prst="rect">
+            <a:avLst/>
+          </a:prstGeom>
+        </p:spPr>
+      </p:pic>
+    </p:spTree>
+    <p:extLst>
+      <p:ext uri="{BB962C8B-B14F-4D97-AF65-F5344CB8AC3E}">
+        <p14:creationId xmlns:p14="http://schemas.microsoft.com/office/powerpoint/2010/main" val="2151030403"/>
+      </p:ext>
+    </p:extLst>
+  </p:cSld>
+  <p:clrMapOvr>
+    <a:masterClrMapping/>
+  </p:clrMapOvr>
+</p:sld>
+</file>
+
+<file path=ppt/slides/slide21.xml><?xml version="1.0" encoding="utf-8"?>
+<p:sld xmlns:a="http://schemas.openxmlformats.org/drawingml/2006/main" xmlns:r="http://schemas.openxmlformats.org/officeDocument/2006/relationships" xmlns:p="http://schemas.openxmlformats.org/presentationml/2006/main">
+  <p:cSld>
+    <p:spTree>
+      <p:nvGrpSpPr>
+        <p:cNvPr id="1" name=""/>
+        <p:cNvGrpSpPr/>
+        <p:nvPr/>
+      </p:nvGrpSpPr>
+      <p:grpSpPr>
+        <a:xfrm>
+          <a:off x="0" y="0"/>
+          <a:ext cx="0" cy="0"/>
+          <a:chOff x="0" y="0"/>
+          <a:chExt cx="0" cy="0"/>
+        </a:xfrm>
+      </p:grpSpPr>
+      <p:sp>
+        <p:nvSpPr>
+          <p:cNvPr id="2" name="Title 1">
+            <a:extLst>
+              <a:ext uri="{FF2B5EF4-FFF2-40B4-BE49-F238E27FC236}">
+                <a16:creationId xmlns:a16="http://schemas.microsoft.com/office/drawing/2014/main" id="{5ACC0826-E80F-43C0-912C-275EB710142B}"/>
+              </a:ext>
+            </a:extLst>
+          </p:cNvPr>
+          <p:cNvSpPr>
+            <a:spLocks noGrp="1"/>
+          </p:cNvSpPr>
+          <p:nvPr>
+            <p:ph type="title"/>
+          </p:nvPr>
+        </p:nvSpPr>
+        <p:spPr/>
+        <p:txBody>
+          <a:bodyPr/>
+          <a:lstStyle/>
+          <a:p>
+            <a:r>
+              <a:rPr lang="en-US"/>
+              <a:t>Những hàm xét tập FOLLOW</a:t>
             </a:r>
             <a:endParaRPr lang="en-US" dirty="0"/>
           </a:p>
@@ -4703,10 +6019,1690 @@
           <a:bodyPr/>
           <a:lstStyle/>
           <a:p>
-            <a:endParaRPr lang="vi-VN"/>
-          </a:p>
-        </p:txBody>
-      </p:sp>
+            <a:r>
+              <a:rPr lang="en-US" dirty="0" err="1">
+                <a:solidFill>
+                  <a:schemeClr val="tx1"/>
+                </a:solidFill>
+              </a:rPr>
+              <a:t>Các</a:t>
+            </a:r>
+            <a:r>
+              <a:rPr lang="en-US" dirty="0">
+                <a:solidFill>
+                  <a:schemeClr val="tx1"/>
+                </a:solidFill>
+              </a:rPr>
+              <a:t> </a:t>
+            </a:r>
+            <a:r>
+              <a:rPr lang="en-US" dirty="0" err="1">
+                <a:solidFill>
+                  <a:schemeClr val="tx1"/>
+                </a:solidFill>
+              </a:rPr>
+              <a:t>hàm</a:t>
+            </a:r>
+            <a:r>
+              <a:rPr lang="en-US" dirty="0">
+                <a:solidFill>
+                  <a:schemeClr val="tx1"/>
+                </a:solidFill>
+              </a:rPr>
+              <a:t> </a:t>
+            </a:r>
+            <a:r>
+              <a:rPr lang="en-US" dirty="0" err="1">
+                <a:solidFill>
+                  <a:schemeClr val="tx1"/>
+                </a:solidFill>
+              </a:rPr>
+              <a:t>cần</a:t>
+            </a:r>
+            <a:r>
+              <a:rPr lang="en-US" dirty="0">
+                <a:solidFill>
+                  <a:schemeClr val="tx1"/>
+                </a:solidFill>
+              </a:rPr>
+              <a:t> </a:t>
+            </a:r>
+            <a:r>
+              <a:rPr lang="en-US" dirty="0" err="1">
+                <a:solidFill>
+                  <a:schemeClr val="tx1"/>
+                </a:solidFill>
+              </a:rPr>
+              <a:t>tính</a:t>
+            </a:r>
+            <a:r>
+              <a:rPr lang="en-US" dirty="0">
+                <a:solidFill>
+                  <a:schemeClr val="tx1"/>
+                </a:solidFill>
+              </a:rPr>
+              <a:t> </a:t>
+            </a:r>
+            <a:r>
+              <a:rPr lang="en-US" dirty="0" err="1">
+                <a:solidFill>
+                  <a:schemeClr val="tx1"/>
+                </a:solidFill>
+              </a:rPr>
+              <a:t>tập</a:t>
+            </a:r>
+            <a:r>
+              <a:rPr lang="en-US" dirty="0">
+                <a:solidFill>
+                  <a:schemeClr val="tx1"/>
+                </a:solidFill>
+              </a:rPr>
+              <a:t> Follow:</a:t>
+            </a:r>
+          </a:p>
+          <a:p>
+            <a:pPr lvl="1"/>
+            <a:r>
+              <a:rPr lang="en-US" dirty="0" err="1">
+                <a:solidFill>
+                  <a:schemeClr val="tx1"/>
+                </a:solidFill>
+              </a:rPr>
+              <a:t>compileStatement</a:t>
+            </a:r>
+            <a:endParaRPr lang="en-US" dirty="0">
+              <a:solidFill>
+                <a:schemeClr val="tx1"/>
+              </a:solidFill>
+            </a:endParaRPr>
+          </a:p>
+          <a:p>
+            <a:pPr lvl="1"/>
+            <a:r>
+              <a:rPr lang="en-US" dirty="0">
+                <a:solidFill>
+                  <a:schemeClr val="tx1"/>
+                </a:solidFill>
+              </a:rPr>
+              <a:t>compileStatement2</a:t>
+            </a:r>
+          </a:p>
+          <a:p>
+            <a:pPr lvl="1"/>
+            <a:r>
+              <a:rPr lang="en-US" dirty="0">
+                <a:solidFill>
+                  <a:schemeClr val="tx1"/>
+                </a:solidFill>
+              </a:rPr>
+              <a:t>compileTerm2</a:t>
+            </a:r>
+          </a:p>
+          <a:p>
+            <a:pPr lvl="1"/>
+            <a:r>
+              <a:rPr lang="en-US" dirty="0">
+                <a:solidFill>
+                  <a:schemeClr val="tx1"/>
+                </a:solidFill>
+              </a:rPr>
+              <a:t>compileExpression3</a:t>
+            </a:r>
+          </a:p>
+          <a:p>
+            <a:pPr lvl="1"/>
+            <a:r>
+              <a:rPr lang="en-US" dirty="0" err="1">
+                <a:solidFill>
+                  <a:schemeClr val="tx1"/>
+                </a:solidFill>
+              </a:rPr>
+              <a:t>compileArguments</a:t>
+            </a:r>
+            <a:endParaRPr lang="en-US" dirty="0">
+              <a:solidFill>
+                <a:schemeClr val="tx1"/>
+              </a:solidFill>
+            </a:endParaRPr>
+          </a:p>
+          <a:p>
+            <a:pPr lvl="1"/>
+            <a:r>
+              <a:rPr lang="en-US" dirty="0">
+                <a:solidFill>
+                  <a:schemeClr val="tx1"/>
+                </a:solidFill>
+              </a:rPr>
+              <a:t>compileArguments2</a:t>
+            </a:r>
+          </a:p>
+          <a:p>
+            <a:pPr marL="342900" lvl="1" indent="0">
+              <a:buNone/>
+            </a:pPr>
+            <a:endParaRPr lang="en-US" dirty="0">
+              <a:solidFill>
+                <a:schemeClr val="tx1"/>
+              </a:solidFill>
+            </a:endParaRPr>
+          </a:p>
+          <a:p>
+            <a:r>
+              <a:rPr lang="en-US" dirty="0" err="1">
+                <a:solidFill>
+                  <a:schemeClr val="tx1"/>
+                </a:solidFill>
+              </a:rPr>
+              <a:t>Trong</a:t>
+            </a:r>
+            <a:r>
+              <a:rPr lang="en-US" dirty="0">
+                <a:solidFill>
+                  <a:schemeClr val="tx1"/>
+                </a:solidFill>
+              </a:rPr>
+              <a:t> tr</a:t>
+            </a:r>
+            <a:r>
+              <a:rPr lang="vi-VN" dirty="0">
+                <a:solidFill>
+                  <a:schemeClr val="tx1"/>
+                </a:solidFill>
+              </a:rPr>
+              <a:t>ư</a:t>
+            </a:r>
+            <a:r>
+              <a:rPr lang="en-US" dirty="0" err="1">
+                <a:solidFill>
+                  <a:schemeClr val="tx1"/>
+                </a:solidFill>
+              </a:rPr>
+              <a:t>ờng</a:t>
+            </a:r>
+            <a:r>
+              <a:rPr lang="en-US" dirty="0">
+                <a:solidFill>
+                  <a:schemeClr val="tx1"/>
+                </a:solidFill>
+              </a:rPr>
+              <a:t> </a:t>
+            </a:r>
+            <a:r>
+              <a:rPr lang="en-US" dirty="0" err="1">
+                <a:solidFill>
+                  <a:schemeClr val="tx1"/>
+                </a:solidFill>
+              </a:rPr>
+              <a:t>hợp</a:t>
+            </a:r>
+            <a:r>
+              <a:rPr lang="en-US" dirty="0">
+                <a:solidFill>
+                  <a:schemeClr val="tx1"/>
+                </a:solidFill>
+              </a:rPr>
+              <a:t> </a:t>
+            </a:r>
+            <a:r>
+              <a:rPr lang="en-US" dirty="0" err="1">
+                <a:solidFill>
+                  <a:schemeClr val="tx1"/>
+                </a:solidFill>
+              </a:rPr>
+              <a:t>từ</a:t>
+            </a:r>
+            <a:r>
+              <a:rPr lang="en-US" dirty="0">
+                <a:solidFill>
+                  <a:schemeClr val="tx1"/>
+                </a:solidFill>
+              </a:rPr>
+              <a:t> </a:t>
+            </a:r>
+            <a:r>
+              <a:rPr lang="en-US" dirty="0" err="1">
+                <a:solidFill>
+                  <a:schemeClr val="tx1"/>
+                </a:solidFill>
+              </a:rPr>
+              <a:t>tố</a:t>
+            </a:r>
+            <a:r>
+              <a:rPr lang="en-US" dirty="0">
+                <a:solidFill>
+                  <a:schemeClr val="tx1"/>
+                </a:solidFill>
+              </a:rPr>
+              <a:t> </a:t>
+            </a:r>
+            <a:r>
+              <a:rPr lang="en-US" dirty="0" err="1">
+                <a:solidFill>
+                  <a:schemeClr val="tx1"/>
+                </a:solidFill>
+              </a:rPr>
+              <a:t>kiểm</a:t>
+            </a:r>
+            <a:r>
+              <a:rPr lang="en-US" dirty="0">
+                <a:solidFill>
+                  <a:schemeClr val="tx1"/>
+                </a:solidFill>
+              </a:rPr>
+              <a:t> </a:t>
+            </a:r>
+            <a:r>
+              <a:rPr lang="en-US" dirty="0" err="1">
+                <a:solidFill>
+                  <a:schemeClr val="tx1"/>
+                </a:solidFill>
+              </a:rPr>
+              <a:t>tra</a:t>
+            </a:r>
+            <a:r>
+              <a:rPr lang="en-US" dirty="0">
+                <a:solidFill>
+                  <a:schemeClr val="tx1"/>
+                </a:solidFill>
+              </a:rPr>
+              <a:t> </a:t>
+            </a:r>
+            <a:r>
+              <a:rPr lang="en-US" dirty="0" err="1">
+                <a:solidFill>
+                  <a:schemeClr val="tx1"/>
+                </a:solidFill>
+              </a:rPr>
+              <a:t>không</a:t>
+            </a:r>
+            <a:r>
+              <a:rPr lang="en-US" dirty="0">
+                <a:solidFill>
+                  <a:schemeClr val="tx1"/>
+                </a:solidFill>
+              </a:rPr>
+              <a:t> </a:t>
+            </a:r>
+            <a:r>
+              <a:rPr lang="en-US" dirty="0" err="1">
+                <a:solidFill>
+                  <a:schemeClr val="tx1"/>
+                </a:solidFill>
+              </a:rPr>
+              <a:t>là</a:t>
+            </a:r>
+            <a:r>
+              <a:rPr lang="en-US" dirty="0">
+                <a:solidFill>
+                  <a:schemeClr val="tx1"/>
+                </a:solidFill>
+              </a:rPr>
+              <a:t> </a:t>
+            </a:r>
+            <a:r>
+              <a:rPr lang="en-US" dirty="0" err="1">
+                <a:solidFill>
+                  <a:schemeClr val="tx1"/>
+                </a:solidFill>
+              </a:rPr>
+              <a:t>từ</a:t>
+            </a:r>
+            <a:r>
+              <a:rPr lang="en-US" dirty="0">
+                <a:solidFill>
+                  <a:schemeClr val="tx1"/>
+                </a:solidFill>
+              </a:rPr>
+              <a:t> </a:t>
+            </a:r>
+            <a:r>
+              <a:rPr lang="en-US" dirty="0" err="1">
+                <a:solidFill>
+                  <a:schemeClr val="tx1"/>
+                </a:solidFill>
+              </a:rPr>
+              <a:t>tố</a:t>
+            </a:r>
+            <a:r>
+              <a:rPr lang="en-US" dirty="0">
+                <a:solidFill>
+                  <a:schemeClr val="tx1"/>
+                </a:solidFill>
+              </a:rPr>
+              <a:t> </a:t>
+            </a:r>
+            <a:r>
+              <a:rPr lang="en-US" dirty="0" err="1">
+                <a:solidFill>
+                  <a:schemeClr val="tx1"/>
+                </a:solidFill>
+              </a:rPr>
+              <a:t>đầu</a:t>
+            </a:r>
+            <a:r>
+              <a:rPr lang="en-US" dirty="0">
+                <a:solidFill>
+                  <a:schemeClr val="tx1"/>
+                </a:solidFill>
+              </a:rPr>
+              <a:t> </a:t>
+            </a:r>
+            <a:r>
+              <a:rPr lang="en-US" dirty="0" err="1">
+                <a:solidFill>
+                  <a:schemeClr val="tx1"/>
+                </a:solidFill>
+              </a:rPr>
+              <a:t>tiên</a:t>
+            </a:r>
+            <a:r>
+              <a:rPr lang="en-US" dirty="0">
+                <a:solidFill>
+                  <a:schemeClr val="tx1"/>
+                </a:solidFill>
+              </a:rPr>
+              <a:t> </a:t>
+            </a:r>
+            <a:r>
+              <a:rPr lang="en-US" dirty="0" err="1">
+                <a:solidFill>
+                  <a:schemeClr val="tx1"/>
+                </a:solidFill>
+              </a:rPr>
+              <a:t>của</a:t>
+            </a:r>
+            <a:r>
+              <a:rPr lang="en-US" dirty="0">
+                <a:solidFill>
+                  <a:schemeClr val="tx1"/>
+                </a:solidFill>
+              </a:rPr>
+              <a:t> </a:t>
+            </a:r>
+            <a:r>
+              <a:rPr lang="en-US" dirty="0" err="1">
+                <a:solidFill>
+                  <a:schemeClr val="tx1"/>
+                </a:solidFill>
+              </a:rPr>
+              <a:t>nhánh</a:t>
+            </a:r>
+            <a:r>
+              <a:rPr lang="en-US" dirty="0">
+                <a:solidFill>
+                  <a:schemeClr val="tx1"/>
+                </a:solidFill>
+              </a:rPr>
+              <a:t> </a:t>
+            </a:r>
+            <a:r>
+              <a:rPr lang="en-US" dirty="0" err="1">
+                <a:solidFill>
+                  <a:schemeClr val="tx1"/>
+                </a:solidFill>
+              </a:rPr>
+              <a:t>nào</a:t>
+            </a:r>
+            <a:r>
+              <a:rPr lang="en-US" dirty="0">
+                <a:solidFill>
+                  <a:schemeClr val="tx1"/>
+                </a:solidFill>
+              </a:rPr>
+              <a:t>. </a:t>
+            </a:r>
+            <a:r>
+              <a:rPr lang="en-US" dirty="0" err="1">
+                <a:solidFill>
+                  <a:schemeClr val="tx1"/>
+                </a:solidFill>
+              </a:rPr>
+              <a:t>Chúng</a:t>
+            </a:r>
+            <a:r>
+              <a:rPr lang="en-US" dirty="0">
+                <a:solidFill>
+                  <a:schemeClr val="tx1"/>
+                </a:solidFill>
+              </a:rPr>
+              <a:t> ta </a:t>
+            </a:r>
+            <a:r>
+              <a:rPr lang="en-US" dirty="0" err="1">
+                <a:solidFill>
+                  <a:schemeClr val="tx1"/>
+                </a:solidFill>
+              </a:rPr>
+              <a:t>không</a:t>
+            </a:r>
+            <a:r>
+              <a:rPr lang="en-US" dirty="0">
+                <a:solidFill>
+                  <a:schemeClr val="tx1"/>
+                </a:solidFill>
+              </a:rPr>
+              <a:t> </a:t>
+            </a:r>
+            <a:r>
+              <a:rPr lang="en-US" dirty="0" err="1">
+                <a:solidFill>
+                  <a:schemeClr val="tx1"/>
+                </a:solidFill>
+              </a:rPr>
+              <a:t>thể</a:t>
+            </a:r>
+            <a:r>
+              <a:rPr lang="en-US" dirty="0">
+                <a:solidFill>
+                  <a:schemeClr val="tx1"/>
+                </a:solidFill>
+              </a:rPr>
+              <a:t> </a:t>
+            </a:r>
+            <a:r>
+              <a:rPr lang="en-US" dirty="0" err="1">
+                <a:solidFill>
+                  <a:schemeClr val="tx1"/>
+                </a:solidFill>
+              </a:rPr>
+              <a:t>kết</a:t>
+            </a:r>
+            <a:r>
+              <a:rPr lang="en-US" dirty="0">
+                <a:solidFill>
+                  <a:schemeClr val="tx1"/>
+                </a:solidFill>
+              </a:rPr>
+              <a:t> </a:t>
+            </a:r>
+            <a:r>
+              <a:rPr lang="en-US" dirty="0" err="1">
+                <a:solidFill>
+                  <a:schemeClr val="tx1"/>
+                </a:solidFill>
+              </a:rPr>
+              <a:t>luận</a:t>
+            </a:r>
+            <a:r>
+              <a:rPr lang="en-US" dirty="0">
+                <a:solidFill>
+                  <a:schemeClr val="tx1"/>
+                </a:solidFill>
+              </a:rPr>
+              <a:t> </a:t>
+            </a:r>
+            <a:r>
+              <a:rPr lang="en-US" dirty="0" err="1">
+                <a:solidFill>
+                  <a:schemeClr val="tx1"/>
+                </a:solidFill>
+              </a:rPr>
+              <a:t>ch</a:t>
+            </a:r>
+            <a:r>
+              <a:rPr lang="vi-VN" dirty="0">
+                <a:solidFill>
+                  <a:schemeClr val="tx1"/>
+                </a:solidFill>
+              </a:rPr>
+              <a:t>ư</a:t>
+            </a:r>
+            <a:r>
+              <a:rPr lang="en-US" dirty="0" err="1">
+                <a:solidFill>
+                  <a:schemeClr val="tx1"/>
+                </a:solidFill>
+              </a:rPr>
+              <a:t>ơng</a:t>
+            </a:r>
+            <a:r>
+              <a:rPr lang="en-US" dirty="0">
+                <a:solidFill>
+                  <a:schemeClr val="tx1"/>
+                </a:solidFill>
+              </a:rPr>
+              <a:t> </a:t>
+            </a:r>
+            <a:r>
+              <a:rPr lang="en-US" dirty="0" err="1">
+                <a:solidFill>
+                  <a:schemeClr val="tx1"/>
+                </a:solidFill>
+              </a:rPr>
+              <a:t>trình</a:t>
+            </a:r>
+            <a:r>
+              <a:rPr lang="en-US" dirty="0">
+                <a:solidFill>
+                  <a:schemeClr val="tx1"/>
+                </a:solidFill>
+              </a:rPr>
+              <a:t> </a:t>
+            </a:r>
+            <a:r>
+              <a:rPr lang="en-US" dirty="0" err="1">
+                <a:solidFill>
+                  <a:schemeClr val="tx1"/>
+                </a:solidFill>
+              </a:rPr>
+              <a:t>sai</a:t>
+            </a:r>
+            <a:r>
+              <a:rPr lang="en-US" dirty="0">
+                <a:solidFill>
+                  <a:schemeClr val="tx1"/>
+                </a:solidFill>
+              </a:rPr>
+              <a:t> </a:t>
+            </a:r>
+            <a:r>
+              <a:rPr lang="en-US" dirty="0" err="1">
+                <a:solidFill>
+                  <a:schemeClr val="tx1"/>
+                </a:solidFill>
+              </a:rPr>
+              <a:t>cú</a:t>
+            </a:r>
+            <a:r>
+              <a:rPr lang="en-US" dirty="0">
+                <a:solidFill>
+                  <a:schemeClr val="tx1"/>
+                </a:solidFill>
+              </a:rPr>
+              <a:t> </a:t>
+            </a:r>
+            <a:r>
+              <a:rPr lang="en-US" dirty="0" err="1">
+                <a:solidFill>
+                  <a:schemeClr val="tx1"/>
+                </a:solidFill>
+              </a:rPr>
+              <a:t>pháp</a:t>
+            </a:r>
+            <a:r>
+              <a:rPr lang="en-US" dirty="0">
+                <a:solidFill>
+                  <a:schemeClr val="tx1"/>
+                </a:solidFill>
+              </a:rPr>
+              <a:t>.</a:t>
+            </a:r>
+          </a:p>
+          <a:p>
+            <a:r>
+              <a:rPr lang="en-US" dirty="0" err="1">
+                <a:solidFill>
+                  <a:schemeClr val="tx1"/>
+                </a:solidFill>
+              </a:rPr>
+              <a:t>Vì</a:t>
+            </a:r>
+            <a:r>
+              <a:rPr lang="en-US" dirty="0">
+                <a:solidFill>
+                  <a:schemeClr val="tx1"/>
+                </a:solidFill>
+              </a:rPr>
+              <a:t> </a:t>
+            </a:r>
+            <a:r>
+              <a:rPr lang="en-US" dirty="0" err="1">
+                <a:solidFill>
+                  <a:schemeClr val="tx1"/>
+                </a:solidFill>
+              </a:rPr>
+              <a:t>các</a:t>
+            </a:r>
+            <a:r>
+              <a:rPr lang="en-US" dirty="0">
+                <a:solidFill>
+                  <a:schemeClr val="tx1"/>
+                </a:solidFill>
+              </a:rPr>
+              <a:t> </a:t>
+            </a:r>
+            <a:r>
+              <a:rPr lang="en-US" dirty="0" err="1">
+                <a:solidFill>
+                  <a:schemeClr val="tx1"/>
+                </a:solidFill>
+              </a:rPr>
+              <a:t>hàm</a:t>
+            </a:r>
+            <a:r>
+              <a:rPr lang="en-US" dirty="0">
+                <a:solidFill>
+                  <a:schemeClr val="tx1"/>
+                </a:solidFill>
+              </a:rPr>
+              <a:t> </a:t>
+            </a:r>
+            <a:r>
+              <a:rPr lang="en-US" dirty="0" err="1">
+                <a:solidFill>
+                  <a:schemeClr val="tx1"/>
+                </a:solidFill>
+              </a:rPr>
+              <a:t>đó</a:t>
+            </a:r>
+            <a:r>
+              <a:rPr lang="en-US" dirty="0">
+                <a:solidFill>
+                  <a:schemeClr val="tx1"/>
+                </a:solidFill>
+              </a:rPr>
+              <a:t> </a:t>
+            </a:r>
+            <a:r>
+              <a:rPr lang="en-US" dirty="0" err="1">
+                <a:solidFill>
+                  <a:schemeClr val="tx1"/>
+                </a:solidFill>
+              </a:rPr>
+              <a:t>có</a:t>
+            </a:r>
+            <a:r>
+              <a:rPr lang="en-US" dirty="0">
+                <a:solidFill>
+                  <a:schemeClr val="tx1"/>
+                </a:solidFill>
+              </a:rPr>
+              <a:t> </a:t>
+            </a:r>
+            <a:r>
+              <a:rPr lang="en-US" dirty="0" err="1">
+                <a:solidFill>
+                  <a:schemeClr val="tx1"/>
+                </a:solidFill>
+              </a:rPr>
+              <a:t>thể</a:t>
+            </a:r>
+            <a:r>
+              <a:rPr lang="en-US" dirty="0">
+                <a:solidFill>
+                  <a:schemeClr val="tx1"/>
+                </a:solidFill>
+              </a:rPr>
+              <a:t> </a:t>
+            </a:r>
+            <a:r>
+              <a:rPr lang="en-US" dirty="0" err="1">
+                <a:solidFill>
+                  <a:schemeClr val="tx1"/>
+                </a:solidFill>
+              </a:rPr>
+              <a:t>là</a:t>
+            </a:r>
+            <a:r>
+              <a:rPr lang="en-US" dirty="0">
+                <a:solidFill>
+                  <a:schemeClr val="tx1"/>
+                </a:solidFill>
+              </a:rPr>
+              <a:t> </a:t>
+            </a:r>
+            <a:r>
+              <a:rPr lang="en-US" dirty="0" err="1">
+                <a:solidFill>
+                  <a:schemeClr val="tx1"/>
+                </a:solidFill>
+              </a:rPr>
+              <a:t>rỗng</a:t>
+            </a:r>
+            <a:r>
+              <a:rPr lang="en-US" dirty="0">
+                <a:solidFill>
+                  <a:schemeClr val="tx1"/>
+                </a:solidFill>
+              </a:rPr>
+              <a:t>. Ta </a:t>
+            </a:r>
+            <a:r>
+              <a:rPr lang="en-US" dirty="0" err="1">
+                <a:solidFill>
+                  <a:schemeClr val="tx1"/>
+                </a:solidFill>
+              </a:rPr>
+              <a:t>cần</a:t>
+            </a:r>
+            <a:r>
+              <a:rPr lang="en-US" dirty="0">
+                <a:solidFill>
+                  <a:schemeClr val="tx1"/>
+                </a:solidFill>
+              </a:rPr>
+              <a:t> </a:t>
+            </a:r>
+            <a:r>
+              <a:rPr lang="en-US" dirty="0" err="1">
+                <a:solidFill>
+                  <a:schemeClr val="tx1"/>
+                </a:solidFill>
+              </a:rPr>
+              <a:t>xét</a:t>
+            </a:r>
+            <a:r>
+              <a:rPr lang="en-US" dirty="0">
+                <a:solidFill>
+                  <a:schemeClr val="tx1"/>
+                </a:solidFill>
+              </a:rPr>
+              <a:t> </a:t>
+            </a:r>
+            <a:r>
+              <a:rPr lang="en-US" dirty="0" err="1">
+                <a:solidFill>
+                  <a:schemeClr val="tx1"/>
+                </a:solidFill>
+              </a:rPr>
+              <a:t>các</a:t>
+            </a:r>
+            <a:r>
+              <a:rPr lang="en-US" dirty="0">
+                <a:solidFill>
+                  <a:schemeClr val="tx1"/>
+                </a:solidFill>
+              </a:rPr>
+              <a:t> Follow </a:t>
+            </a:r>
+            <a:r>
+              <a:rPr lang="en-US" dirty="0" err="1">
+                <a:solidFill>
+                  <a:schemeClr val="tx1"/>
+                </a:solidFill>
+              </a:rPr>
+              <a:t>của</a:t>
+            </a:r>
+            <a:r>
+              <a:rPr lang="en-US" dirty="0">
+                <a:solidFill>
+                  <a:schemeClr val="tx1"/>
+                </a:solidFill>
+              </a:rPr>
+              <a:t> </a:t>
+            </a:r>
+            <a:r>
+              <a:rPr lang="en-US" dirty="0" err="1">
+                <a:solidFill>
+                  <a:schemeClr val="tx1"/>
+                </a:solidFill>
+              </a:rPr>
+              <a:t>hàm</a:t>
+            </a:r>
+            <a:r>
+              <a:rPr lang="en-US" dirty="0">
+                <a:solidFill>
+                  <a:schemeClr val="tx1"/>
+                </a:solidFill>
+              </a:rPr>
+              <a:t> </a:t>
+            </a:r>
+            <a:r>
+              <a:rPr lang="en-US" dirty="0" err="1">
+                <a:solidFill>
+                  <a:schemeClr val="tx1"/>
+                </a:solidFill>
+              </a:rPr>
+              <a:t>đó</a:t>
+            </a:r>
+            <a:r>
+              <a:rPr lang="en-US" dirty="0">
+                <a:solidFill>
+                  <a:schemeClr val="tx1"/>
+                </a:solidFill>
+              </a:rPr>
+              <a:t>. </a:t>
+            </a:r>
+            <a:r>
+              <a:rPr lang="en-US" dirty="0" err="1">
+                <a:solidFill>
+                  <a:schemeClr val="tx1"/>
+                </a:solidFill>
+              </a:rPr>
+              <a:t>Nếu</a:t>
+            </a:r>
+            <a:r>
+              <a:rPr lang="en-US" dirty="0">
+                <a:solidFill>
+                  <a:schemeClr val="tx1"/>
+                </a:solidFill>
+              </a:rPr>
+              <a:t> </a:t>
+            </a:r>
+            <a:r>
+              <a:rPr lang="en-US" dirty="0" err="1">
+                <a:solidFill>
+                  <a:schemeClr val="tx1"/>
+                </a:solidFill>
+              </a:rPr>
+              <a:t>từ</a:t>
+            </a:r>
+            <a:r>
+              <a:rPr lang="en-US" dirty="0">
+                <a:solidFill>
+                  <a:schemeClr val="tx1"/>
+                </a:solidFill>
+              </a:rPr>
+              <a:t> </a:t>
+            </a:r>
+            <a:r>
+              <a:rPr lang="en-US" dirty="0" err="1">
+                <a:solidFill>
+                  <a:schemeClr val="tx1"/>
+                </a:solidFill>
+              </a:rPr>
+              <a:t>tố</a:t>
+            </a:r>
+            <a:r>
+              <a:rPr lang="en-US" dirty="0">
+                <a:solidFill>
+                  <a:schemeClr val="tx1"/>
+                </a:solidFill>
+              </a:rPr>
+              <a:t> </a:t>
+            </a:r>
+            <a:r>
+              <a:rPr lang="en-US" dirty="0" err="1">
+                <a:solidFill>
+                  <a:schemeClr val="tx1"/>
+                </a:solidFill>
+              </a:rPr>
+              <a:t>kiểm</a:t>
+            </a:r>
+            <a:r>
+              <a:rPr lang="en-US" dirty="0">
+                <a:solidFill>
+                  <a:schemeClr val="tx1"/>
+                </a:solidFill>
+              </a:rPr>
+              <a:t> </a:t>
+            </a:r>
+            <a:r>
+              <a:rPr lang="en-US" dirty="0" err="1">
+                <a:solidFill>
+                  <a:schemeClr val="tx1"/>
+                </a:solidFill>
+              </a:rPr>
+              <a:t>tra</a:t>
+            </a:r>
+            <a:r>
+              <a:rPr lang="en-US" dirty="0">
+                <a:solidFill>
+                  <a:schemeClr val="tx1"/>
+                </a:solidFill>
+              </a:rPr>
+              <a:t> </a:t>
+            </a:r>
+            <a:r>
+              <a:rPr lang="en-US" dirty="0" err="1">
+                <a:solidFill>
+                  <a:schemeClr val="tx1"/>
+                </a:solidFill>
+              </a:rPr>
+              <a:t>là</a:t>
+            </a:r>
+            <a:r>
+              <a:rPr lang="en-US" dirty="0">
+                <a:solidFill>
+                  <a:schemeClr val="tx1"/>
+                </a:solidFill>
+              </a:rPr>
+              <a:t> </a:t>
+            </a:r>
+            <a:r>
+              <a:rPr lang="en-US" dirty="0" err="1">
+                <a:solidFill>
+                  <a:schemeClr val="tx1"/>
+                </a:solidFill>
+              </a:rPr>
+              <a:t>từ</a:t>
+            </a:r>
+            <a:r>
+              <a:rPr lang="en-US" dirty="0">
+                <a:solidFill>
+                  <a:schemeClr val="tx1"/>
+                </a:solidFill>
+              </a:rPr>
+              <a:t> </a:t>
+            </a:r>
+            <a:r>
+              <a:rPr lang="en-US" dirty="0" err="1">
+                <a:solidFill>
+                  <a:schemeClr val="tx1"/>
+                </a:solidFill>
+              </a:rPr>
+              <a:t>tố</a:t>
+            </a:r>
+            <a:r>
+              <a:rPr lang="en-US" dirty="0">
+                <a:solidFill>
+                  <a:schemeClr val="tx1"/>
+                </a:solidFill>
+              </a:rPr>
+              <a:t> Follow </a:t>
+            </a:r>
+            <a:r>
+              <a:rPr lang="en-US" dirty="0" err="1">
+                <a:solidFill>
+                  <a:schemeClr val="tx1"/>
+                </a:solidFill>
+              </a:rPr>
+              <a:t>của</a:t>
+            </a:r>
+            <a:r>
+              <a:rPr lang="en-US" dirty="0">
+                <a:solidFill>
+                  <a:schemeClr val="tx1"/>
+                </a:solidFill>
+              </a:rPr>
+              <a:t> </a:t>
+            </a:r>
+            <a:r>
+              <a:rPr lang="en-US" dirty="0" err="1">
+                <a:solidFill>
+                  <a:schemeClr val="tx1"/>
+                </a:solidFill>
+              </a:rPr>
+              <a:t>hàm</a:t>
+            </a:r>
+            <a:r>
+              <a:rPr lang="en-US" dirty="0">
+                <a:solidFill>
+                  <a:schemeClr val="tx1"/>
+                </a:solidFill>
+              </a:rPr>
+              <a:t> </a:t>
+            </a:r>
+            <a:r>
+              <a:rPr lang="en-US" dirty="0" err="1">
+                <a:solidFill>
+                  <a:schemeClr val="tx1"/>
+                </a:solidFill>
+              </a:rPr>
+              <a:t>đó</a:t>
+            </a:r>
+            <a:r>
+              <a:rPr lang="en-US" dirty="0">
+                <a:solidFill>
+                  <a:schemeClr val="tx1"/>
+                </a:solidFill>
+              </a:rPr>
+              <a:t> </a:t>
+            </a:r>
+            <a:r>
+              <a:rPr lang="en-US" dirty="0" err="1">
+                <a:solidFill>
+                  <a:schemeClr val="tx1"/>
+                </a:solidFill>
+              </a:rPr>
+              <a:t>thì</a:t>
+            </a:r>
+            <a:r>
+              <a:rPr lang="en-US" dirty="0">
+                <a:solidFill>
+                  <a:schemeClr val="tx1"/>
+                </a:solidFill>
+              </a:rPr>
+              <a:t> </a:t>
+            </a:r>
+            <a:r>
+              <a:rPr lang="en-US" dirty="0" err="1">
+                <a:solidFill>
+                  <a:schemeClr val="tx1"/>
+                </a:solidFill>
+              </a:rPr>
+              <a:t>ch</a:t>
+            </a:r>
+            <a:r>
+              <a:rPr lang="vi-VN" dirty="0">
+                <a:solidFill>
+                  <a:schemeClr val="tx1"/>
+                </a:solidFill>
+              </a:rPr>
+              <a:t>ư</a:t>
+            </a:r>
+            <a:r>
+              <a:rPr lang="en-US" dirty="0" err="1">
+                <a:solidFill>
+                  <a:schemeClr val="tx1"/>
+                </a:solidFill>
+              </a:rPr>
+              <a:t>ơng</a:t>
+            </a:r>
+            <a:r>
+              <a:rPr lang="en-US" dirty="0">
+                <a:solidFill>
+                  <a:schemeClr val="tx1"/>
+                </a:solidFill>
+              </a:rPr>
+              <a:t> </a:t>
+            </a:r>
+            <a:r>
+              <a:rPr lang="en-US" dirty="0" err="1">
+                <a:solidFill>
+                  <a:schemeClr val="tx1"/>
+                </a:solidFill>
+              </a:rPr>
+              <a:t>trình</a:t>
+            </a:r>
+            <a:r>
+              <a:rPr lang="en-US" dirty="0">
+                <a:solidFill>
+                  <a:schemeClr val="tx1"/>
+                </a:solidFill>
+              </a:rPr>
+              <a:t> </a:t>
+            </a:r>
+            <a:r>
+              <a:rPr lang="en-US" dirty="0" err="1">
+                <a:solidFill>
+                  <a:schemeClr val="tx1"/>
+                </a:solidFill>
+              </a:rPr>
+              <a:t>vẫn</a:t>
+            </a:r>
+            <a:r>
+              <a:rPr lang="en-US" dirty="0">
+                <a:solidFill>
+                  <a:schemeClr val="tx1"/>
+                </a:solidFill>
+              </a:rPr>
+              <a:t> </a:t>
+            </a:r>
+            <a:r>
+              <a:rPr lang="en-US" dirty="0" err="1">
+                <a:solidFill>
+                  <a:schemeClr val="tx1"/>
+                </a:solidFill>
+              </a:rPr>
+              <a:t>đúng</a:t>
+            </a:r>
+            <a:r>
+              <a:rPr lang="en-US" dirty="0">
+                <a:solidFill>
+                  <a:schemeClr val="tx1"/>
+                </a:solidFill>
+              </a:rPr>
+              <a:t> </a:t>
+            </a:r>
+            <a:r>
+              <a:rPr lang="en-US" dirty="0" err="1">
+                <a:solidFill>
+                  <a:schemeClr val="tx1"/>
+                </a:solidFill>
+              </a:rPr>
+              <a:t>cú</a:t>
+            </a:r>
+            <a:r>
+              <a:rPr lang="en-US" dirty="0">
+                <a:solidFill>
+                  <a:schemeClr val="tx1"/>
+                </a:solidFill>
+              </a:rPr>
+              <a:t> </a:t>
+            </a:r>
+            <a:r>
+              <a:rPr lang="en-US" dirty="0" err="1">
+                <a:solidFill>
+                  <a:schemeClr val="tx1"/>
+                </a:solidFill>
+              </a:rPr>
+              <a:t>pháp</a:t>
+            </a:r>
+            <a:r>
+              <a:rPr lang="en-US" dirty="0">
+                <a:solidFill>
+                  <a:schemeClr val="tx1"/>
+                </a:solidFill>
+              </a:rPr>
+              <a:t>.</a:t>
+            </a:r>
+          </a:p>
+        </p:txBody>
+      </p:sp>
+      <p:graphicFrame>
+        <p:nvGraphicFramePr>
+          <p:cNvPr id="3" name="Table 2">
+            <a:extLst>
+              <a:ext uri="{FF2B5EF4-FFF2-40B4-BE49-F238E27FC236}">
+                <a16:creationId xmlns:a16="http://schemas.microsoft.com/office/drawing/2014/main" id="{83153595-19DE-48AA-8ADD-EFE622709FF7}"/>
+              </a:ext>
+            </a:extLst>
+          </p:cNvPr>
+          <p:cNvGraphicFramePr>
+            <a:graphicFrameLocks noGrp="1"/>
+          </p:cNvGraphicFramePr>
+          <p:nvPr>
+            <p:extLst/>
+          </p:nvPr>
+        </p:nvGraphicFramePr>
+        <p:xfrm>
+          <a:off x="4367814" y="1346200"/>
+          <a:ext cx="4083728" cy="2248810"/>
+        </p:xfrm>
+        <a:graphic>
+          <a:graphicData uri="http://schemas.openxmlformats.org/drawingml/2006/table">
+            <a:tbl>
+              <a:tblPr firstRow="1" firstCol="1" bandRow="1">
+                <a:tableStyleId>{5C22544A-7EE6-4342-B048-85BDC9FD1C3A}</a:tableStyleId>
+              </a:tblPr>
+              <a:tblGrid>
+                <a:gridCol w="2041864">
+                  <a:extLst>
+                    <a:ext uri="{9D8B030D-6E8A-4147-A177-3AD203B41FA5}">
+                      <a16:colId xmlns:a16="http://schemas.microsoft.com/office/drawing/2014/main" val="837531061"/>
+                    </a:ext>
+                  </a:extLst>
+                </a:gridCol>
+                <a:gridCol w="2041864">
+                  <a:extLst>
+                    <a:ext uri="{9D8B030D-6E8A-4147-A177-3AD203B41FA5}">
+                      <a16:colId xmlns:a16="http://schemas.microsoft.com/office/drawing/2014/main" val="699040959"/>
+                    </a:ext>
+                  </a:extLst>
+                </a:gridCol>
+              </a:tblGrid>
+              <a:tr h="221800">
+                <a:tc>
+                  <a:txBody>
+                    <a:bodyPr/>
+                    <a:lstStyle/>
+                    <a:p>
+                      <a:pPr marL="0" marR="0">
+                        <a:lnSpc>
+                          <a:spcPct val="107000"/>
+                        </a:lnSpc>
+                        <a:spcBef>
+                          <a:spcPts val="0"/>
+                        </a:spcBef>
+                        <a:spcAft>
+                          <a:spcPts val="0"/>
+                        </a:spcAft>
+                      </a:pPr>
+                      <a:r>
+                        <a:rPr lang="en-US" sz="1100">
+                          <a:effectLst/>
+                        </a:rPr>
+                        <a:t>A</a:t>
+                      </a:r>
+                      <a:endParaRPr lang="en-US" sz="1100">
+                        <a:effectLst/>
+                        <a:latin typeface="Calibri" panose="020F0502020204030204" pitchFamily="34" charset="0"/>
+                        <a:ea typeface="Times New Roman" panose="02020603050405020304" pitchFamily="18" charset="0"/>
+                        <a:cs typeface="Times New Roman" panose="02020603050405020304" pitchFamily="18" charset="0"/>
+                      </a:endParaRPr>
+                    </a:p>
+                  </a:txBody>
+                  <a:tcPr marL="68580" marR="68580" marT="0" marB="0"/>
+                </a:tc>
+                <a:tc>
+                  <a:txBody>
+                    <a:bodyPr/>
+                    <a:lstStyle/>
+                    <a:p>
+                      <a:pPr marL="0" marR="0">
+                        <a:lnSpc>
+                          <a:spcPct val="107000"/>
+                        </a:lnSpc>
+                        <a:spcBef>
+                          <a:spcPts val="0"/>
+                        </a:spcBef>
+                        <a:spcAft>
+                          <a:spcPts val="0"/>
+                        </a:spcAft>
+                      </a:pPr>
+                      <a:r>
+                        <a:rPr lang="en-US" sz="1100">
+                          <a:effectLst/>
+                        </a:rPr>
+                        <a:t>Follow(A)</a:t>
+                      </a:r>
+                      <a:endParaRPr lang="en-US" sz="1100">
+                        <a:effectLst/>
+                        <a:latin typeface="Calibri" panose="020F0502020204030204" pitchFamily="34" charset="0"/>
+                        <a:ea typeface="Times New Roman" panose="02020603050405020304" pitchFamily="18" charset="0"/>
+                        <a:cs typeface="Times New Roman" panose="02020603050405020304" pitchFamily="18" charset="0"/>
+                      </a:endParaRPr>
+                    </a:p>
+                  </a:txBody>
+                  <a:tcPr marL="68580" marR="68580" marT="0" marB="0"/>
+                </a:tc>
+                <a:extLst>
+                  <a:ext uri="{0D108BD9-81ED-4DB2-BD59-A6C34878D82A}">
+                    <a16:rowId xmlns:a16="http://schemas.microsoft.com/office/drawing/2014/main" val="245940028"/>
+                  </a:ext>
+                </a:extLst>
+              </a:tr>
+              <a:tr h="221800">
+                <a:tc>
+                  <a:txBody>
+                    <a:bodyPr/>
+                    <a:lstStyle/>
+                    <a:p>
+                      <a:pPr marL="0" marR="0">
+                        <a:lnSpc>
+                          <a:spcPct val="107000"/>
+                        </a:lnSpc>
+                        <a:spcBef>
+                          <a:spcPts val="0"/>
+                        </a:spcBef>
+                        <a:spcAft>
+                          <a:spcPts val="0"/>
+                        </a:spcAft>
+                      </a:pPr>
+                      <a:r>
+                        <a:rPr lang="en-US" sz="1100">
+                          <a:effectLst/>
+                        </a:rPr>
+                        <a:t>Statement</a:t>
+                      </a:r>
+                      <a:endParaRPr lang="en-US" sz="1100">
+                        <a:effectLst/>
+                        <a:latin typeface="Calibri" panose="020F0502020204030204" pitchFamily="34" charset="0"/>
+                        <a:ea typeface="Times New Roman" panose="02020603050405020304" pitchFamily="18" charset="0"/>
+                        <a:cs typeface="Times New Roman" panose="02020603050405020304" pitchFamily="18" charset="0"/>
+                      </a:endParaRPr>
+                    </a:p>
+                  </a:txBody>
+                  <a:tcPr marL="68580" marR="68580" marT="0" marB="0"/>
+                </a:tc>
+                <a:tc>
+                  <a:txBody>
+                    <a:bodyPr/>
+                    <a:lstStyle/>
+                    <a:p>
+                      <a:pPr marL="0" marR="0">
+                        <a:lnSpc>
+                          <a:spcPct val="107000"/>
+                        </a:lnSpc>
+                        <a:spcBef>
+                          <a:spcPts val="0"/>
+                        </a:spcBef>
+                        <a:spcAft>
+                          <a:spcPts val="0"/>
+                        </a:spcAft>
+                      </a:pPr>
+                      <a:r>
+                        <a:rPr lang="en-US" sz="1100">
+                          <a:effectLst/>
+                        </a:rPr>
+                        <a:t>;  END  ELSE</a:t>
+                      </a:r>
+                      <a:endParaRPr lang="en-US" sz="1100">
+                        <a:effectLst/>
+                        <a:latin typeface="Calibri" panose="020F0502020204030204" pitchFamily="34" charset="0"/>
+                        <a:ea typeface="Times New Roman" panose="02020603050405020304" pitchFamily="18" charset="0"/>
+                        <a:cs typeface="Times New Roman" panose="02020603050405020304" pitchFamily="18" charset="0"/>
+                      </a:endParaRPr>
+                    </a:p>
+                  </a:txBody>
+                  <a:tcPr marL="68580" marR="68580" marT="0" marB="0"/>
+                </a:tc>
+                <a:extLst>
+                  <a:ext uri="{0D108BD9-81ED-4DB2-BD59-A6C34878D82A}">
+                    <a16:rowId xmlns:a16="http://schemas.microsoft.com/office/drawing/2014/main" val="1713444634"/>
+                  </a:ext>
+                </a:extLst>
+              </a:tr>
+              <a:tr h="221800">
+                <a:tc>
+                  <a:txBody>
+                    <a:bodyPr/>
+                    <a:lstStyle/>
+                    <a:p>
+                      <a:pPr marL="0" marR="0">
+                        <a:lnSpc>
+                          <a:spcPct val="107000"/>
+                        </a:lnSpc>
+                        <a:spcBef>
+                          <a:spcPts val="0"/>
+                        </a:spcBef>
+                        <a:spcAft>
+                          <a:spcPts val="0"/>
+                        </a:spcAft>
+                      </a:pPr>
+                      <a:r>
+                        <a:rPr lang="en-US" sz="1100">
+                          <a:effectLst/>
+                        </a:rPr>
+                        <a:t>Statement2</a:t>
+                      </a:r>
+                      <a:endParaRPr lang="en-US" sz="1100">
+                        <a:effectLst/>
+                        <a:latin typeface="Calibri" panose="020F0502020204030204" pitchFamily="34" charset="0"/>
+                        <a:ea typeface="Times New Roman" panose="02020603050405020304" pitchFamily="18" charset="0"/>
+                        <a:cs typeface="Times New Roman" panose="02020603050405020304" pitchFamily="18" charset="0"/>
+                      </a:endParaRPr>
+                    </a:p>
+                  </a:txBody>
+                  <a:tcPr marL="68580" marR="68580" marT="0" marB="0"/>
+                </a:tc>
+                <a:tc>
+                  <a:txBody>
+                    <a:bodyPr/>
+                    <a:lstStyle/>
+                    <a:p>
+                      <a:pPr marL="0" marR="0">
+                        <a:lnSpc>
+                          <a:spcPct val="107000"/>
+                        </a:lnSpc>
+                        <a:spcBef>
+                          <a:spcPts val="0"/>
+                        </a:spcBef>
+                        <a:spcAft>
+                          <a:spcPts val="0"/>
+                        </a:spcAft>
+                      </a:pPr>
+                      <a:r>
+                        <a:rPr lang="en-US" sz="1100">
+                          <a:effectLst/>
+                        </a:rPr>
+                        <a:t>END</a:t>
+                      </a:r>
+                      <a:endParaRPr lang="en-US" sz="1100">
+                        <a:effectLst/>
+                        <a:latin typeface="Calibri" panose="020F0502020204030204" pitchFamily="34" charset="0"/>
+                        <a:ea typeface="Times New Roman" panose="02020603050405020304" pitchFamily="18" charset="0"/>
+                        <a:cs typeface="Times New Roman" panose="02020603050405020304" pitchFamily="18" charset="0"/>
+                      </a:endParaRPr>
+                    </a:p>
+                  </a:txBody>
+                  <a:tcPr marL="68580" marR="68580" marT="0" marB="0"/>
+                </a:tc>
+                <a:extLst>
+                  <a:ext uri="{0D108BD9-81ED-4DB2-BD59-A6C34878D82A}">
+                    <a16:rowId xmlns:a16="http://schemas.microsoft.com/office/drawing/2014/main" val="3577871903"/>
+                  </a:ext>
+                </a:extLst>
+              </a:tr>
+              <a:tr h="453870">
+                <a:tc>
+                  <a:txBody>
+                    <a:bodyPr/>
+                    <a:lstStyle/>
+                    <a:p>
+                      <a:pPr marL="0" marR="0">
+                        <a:lnSpc>
+                          <a:spcPct val="107000"/>
+                        </a:lnSpc>
+                        <a:spcBef>
+                          <a:spcPts val="0"/>
+                        </a:spcBef>
+                        <a:spcAft>
+                          <a:spcPts val="0"/>
+                        </a:spcAft>
+                      </a:pPr>
+                      <a:r>
+                        <a:rPr lang="en-US" sz="1100">
+                          <a:effectLst/>
+                        </a:rPr>
+                        <a:t>Term2</a:t>
+                      </a:r>
+                      <a:endParaRPr lang="en-US" sz="1100">
+                        <a:effectLst/>
+                        <a:latin typeface="Calibri" panose="020F0502020204030204" pitchFamily="34" charset="0"/>
+                        <a:ea typeface="Times New Roman" panose="02020603050405020304" pitchFamily="18" charset="0"/>
+                        <a:cs typeface="Times New Roman" panose="02020603050405020304" pitchFamily="18" charset="0"/>
+                      </a:endParaRPr>
+                    </a:p>
+                  </a:txBody>
+                  <a:tcPr marL="68580" marR="68580" marT="0" marB="0"/>
+                </a:tc>
+                <a:tc>
+                  <a:txBody>
+                    <a:bodyPr/>
+                    <a:lstStyle/>
+                    <a:p>
+                      <a:pPr marL="0" marR="0">
+                        <a:lnSpc>
+                          <a:spcPct val="107000"/>
+                        </a:lnSpc>
+                        <a:spcBef>
+                          <a:spcPts val="0"/>
+                        </a:spcBef>
+                        <a:spcAft>
+                          <a:spcPts val="0"/>
+                        </a:spcAft>
+                      </a:pPr>
+                      <a:r>
+                        <a:rPr lang="en-US" sz="1100">
+                          <a:effectLst/>
+                        </a:rPr>
+                        <a:t>; END TO THEN DO ) - + &lt; &lt;= &gt; &gt;= = !=  ]</a:t>
+                      </a:r>
+                      <a:endParaRPr lang="en-US" sz="1100">
+                        <a:effectLst/>
+                        <a:latin typeface="Calibri" panose="020F0502020204030204" pitchFamily="34" charset="0"/>
+                        <a:ea typeface="Times New Roman" panose="02020603050405020304" pitchFamily="18" charset="0"/>
+                        <a:cs typeface="Times New Roman" panose="02020603050405020304" pitchFamily="18" charset="0"/>
+                      </a:endParaRPr>
+                    </a:p>
+                  </a:txBody>
+                  <a:tcPr marL="68580" marR="68580" marT="0" marB="0"/>
+                </a:tc>
+                <a:extLst>
+                  <a:ext uri="{0D108BD9-81ED-4DB2-BD59-A6C34878D82A}">
+                    <a16:rowId xmlns:a16="http://schemas.microsoft.com/office/drawing/2014/main" val="2577431294"/>
+                  </a:ext>
+                </a:extLst>
+              </a:tr>
+              <a:tr h="453870">
+                <a:tc>
+                  <a:txBody>
+                    <a:bodyPr/>
+                    <a:lstStyle/>
+                    <a:p>
+                      <a:pPr marL="0" marR="0">
+                        <a:lnSpc>
+                          <a:spcPct val="107000"/>
+                        </a:lnSpc>
+                        <a:spcBef>
+                          <a:spcPts val="0"/>
+                        </a:spcBef>
+                        <a:spcAft>
+                          <a:spcPts val="0"/>
+                        </a:spcAft>
+                      </a:pPr>
+                      <a:r>
+                        <a:rPr lang="en-US" sz="1100">
+                          <a:effectLst/>
+                        </a:rPr>
+                        <a:t>Expression3</a:t>
+                      </a:r>
+                      <a:endParaRPr lang="en-US" sz="1100">
+                        <a:effectLst/>
+                        <a:latin typeface="Calibri" panose="020F0502020204030204" pitchFamily="34" charset="0"/>
+                        <a:ea typeface="Times New Roman" panose="02020603050405020304" pitchFamily="18" charset="0"/>
+                        <a:cs typeface="Times New Roman" panose="02020603050405020304" pitchFamily="18" charset="0"/>
+                      </a:endParaRPr>
+                    </a:p>
+                  </a:txBody>
+                  <a:tcPr marL="68580" marR="68580" marT="0" marB="0"/>
+                </a:tc>
+                <a:tc>
+                  <a:txBody>
+                    <a:bodyPr/>
+                    <a:lstStyle/>
+                    <a:p>
+                      <a:pPr marL="0" marR="0">
+                        <a:lnSpc>
+                          <a:spcPct val="107000"/>
+                        </a:lnSpc>
+                        <a:spcBef>
+                          <a:spcPts val="0"/>
+                        </a:spcBef>
+                        <a:spcAft>
+                          <a:spcPts val="0"/>
+                        </a:spcAft>
+                      </a:pPr>
+                      <a:r>
+                        <a:rPr lang="en-US" sz="1100" dirty="0">
+                          <a:effectLst/>
+                        </a:rPr>
+                        <a:t>;  END TO THEN DO ) -  ] &lt; &lt;= &gt; &gt;= = !=</a:t>
+                      </a:r>
+                      <a:endParaRPr lang="en-US" sz="1100" dirty="0">
+                        <a:effectLst/>
+                        <a:latin typeface="Calibri" panose="020F0502020204030204" pitchFamily="34" charset="0"/>
+                        <a:ea typeface="Times New Roman" panose="02020603050405020304" pitchFamily="18" charset="0"/>
+                        <a:cs typeface="Times New Roman" panose="02020603050405020304" pitchFamily="18" charset="0"/>
+                      </a:endParaRPr>
+                    </a:p>
+                  </a:txBody>
+                  <a:tcPr marL="68580" marR="68580" marT="0" marB="0"/>
+                </a:tc>
+                <a:extLst>
+                  <a:ext uri="{0D108BD9-81ED-4DB2-BD59-A6C34878D82A}">
+                    <a16:rowId xmlns:a16="http://schemas.microsoft.com/office/drawing/2014/main" val="956168312"/>
+                  </a:ext>
+                </a:extLst>
+              </a:tr>
+              <a:tr h="453870">
+                <a:tc>
+                  <a:txBody>
+                    <a:bodyPr/>
+                    <a:lstStyle/>
+                    <a:p>
+                      <a:pPr marL="0" marR="0">
+                        <a:lnSpc>
+                          <a:spcPct val="107000"/>
+                        </a:lnSpc>
+                        <a:spcBef>
+                          <a:spcPts val="0"/>
+                        </a:spcBef>
+                        <a:spcAft>
+                          <a:spcPts val="0"/>
+                        </a:spcAft>
+                      </a:pPr>
+                      <a:r>
+                        <a:rPr lang="en-US" sz="1100">
+                          <a:effectLst/>
+                        </a:rPr>
+                        <a:t>Arguments</a:t>
+                      </a:r>
+                      <a:endParaRPr lang="en-US" sz="1100">
+                        <a:effectLst/>
+                        <a:latin typeface="Calibri" panose="020F0502020204030204" pitchFamily="34" charset="0"/>
+                        <a:ea typeface="Times New Roman" panose="02020603050405020304" pitchFamily="18" charset="0"/>
+                        <a:cs typeface="Times New Roman" panose="02020603050405020304" pitchFamily="18" charset="0"/>
+                      </a:endParaRPr>
+                    </a:p>
+                  </a:txBody>
+                  <a:tcPr marL="68580" marR="68580" marT="0" marB="0"/>
+                </a:tc>
+                <a:tc>
+                  <a:txBody>
+                    <a:bodyPr/>
+                    <a:lstStyle/>
+                    <a:p>
+                      <a:pPr marL="0" marR="0">
+                        <a:lnSpc>
+                          <a:spcPct val="107000"/>
+                        </a:lnSpc>
+                        <a:spcBef>
+                          <a:spcPts val="0"/>
+                        </a:spcBef>
+                        <a:spcAft>
+                          <a:spcPts val="0"/>
+                        </a:spcAft>
+                      </a:pPr>
+                      <a:r>
+                        <a:rPr lang="en-US" sz="1100">
+                          <a:effectLst/>
+                        </a:rPr>
+                        <a:t>;  END  ELSE * / TO THEN DO ) , - + &lt; &lt;= &gt; &gt;= = !=  ]</a:t>
+                      </a:r>
+                      <a:endParaRPr lang="en-US" sz="1100">
+                        <a:effectLst/>
+                        <a:latin typeface="Calibri" panose="020F0502020204030204" pitchFamily="34" charset="0"/>
+                        <a:ea typeface="Times New Roman" panose="02020603050405020304" pitchFamily="18" charset="0"/>
+                        <a:cs typeface="Times New Roman" panose="02020603050405020304" pitchFamily="18" charset="0"/>
+                      </a:endParaRPr>
+                    </a:p>
+                  </a:txBody>
+                  <a:tcPr marL="68580" marR="68580" marT="0" marB="0"/>
+                </a:tc>
+                <a:extLst>
+                  <a:ext uri="{0D108BD9-81ED-4DB2-BD59-A6C34878D82A}">
+                    <a16:rowId xmlns:a16="http://schemas.microsoft.com/office/drawing/2014/main" val="1849587814"/>
+                  </a:ext>
+                </a:extLst>
+              </a:tr>
+              <a:tr h="221800">
+                <a:tc>
+                  <a:txBody>
+                    <a:bodyPr/>
+                    <a:lstStyle/>
+                    <a:p>
+                      <a:pPr marL="0" marR="0">
+                        <a:lnSpc>
+                          <a:spcPct val="107000"/>
+                        </a:lnSpc>
+                        <a:spcBef>
+                          <a:spcPts val="0"/>
+                        </a:spcBef>
+                        <a:spcAft>
+                          <a:spcPts val="0"/>
+                        </a:spcAft>
+                      </a:pPr>
+                      <a:r>
+                        <a:rPr lang="en-US" sz="1100">
+                          <a:effectLst/>
+                        </a:rPr>
+                        <a:t>Arguments2</a:t>
+                      </a:r>
+                      <a:endParaRPr lang="en-US" sz="1100">
+                        <a:effectLst/>
+                        <a:latin typeface="Calibri" panose="020F0502020204030204" pitchFamily="34" charset="0"/>
+                        <a:ea typeface="Times New Roman" panose="02020603050405020304" pitchFamily="18" charset="0"/>
+                        <a:cs typeface="Times New Roman" panose="02020603050405020304" pitchFamily="18" charset="0"/>
+                      </a:endParaRPr>
+                    </a:p>
+                  </a:txBody>
+                  <a:tcPr marL="68580" marR="68580" marT="0" marB="0"/>
+                </a:tc>
+                <a:tc>
+                  <a:txBody>
+                    <a:bodyPr/>
+                    <a:lstStyle/>
+                    <a:p>
+                      <a:pPr marL="0" marR="0">
+                        <a:lnSpc>
+                          <a:spcPct val="107000"/>
+                        </a:lnSpc>
+                        <a:spcBef>
+                          <a:spcPts val="0"/>
+                        </a:spcBef>
+                        <a:spcAft>
+                          <a:spcPts val="0"/>
+                        </a:spcAft>
+                      </a:pPr>
+                      <a:r>
+                        <a:rPr lang="en-US" sz="1100" dirty="0">
+                          <a:effectLst/>
+                        </a:rPr>
+                        <a:t>)</a:t>
+                      </a:r>
+                      <a:endParaRPr lang="en-US" sz="1100" dirty="0">
+                        <a:effectLst/>
+                        <a:latin typeface="Calibri" panose="020F0502020204030204" pitchFamily="34" charset="0"/>
+                        <a:ea typeface="Times New Roman" panose="02020603050405020304" pitchFamily="18" charset="0"/>
+                        <a:cs typeface="Times New Roman" panose="02020603050405020304" pitchFamily="18" charset="0"/>
+                      </a:endParaRPr>
+                    </a:p>
+                  </a:txBody>
+                  <a:tcPr marL="68580" marR="68580" marT="0" marB="0"/>
+                </a:tc>
+                <a:extLst>
+                  <a:ext uri="{0D108BD9-81ED-4DB2-BD59-A6C34878D82A}">
+                    <a16:rowId xmlns:a16="http://schemas.microsoft.com/office/drawing/2014/main" val="697537971"/>
+                  </a:ext>
+                </a:extLst>
+              </a:tr>
+            </a:tbl>
+          </a:graphicData>
+        </a:graphic>
+      </p:graphicFrame>
     </p:spTree>
     <p:extLst>
       <p:ext uri="{BB962C8B-B14F-4D97-AF65-F5344CB8AC3E}">
@@ -4720,7 +7716,283 @@
 </p:sld>
 </file>
 
-<file path=ppt/slides/slide21.xml><?xml version="1.0" encoding="utf-8"?>
+<file path=ppt/slides/slide22.xml><?xml version="1.0" encoding="utf-8"?>
+<p:sld xmlns:a="http://schemas.openxmlformats.org/drawingml/2006/main" xmlns:r="http://schemas.openxmlformats.org/officeDocument/2006/relationships" xmlns:p="http://schemas.openxmlformats.org/presentationml/2006/main">
+  <p:cSld>
+    <p:spTree>
+      <p:nvGrpSpPr>
+        <p:cNvPr id="1" name=""/>
+        <p:cNvGrpSpPr/>
+        <p:nvPr/>
+      </p:nvGrpSpPr>
+      <p:grpSpPr>
+        <a:xfrm>
+          <a:off x="0" y="0"/>
+          <a:ext cx="0" cy="0"/>
+          <a:chOff x="0" y="0"/>
+          <a:chExt cx="0" cy="0"/>
+        </a:xfrm>
+      </p:grpSpPr>
+      <p:sp>
+        <p:nvSpPr>
+          <p:cNvPr id="2" name="Title 1">
+            <a:extLst>
+              <a:ext uri="{FF2B5EF4-FFF2-40B4-BE49-F238E27FC236}">
+                <a16:creationId xmlns:a16="http://schemas.microsoft.com/office/drawing/2014/main" id="{096466C5-78E1-4B38-97CC-2B30997F8BA4}"/>
+              </a:ext>
+            </a:extLst>
+          </p:cNvPr>
+          <p:cNvSpPr>
+            <a:spLocks noGrp="1"/>
+          </p:cNvSpPr>
+          <p:nvPr>
+            <p:ph type="title"/>
+          </p:nvPr>
+        </p:nvSpPr>
+        <p:spPr/>
+        <p:txBody>
+          <a:bodyPr/>
+          <a:lstStyle/>
+          <a:p>
+            <a:r>
+              <a:rPr lang="en-US"/>
+              <a:t>S</a:t>
+            </a:r>
+            <a:r>
+              <a:rPr lang="en-US" dirty="0"/>
+              <a:t>ơ</a:t>
+            </a:r>
+            <a:r>
+              <a:rPr lang="en-US"/>
+              <a:t> </a:t>
+            </a:r>
+            <a:r>
+              <a:rPr lang="en-US" dirty="0" err="1"/>
+              <a:t>đồ</a:t>
+            </a:r>
+            <a:r>
+              <a:rPr lang="en-US" dirty="0"/>
+              <a:t> </a:t>
+            </a:r>
+            <a:r>
+              <a:rPr lang="en-US" dirty="0" err="1"/>
+              <a:t>minh</a:t>
+            </a:r>
+            <a:r>
+              <a:rPr lang="en-US" dirty="0"/>
+              <a:t> </a:t>
+            </a:r>
+            <a:r>
+              <a:rPr lang="en-US" dirty="0" err="1"/>
+              <a:t>họa</a:t>
+            </a:r>
+            <a:endParaRPr lang="en-US" dirty="0"/>
+          </a:p>
+        </p:txBody>
+      </p:sp>
+      <p:pic>
+        <p:nvPicPr>
+          <p:cNvPr id="5" name="Content Placeholder 4" descr="A screenshot of a cell phone&#10;&#10;Description generated with very high confidence">
+            <a:extLst>
+              <a:ext uri="{FF2B5EF4-FFF2-40B4-BE49-F238E27FC236}">
+                <a16:creationId xmlns:a16="http://schemas.microsoft.com/office/drawing/2014/main" id="{9955B5BA-68E3-4722-BF13-75CB62B4E611}"/>
+              </a:ext>
+            </a:extLst>
+          </p:cNvPr>
+          <p:cNvPicPr>
+            <a:picLocks noGrp="1" noChangeAspect="1"/>
+          </p:cNvPicPr>
+          <p:nvPr>
+            <p:ph idx="1"/>
+          </p:nvPr>
+        </p:nvPicPr>
+        <p:blipFill>
+          <a:blip r:embed="rId2">
+            <a:extLst>
+              <a:ext uri="{28A0092B-C50C-407E-A947-70E740481C1C}">
+                <a14:useLocalDpi xmlns:a14="http://schemas.microsoft.com/office/drawing/2010/main" val="0"/>
+              </a:ext>
+            </a:extLst>
+          </a:blip>
+          <a:stretch>
+            <a:fillRect/>
+          </a:stretch>
+        </p:blipFill>
+        <p:spPr>
+          <a:xfrm>
+            <a:off x="2026699" y="1420871"/>
+            <a:ext cx="5090601" cy="1684166"/>
+          </a:xfrm>
+        </p:spPr>
+      </p:pic>
+      <p:pic>
+        <p:nvPicPr>
+          <p:cNvPr id="7" name="Picture 6" descr="A close up of a sign&#10;&#10;Description generated with high confidence">
+            <a:extLst>
+              <a:ext uri="{FF2B5EF4-FFF2-40B4-BE49-F238E27FC236}">
+                <a16:creationId xmlns:a16="http://schemas.microsoft.com/office/drawing/2014/main" id="{B53B1F60-9ABB-4034-AE96-CFBA175DF1B5}"/>
+              </a:ext>
+            </a:extLst>
+          </p:cNvPr>
+          <p:cNvPicPr>
+            <a:picLocks noChangeAspect="1"/>
+          </p:cNvPicPr>
+          <p:nvPr/>
+        </p:nvPicPr>
+        <p:blipFill>
+          <a:blip r:embed="rId3">
+            <a:extLst>
+              <a:ext uri="{28A0092B-C50C-407E-A947-70E740481C1C}">
+                <a14:useLocalDpi xmlns:a14="http://schemas.microsoft.com/office/drawing/2010/main" val="0"/>
+              </a:ext>
+            </a:extLst>
+          </a:blip>
+          <a:stretch>
+            <a:fillRect/>
+          </a:stretch>
+        </p:blipFill>
+        <p:spPr>
+          <a:xfrm>
+            <a:off x="3033634" y="3604054"/>
+            <a:ext cx="3657917" cy="868755"/>
+          </a:xfrm>
+          <a:prstGeom prst="rect">
+            <a:avLst/>
+          </a:prstGeom>
+        </p:spPr>
+      </p:pic>
+      <p:pic>
+        <p:nvPicPr>
+          <p:cNvPr id="9" name="Picture 8" descr="A picture containing object, clock&#10;&#10;Description generated with high confidence">
+            <a:extLst>
+              <a:ext uri="{FF2B5EF4-FFF2-40B4-BE49-F238E27FC236}">
+                <a16:creationId xmlns:a16="http://schemas.microsoft.com/office/drawing/2014/main" id="{768A2B25-C45E-4A08-BCFF-C427E184772C}"/>
+              </a:ext>
+            </a:extLst>
+          </p:cNvPr>
+          <p:cNvPicPr>
+            <a:picLocks noChangeAspect="1"/>
+          </p:cNvPicPr>
+          <p:nvPr/>
+        </p:nvPicPr>
+        <p:blipFill>
+          <a:blip r:embed="rId4">
+            <a:extLst>
+              <a:ext uri="{28A0092B-C50C-407E-A947-70E740481C1C}">
+                <a14:useLocalDpi xmlns:a14="http://schemas.microsoft.com/office/drawing/2010/main" val="0"/>
+              </a:ext>
+            </a:extLst>
+          </a:blip>
+          <a:stretch>
+            <a:fillRect/>
+          </a:stretch>
+        </p:blipFill>
+        <p:spPr>
+          <a:xfrm>
+            <a:off x="2262939" y="4929002"/>
+            <a:ext cx="4854361" cy="853514"/>
+          </a:xfrm>
+          <a:prstGeom prst="rect">
+            <a:avLst/>
+          </a:prstGeom>
+        </p:spPr>
+      </p:pic>
+      <p:sp>
+        <p:nvSpPr>
+          <p:cNvPr id="11" name="Rectangle 10">
+            <a:extLst>
+              <a:ext uri="{FF2B5EF4-FFF2-40B4-BE49-F238E27FC236}">
+                <a16:creationId xmlns:a16="http://schemas.microsoft.com/office/drawing/2014/main" id="{8502CCD0-86C6-47E6-88F6-02A330746E9A}"/>
+              </a:ext>
+            </a:extLst>
+          </p:cNvPr>
+          <p:cNvSpPr/>
+          <p:nvPr/>
+        </p:nvSpPr>
+        <p:spPr>
+          <a:xfrm>
+            <a:off x="4281564" y="5049671"/>
+            <a:ext cx="2409987" cy="774915"/>
+          </a:xfrm>
+          <a:prstGeom prst="rect">
+            <a:avLst/>
+          </a:prstGeom>
+          <a:noFill/>
+        </p:spPr>
+        <p:style>
+          <a:lnRef idx="2">
+            <a:schemeClr val="accent1">
+              <a:shade val="50000"/>
+            </a:schemeClr>
+          </a:lnRef>
+          <a:fillRef idx="1">
+            <a:schemeClr val="accent1"/>
+          </a:fillRef>
+          <a:effectRef idx="0">
+            <a:schemeClr val="accent1"/>
+          </a:effectRef>
+          <a:fontRef idx="minor">
+            <a:schemeClr val="lt1"/>
+          </a:fontRef>
+        </p:style>
+        <p:txBody>
+          <a:bodyPr rtlCol="0" anchor="ctr"/>
+          <a:lstStyle/>
+          <a:p>
+            <a:pPr algn="ctr"/>
+            <a:endParaRPr lang="en-US"/>
+          </a:p>
+        </p:txBody>
+      </p:sp>
+      <p:sp>
+        <p:nvSpPr>
+          <p:cNvPr id="12" name="TextBox 11">
+            <a:extLst>
+              <a:ext uri="{FF2B5EF4-FFF2-40B4-BE49-F238E27FC236}">
+                <a16:creationId xmlns:a16="http://schemas.microsoft.com/office/drawing/2014/main" id="{7230174B-F02A-4D03-AD35-A47408E0D820}"/>
+              </a:ext>
+            </a:extLst>
+          </p:cNvPr>
+          <p:cNvSpPr txBox="1"/>
+          <p:nvPr/>
+        </p:nvSpPr>
+        <p:spPr>
+          <a:xfrm>
+            <a:off x="5758232" y="5516809"/>
+            <a:ext cx="933319" cy="307777"/>
+          </a:xfrm>
+          <a:prstGeom prst="rect">
+            <a:avLst/>
+          </a:prstGeom>
+          <a:noFill/>
+        </p:spPr>
+        <p:txBody>
+          <a:bodyPr wrap="square" rtlCol="0">
+            <a:spAutoFit/>
+          </a:bodyPr>
+          <a:lstStyle/>
+          <a:p>
+            <a:r>
+              <a:rPr lang="en-US" sz="1400" b="1" dirty="0"/>
+              <a:t>Argument</a:t>
+            </a:r>
+          </a:p>
+        </p:txBody>
+      </p:sp>
+    </p:spTree>
+    <p:extLst>
+      <p:ext uri="{BB962C8B-B14F-4D97-AF65-F5344CB8AC3E}">
+        <p14:creationId xmlns:p14="http://schemas.microsoft.com/office/powerpoint/2010/main" val="3720724224"/>
+      </p:ext>
+    </p:extLst>
+  </p:cSld>
+  <p:clrMapOvr>
+    <a:masterClrMapping/>
+  </p:clrMapOvr>
+</p:sld>
+</file>
+
+<file path=ppt/slides/slide23.xml><?xml version="1.0" encoding="utf-8"?>
 <p:sld xmlns:a="http://schemas.openxmlformats.org/drawingml/2006/main" xmlns:r="http://schemas.openxmlformats.org/officeDocument/2006/relationships" xmlns:p="http://schemas.openxmlformats.org/presentationml/2006/main">
   <p:cSld>
     <p:spTree>
@@ -4893,18 +8165,30 @@
           <a:lstStyle/>
           <a:p>
             <a:r>
-              <a:rPr lang="vi-VN"/>
+              <a:rPr lang="vi-VN">
+                <a:solidFill>
+                  <a:schemeClr val="tx1"/>
+                </a:solidFill>
+              </a:rPr>
               <a:t>Bao gồm một tập thủ tục, mỗi thủ tục ứng với một sơ đồ cú pháp (một ký hiệu không kết thúc)</a:t>
             </a:r>
           </a:p>
           <a:p>
             <a:r>
-              <a:rPr lang="vi-VN"/>
+              <a:rPr lang="vi-VN">
+                <a:solidFill>
+                  <a:schemeClr val="tx1"/>
+                </a:solidFill>
+              </a:rPr>
               <a:t>Các thủ tục đệ quy : khi triển khai một ký hiệu không kết thúc có thể gặp các ký hiệu không kết thúc khác, dẫn đến các thủ tục gọi lẫn nhau, và có thể gọi trực tiếp hoặc gián tiếp đến chính nó.</a:t>
             </a:r>
           </a:p>
           <a:p>
-            <a:endParaRPr lang="vi-VN"/>
+            <a:endParaRPr lang="vi-VN">
+              <a:solidFill>
+                <a:schemeClr val="tx1"/>
+              </a:solidFill>
+            </a:endParaRPr>
           </a:p>
         </p:txBody>
       </p:sp>
@@ -4995,42 +8279,70 @@
           <a:lstStyle/>
           <a:p>
             <a:r>
-              <a:rPr lang="vi-VN"/>
+              <a:rPr lang="vi-VN">
+                <a:solidFill>
+                  <a:schemeClr val="tx1"/>
+                </a:solidFill>
+              </a:rPr>
               <a:t>Mỗi sơ đồ ứng với một thủ tục </a:t>
             </a:r>
           </a:p>
           <a:p>
             <a:r>
-              <a:rPr lang="vi-VN"/>
+              <a:rPr lang="vi-VN">
+                <a:solidFill>
+                  <a:schemeClr val="tx1"/>
+                </a:solidFill>
+              </a:rPr>
               <a:t>Các nút xuất hiện tuần tự chuyển thành các câu lệnh kế tiếp nhau.</a:t>
             </a:r>
           </a:p>
           <a:p>
             <a:r>
-              <a:rPr lang="vi-VN"/>
+              <a:rPr lang="vi-VN">
+                <a:solidFill>
+                  <a:schemeClr val="tx1"/>
+                </a:solidFill>
+              </a:rPr>
               <a:t>Các điểm rẽ nhánh chuyển thành câu lệnh lựa chọn (if, case)</a:t>
             </a:r>
           </a:p>
           <a:p>
             <a:r>
-              <a:rPr lang="vi-VN"/>
+              <a:rPr lang="vi-VN">
+                <a:solidFill>
+                  <a:schemeClr val="tx1"/>
+                </a:solidFill>
+              </a:rPr>
               <a:t>Chu trình chuyển thành câu lệnh lặp (while, do while, repeat. . .)</a:t>
             </a:r>
           </a:p>
           <a:p>
             <a:r>
-              <a:rPr lang="vi-VN"/>
+              <a:rPr lang="vi-VN">
+                <a:solidFill>
+                  <a:schemeClr val="tx1"/>
+                </a:solidFill>
+              </a:rPr>
               <a:t>Nút tròn chuyển thành đoạn đối chiếu từ tố</a:t>
             </a:r>
           </a:p>
           <a:p>
             <a:r>
-              <a:rPr lang="vi-VN"/>
+              <a:rPr lang="vi-VN">
+                <a:solidFill>
+                  <a:schemeClr val="tx1"/>
+                </a:solidFill>
+              </a:rPr>
               <a:t>Nút chữ nhật chuyển thành lời gọi tới thủ tục khác</a:t>
             </a:r>
           </a:p>
           <a:p>
-            <a:endParaRPr lang="vi-VN"/>
+            <a:endParaRPr lang="vi-VN">
+              <a:solidFill>
+                <a:schemeClr val="tx1"/>
+              </a:solidFill>
+            </a:endParaRPr>
           </a:p>
         </p:txBody>
       </p:sp>

</xml_diff>

<commit_message>
Fix compilePara in report file
</commit_message>
<xml_diff>
--- a/BaoCao/Nhom3.pptx
+++ b/BaoCao/Nhom3.pptx
@@ -130,7 +130,18 @@
   </p:defaultTextStyle>
   <p:extLst>
     <p:ext uri="{EFAFB233-063F-42B5-8137-9DF3F51BA10A}">
-      <p15:sldGuideLst xmlns:p15="http://schemas.microsoft.com/office/powerpoint/2012/main" xmlns=""/>
+      <p15:sldGuideLst xmlns:p15="http://schemas.microsoft.com/office/powerpoint/2012/main">
+        <p15:guide id="1" orient="horz" pos="2160">
+          <p15:clr>
+            <a:srgbClr val="A4A3A4"/>
+          </p15:clr>
+        </p15:guide>
+        <p15:guide id="2" pos="2880">
+          <p15:clr>
+            <a:srgbClr val="A4A3A4"/>
+          </p15:clr>
+        </p15:guide>
+      </p15:sldGuideLst>
     </p:ext>
   </p:extLst>
 </p:presentation>
@@ -319,7 +330,7 @@
           <a:p>
             <a:fld id="{A0EC2761-52B0-42C5-B01B-DF8F69615AE5}" type="datetimeFigureOut">
               <a:rPr lang="en-US" smtClean="0"/>
-              <a:t>04/22/2019</a:t>
+              <a:t>4/22/2019</a:t>
             </a:fld>
             <a:endParaRPr lang="en-US"/>
           </a:p>
@@ -487,7 +498,7 @@
           <a:p>
             <a:fld id="{A0EC2761-52B0-42C5-B01B-DF8F69615AE5}" type="datetimeFigureOut">
               <a:rPr lang="en-US" smtClean="0"/>
-              <a:t>04/22/2019</a:t>
+              <a:t>4/22/2019</a:t>
             </a:fld>
             <a:endParaRPr lang="en-US"/>
           </a:p>
@@ -665,7 +676,7 @@
           <a:p>
             <a:fld id="{A0EC2761-52B0-42C5-B01B-DF8F69615AE5}" type="datetimeFigureOut">
               <a:rPr lang="en-US" smtClean="0"/>
-              <a:t>04/22/2019</a:t>
+              <a:t>4/22/2019</a:t>
             </a:fld>
             <a:endParaRPr lang="en-US"/>
           </a:p>
@@ -833,7 +844,7 @@
           <a:p>
             <a:fld id="{A0EC2761-52B0-42C5-B01B-DF8F69615AE5}" type="datetimeFigureOut">
               <a:rPr lang="en-US" smtClean="0"/>
-              <a:t>04/22/2019</a:t>
+              <a:t>4/22/2019</a:t>
             </a:fld>
             <a:endParaRPr lang="en-US"/>
           </a:p>
@@ -1078,7 +1089,7 @@
           <a:p>
             <a:fld id="{A0EC2761-52B0-42C5-B01B-DF8F69615AE5}" type="datetimeFigureOut">
               <a:rPr lang="en-US" smtClean="0"/>
-              <a:t>04/22/2019</a:t>
+              <a:t>4/22/2019</a:t>
             </a:fld>
             <a:endParaRPr lang="en-US"/>
           </a:p>
@@ -1307,7 +1318,7 @@
           <a:p>
             <a:fld id="{A0EC2761-52B0-42C5-B01B-DF8F69615AE5}" type="datetimeFigureOut">
               <a:rPr lang="en-US" smtClean="0"/>
-              <a:t>04/22/2019</a:t>
+              <a:t>4/22/2019</a:t>
             </a:fld>
             <a:endParaRPr lang="en-US"/>
           </a:p>
@@ -1671,7 +1682,7 @@
           <a:p>
             <a:fld id="{A0EC2761-52B0-42C5-B01B-DF8F69615AE5}" type="datetimeFigureOut">
               <a:rPr lang="en-US" smtClean="0"/>
-              <a:t>04/22/2019</a:t>
+              <a:t>4/22/2019</a:t>
             </a:fld>
             <a:endParaRPr lang="en-US"/>
           </a:p>
@@ -1780,7 +1791,7 @@
           <a:p>
             <a:fld id="{A0EC2761-52B0-42C5-B01B-DF8F69615AE5}" type="datetimeFigureOut">
               <a:rPr lang="en-US" smtClean="0"/>
-              <a:t>04/22/2019</a:t>
+              <a:t>4/22/2019</a:t>
             </a:fld>
             <a:endParaRPr lang="en-US"/>
           </a:p>
@@ -1889,7 +1900,7 @@
           <a:p>
             <a:fld id="{A0EC2761-52B0-42C5-B01B-DF8F69615AE5}" type="datetimeFigureOut">
               <a:rPr lang="en-US" smtClean="0"/>
-              <a:t>04/22/2019</a:t>
+              <a:t>4/22/2019</a:t>
             </a:fld>
             <a:endParaRPr lang="en-US"/>
           </a:p>
@@ -2164,7 +2175,7 @@
           <a:p>
             <a:fld id="{A0EC2761-52B0-42C5-B01B-DF8F69615AE5}" type="datetimeFigureOut">
               <a:rPr lang="en-US" smtClean="0"/>
-              <a:t>04/22/2019</a:t>
+              <a:t>4/22/2019</a:t>
             </a:fld>
             <a:endParaRPr lang="en-US"/>
           </a:p>
@@ -2419,7 +2430,7 @@
           <a:p>
             <a:fld id="{A0EC2761-52B0-42C5-B01B-DF8F69615AE5}" type="datetimeFigureOut">
               <a:rPr lang="en-US" smtClean="0"/>
-              <a:t>04/22/2019</a:t>
+              <a:t>4/22/2019</a:t>
             </a:fld>
             <a:endParaRPr lang="en-US"/>
           </a:p>
@@ -2639,7 +2650,7 @@
           <a:p>
             <a:fld id="{A0EC2761-52B0-42C5-B01B-DF8F69615AE5}" type="datetimeFigureOut">
               <a:rPr lang="en-US" smtClean="0"/>
-              <a:t>04/22/2019</a:t>
+              <a:t>4/22/2019</a:t>
             </a:fld>
             <a:endParaRPr lang="en-US"/>
           </a:p>
@@ -3081,10 +3092,6 @@
           </a:bodyPr>
           <a:lstStyle/>
           <a:p>
-            <a:r>
-              <a:rPr lang="en-US" dirty="0"/>
-              <a:t/>
-            </a:r>
             <a:br>
               <a:rPr lang="en-US" dirty="0"/>
             </a:br>
@@ -3211,13 +3218,6 @@
   <p:clrMapOvr>
     <a:masterClrMapping/>
   </p:clrMapOvr>
-  <p:timing>
-    <p:tnLst>
-      <p:par>
-        <p:cTn id="1" dur="indefinite" restart="never" nodeType="tmRoot"/>
-      </p:par>
-    </p:tnLst>
-  </p:timing>
 </p:sld>
 </file>
 
@@ -3243,7 +3243,7 @@
           <p:cNvPr id="2" name="Title 1">
             <a:extLst>
               <a:ext uri="{FF2B5EF4-FFF2-40B4-BE49-F238E27FC236}">
-                <a16:creationId xmlns:a16="http://schemas.microsoft.com/office/drawing/2014/main" xmlns="" id="{5ACC0826-E80F-43C0-912C-275EB710142B}"/>
+                <a16:creationId xmlns:a16="http://schemas.microsoft.com/office/drawing/2014/main" id="{5ACC0826-E80F-43C0-912C-275EB710142B}"/>
               </a:ext>
             </a:extLst>
           </p:cNvPr>
@@ -3272,7 +3272,7 @@
           <p:cNvPr id="4" name="Chỗ dành sẵn cho Nội dung 3">
             <a:extLst>
               <a:ext uri="{FF2B5EF4-FFF2-40B4-BE49-F238E27FC236}">
-                <a16:creationId xmlns:a16="http://schemas.microsoft.com/office/drawing/2014/main" xmlns="" id="{0A469280-6A1E-4F41-B2DD-5119847FC0AE}"/>
+                <a16:creationId xmlns:a16="http://schemas.microsoft.com/office/drawing/2014/main" id="{0A469280-6A1E-4F41-B2DD-5119847FC0AE}"/>
               </a:ext>
             </a:extLst>
           </p:cNvPr>
@@ -3297,7 +3297,7 @@
           <p:cNvPr id="7" name="Picture 4">
             <a:extLst>
               <a:ext uri="{FF2B5EF4-FFF2-40B4-BE49-F238E27FC236}">
-                <a16:creationId xmlns:a16="http://schemas.microsoft.com/office/drawing/2014/main" xmlns="" id="{39DD662D-CB28-4668-B1E8-32650552B55D}"/>
+                <a16:creationId xmlns:a16="http://schemas.microsoft.com/office/drawing/2014/main" id="{39DD662D-CB28-4668-B1E8-32650552B55D}"/>
               </a:ext>
             </a:extLst>
           </p:cNvPr>
@@ -3362,13 +3362,6 @@
   <p:clrMapOvr>
     <a:masterClrMapping/>
   </p:clrMapOvr>
-  <p:timing>
-    <p:tnLst>
-      <p:par>
-        <p:cTn id="1" dur="indefinite" restart="never" nodeType="tmRoot"/>
-      </p:par>
-    </p:tnLst>
-  </p:timing>
 </p:sld>
 </file>
 
@@ -3394,7 +3387,7 @@
           <p:cNvPr id="2" name="Title 1">
             <a:extLst>
               <a:ext uri="{FF2B5EF4-FFF2-40B4-BE49-F238E27FC236}">
-                <a16:creationId xmlns:a16="http://schemas.microsoft.com/office/drawing/2014/main" xmlns="" id="{5ACC0826-E80F-43C0-912C-275EB710142B}"/>
+                <a16:creationId xmlns:a16="http://schemas.microsoft.com/office/drawing/2014/main" id="{5ACC0826-E80F-43C0-912C-275EB710142B}"/>
               </a:ext>
             </a:extLst>
           </p:cNvPr>
@@ -3423,7 +3416,7 @@
           <p:cNvPr id="5" name="Content Placeholder 4">
             <a:extLst>
               <a:ext uri="{FF2B5EF4-FFF2-40B4-BE49-F238E27FC236}">
-                <a16:creationId xmlns:a16="http://schemas.microsoft.com/office/drawing/2014/main" xmlns="" id="{4E1977E1-8DF3-44ED-9AA8-EFF16C548E55}"/>
+                <a16:creationId xmlns:a16="http://schemas.microsoft.com/office/drawing/2014/main" id="{4E1977E1-8DF3-44ED-9AA8-EFF16C548E55}"/>
               </a:ext>
             </a:extLst>
           </p:cNvPr>
@@ -3490,13 +3483,6 @@
   <p:clrMapOvr>
     <a:masterClrMapping/>
   </p:clrMapOvr>
-  <p:timing>
-    <p:tnLst>
-      <p:par>
-        <p:cTn id="1" dur="indefinite" restart="never" nodeType="tmRoot"/>
-      </p:par>
-    </p:tnLst>
-  </p:timing>
 </p:sld>
 </file>
 
@@ -3522,7 +3508,7 @@
           <p:cNvPr id="2" name="Title 1">
             <a:extLst>
               <a:ext uri="{FF2B5EF4-FFF2-40B4-BE49-F238E27FC236}">
-                <a16:creationId xmlns:a16="http://schemas.microsoft.com/office/drawing/2014/main" xmlns="" id="{5ACC0826-E80F-43C0-912C-275EB710142B}"/>
+                <a16:creationId xmlns:a16="http://schemas.microsoft.com/office/drawing/2014/main" id="{5ACC0826-E80F-43C0-912C-275EB710142B}"/>
               </a:ext>
             </a:extLst>
           </p:cNvPr>
@@ -3551,7 +3537,7 @@
           <p:cNvPr id="5" name="Content Placeholder 4">
             <a:extLst>
               <a:ext uri="{FF2B5EF4-FFF2-40B4-BE49-F238E27FC236}">
-                <a16:creationId xmlns:a16="http://schemas.microsoft.com/office/drawing/2014/main" xmlns="" id="{5B03456F-79BE-41C7-B6C5-6C409495C03C}"/>
+                <a16:creationId xmlns:a16="http://schemas.microsoft.com/office/drawing/2014/main" id="{5B03456F-79BE-41C7-B6C5-6C409495C03C}"/>
               </a:ext>
             </a:extLst>
           </p:cNvPr>
@@ -3618,13 +3604,6 @@
   <p:clrMapOvr>
     <a:masterClrMapping/>
   </p:clrMapOvr>
-  <p:timing>
-    <p:tnLst>
-      <p:par>
-        <p:cTn id="1" dur="indefinite" restart="never" nodeType="tmRoot"/>
-      </p:par>
-    </p:tnLst>
-  </p:timing>
 </p:sld>
 </file>
 
@@ -3650,7 +3629,7 @@
           <p:cNvPr id="2" name="Title 1">
             <a:extLst>
               <a:ext uri="{FF2B5EF4-FFF2-40B4-BE49-F238E27FC236}">
-                <a16:creationId xmlns:a16="http://schemas.microsoft.com/office/drawing/2014/main" xmlns="" id="{5ACC0826-E80F-43C0-912C-275EB710142B}"/>
+                <a16:creationId xmlns:a16="http://schemas.microsoft.com/office/drawing/2014/main" id="{5ACC0826-E80F-43C0-912C-275EB710142B}"/>
               </a:ext>
             </a:extLst>
           </p:cNvPr>
@@ -3679,7 +3658,7 @@
           <p:cNvPr id="6" name="Hình chữ nhật 5">
             <a:extLst>
               <a:ext uri="{FF2B5EF4-FFF2-40B4-BE49-F238E27FC236}">
-                <a16:creationId xmlns:a16="http://schemas.microsoft.com/office/drawing/2014/main" xmlns="" id="{7A04BA52-21EB-40DE-88A4-D4C2D6586CD0}"/>
+                <a16:creationId xmlns:a16="http://schemas.microsoft.com/office/drawing/2014/main" id="{7A04BA52-21EB-40DE-88A4-D4C2D6586CD0}"/>
               </a:ext>
             </a:extLst>
           </p:cNvPr>
@@ -3830,7 +3809,7 @@
           <p:cNvPr id="7" name="Hình chữ nhật 6">
             <a:extLst>
               <a:ext uri="{FF2B5EF4-FFF2-40B4-BE49-F238E27FC236}">
-                <a16:creationId xmlns:a16="http://schemas.microsoft.com/office/drawing/2014/main" xmlns="" id="{4A43D711-8E32-409E-A887-D6368D577BD0}"/>
+                <a16:creationId xmlns:a16="http://schemas.microsoft.com/office/drawing/2014/main" id="{4A43D711-8E32-409E-A887-D6368D577BD0}"/>
               </a:ext>
             </a:extLst>
           </p:cNvPr>
@@ -3965,13 +3944,6 @@
   <p:clrMapOvr>
     <a:masterClrMapping/>
   </p:clrMapOvr>
-  <p:timing>
-    <p:tnLst>
-      <p:par>
-        <p:cTn id="1" dur="indefinite" restart="never" nodeType="tmRoot"/>
-      </p:par>
-    </p:tnLst>
-  </p:timing>
 </p:sld>
 </file>
 
@@ -3997,7 +3969,7 @@
           <p:cNvPr id="2" name="Title 1">
             <a:extLst>
               <a:ext uri="{FF2B5EF4-FFF2-40B4-BE49-F238E27FC236}">
-                <a16:creationId xmlns:a16="http://schemas.microsoft.com/office/drawing/2014/main" xmlns="" id="{5ACC0826-E80F-43C0-912C-275EB710142B}"/>
+                <a16:creationId xmlns:a16="http://schemas.microsoft.com/office/drawing/2014/main" id="{5ACC0826-E80F-43C0-912C-275EB710142B}"/>
               </a:ext>
             </a:extLst>
           </p:cNvPr>
@@ -4159,13 +4131,6 @@
   <p:clrMapOvr>
     <a:masterClrMapping/>
   </p:clrMapOvr>
-  <p:timing>
-    <p:tnLst>
-      <p:par>
-        <p:cTn id="1" dur="indefinite" restart="never" nodeType="tmRoot"/>
-      </p:par>
-    </p:tnLst>
-  </p:timing>
 </p:sld>
 </file>
 
@@ -4191,7 +4156,7 @@
           <p:cNvPr id="2" name="Title 1">
             <a:extLst>
               <a:ext uri="{FF2B5EF4-FFF2-40B4-BE49-F238E27FC236}">
-                <a16:creationId xmlns:a16="http://schemas.microsoft.com/office/drawing/2014/main" xmlns="" id="{5ACC0826-E80F-43C0-912C-275EB710142B}"/>
+                <a16:creationId xmlns:a16="http://schemas.microsoft.com/office/drawing/2014/main" id="{5ACC0826-E80F-43C0-912C-275EB710142B}"/>
               </a:ext>
             </a:extLst>
           </p:cNvPr>
@@ -4220,7 +4185,7 @@
           <p:cNvPr id="4" name="Chỗ dành sẵn cho Nội dung 3">
             <a:extLst>
               <a:ext uri="{FF2B5EF4-FFF2-40B4-BE49-F238E27FC236}">
-                <a16:creationId xmlns:a16="http://schemas.microsoft.com/office/drawing/2014/main" xmlns="" id="{E7382999-E9BD-45F8-97D5-A50B26B12803}"/>
+                <a16:creationId xmlns:a16="http://schemas.microsoft.com/office/drawing/2014/main" id="{E7382999-E9BD-45F8-97D5-A50B26B12803}"/>
               </a:ext>
             </a:extLst>
           </p:cNvPr>
@@ -4250,13 +4215,6 @@
   <p:clrMapOvr>
     <a:masterClrMapping/>
   </p:clrMapOvr>
-  <p:timing>
-    <p:tnLst>
-      <p:par>
-        <p:cTn id="1" dur="indefinite" restart="never" nodeType="tmRoot"/>
-      </p:par>
-    </p:tnLst>
-  </p:timing>
 </p:sld>
 </file>
 
@@ -4282,7 +4240,7 @@
           <p:cNvPr id="2" name="Title 1">
             <a:extLst>
               <a:ext uri="{FF2B5EF4-FFF2-40B4-BE49-F238E27FC236}">
-                <a16:creationId xmlns:a16="http://schemas.microsoft.com/office/drawing/2014/main" xmlns="" id="{5ACC0826-E80F-43C0-912C-275EB710142B}"/>
+                <a16:creationId xmlns:a16="http://schemas.microsoft.com/office/drawing/2014/main" id="{5ACC0826-E80F-43C0-912C-275EB710142B}"/>
               </a:ext>
             </a:extLst>
           </p:cNvPr>
@@ -4311,7 +4269,7 @@
           <p:cNvPr id="4" name="Chỗ dành sẵn cho Nội dung 3">
             <a:extLst>
               <a:ext uri="{FF2B5EF4-FFF2-40B4-BE49-F238E27FC236}">
-                <a16:creationId xmlns:a16="http://schemas.microsoft.com/office/drawing/2014/main" xmlns="" id="{E7382999-E9BD-45F8-97D5-A50B26B12803}"/>
+                <a16:creationId xmlns:a16="http://schemas.microsoft.com/office/drawing/2014/main" id="{E7382999-E9BD-45F8-97D5-A50B26B12803}"/>
               </a:ext>
             </a:extLst>
           </p:cNvPr>
@@ -4341,13 +4299,6 @@
   <p:clrMapOvr>
     <a:masterClrMapping/>
   </p:clrMapOvr>
-  <p:timing>
-    <p:tnLst>
-      <p:par>
-        <p:cTn id="1" dur="indefinite" restart="never" nodeType="tmRoot"/>
-      </p:par>
-    </p:tnLst>
-  </p:timing>
 </p:sld>
 </file>
 
@@ -4373,7 +4324,7 @@
           <p:cNvPr id="2" name="Title 1">
             <a:extLst>
               <a:ext uri="{FF2B5EF4-FFF2-40B4-BE49-F238E27FC236}">
-                <a16:creationId xmlns:a16="http://schemas.microsoft.com/office/drawing/2014/main" xmlns="" id="{5ACC0826-E80F-43C0-912C-275EB710142B}"/>
+                <a16:creationId xmlns:a16="http://schemas.microsoft.com/office/drawing/2014/main" id="{5ACC0826-E80F-43C0-912C-275EB710142B}"/>
               </a:ext>
             </a:extLst>
           </p:cNvPr>
@@ -4401,7 +4352,7 @@
           <p:cNvPr id="4" name="Chỗ dành sẵn cho Nội dung 3">
             <a:extLst>
               <a:ext uri="{FF2B5EF4-FFF2-40B4-BE49-F238E27FC236}">
-                <a16:creationId xmlns:a16="http://schemas.microsoft.com/office/drawing/2014/main" xmlns="" id="{E7382999-E9BD-45F8-97D5-A50B26B12803}"/>
+                <a16:creationId xmlns:a16="http://schemas.microsoft.com/office/drawing/2014/main" id="{E7382999-E9BD-45F8-97D5-A50B26B12803}"/>
               </a:ext>
             </a:extLst>
           </p:cNvPr>
@@ -4423,7 +4374,7 @@
           <a:lstStyle/>
           <a:p>
             <a:r>
-              <a:rPr lang="en-US" dirty="0" smtClean="0"/>
+              <a:rPr lang="en-US" dirty="0"/>
               <a:t>Chi tiết hoá sơ đồ hàm expression:</a:t>
             </a:r>
             <a:endParaRPr lang="vi-VN" dirty="0"/>
@@ -4504,13 +4455,6 @@
   <p:clrMapOvr>
     <a:masterClrMapping/>
   </p:clrMapOvr>
-  <p:timing>
-    <p:tnLst>
-      <p:par>
-        <p:cTn id="1" dur="indefinite" restart="never" nodeType="tmRoot"/>
-      </p:par>
-    </p:tnLst>
-  </p:timing>
 </p:sld>
 </file>
 
@@ -4536,7 +4480,7 @@
           <p:cNvPr id="2" name="Title 1">
             <a:extLst>
               <a:ext uri="{FF2B5EF4-FFF2-40B4-BE49-F238E27FC236}">
-                <a16:creationId xmlns:a16="http://schemas.microsoft.com/office/drawing/2014/main" xmlns="" id="{5ACC0826-E80F-43C0-912C-275EB710142B}"/>
+                <a16:creationId xmlns:a16="http://schemas.microsoft.com/office/drawing/2014/main" id="{5ACC0826-E80F-43C0-912C-275EB710142B}"/>
               </a:ext>
             </a:extLst>
           </p:cNvPr>
@@ -4564,7 +4508,7 @@
           <p:cNvPr id="4" name="Chỗ dành sẵn cho Nội dung 3">
             <a:extLst>
               <a:ext uri="{FF2B5EF4-FFF2-40B4-BE49-F238E27FC236}">
-                <a16:creationId xmlns:a16="http://schemas.microsoft.com/office/drawing/2014/main" xmlns="" id="{E7382999-E9BD-45F8-97D5-A50B26B12803}"/>
+                <a16:creationId xmlns:a16="http://schemas.microsoft.com/office/drawing/2014/main" id="{E7382999-E9BD-45F8-97D5-A50B26B12803}"/>
               </a:ext>
             </a:extLst>
           </p:cNvPr>
@@ -4701,7 +4645,6 @@
               <a:rPr lang="vi-VN" dirty="0"/>
               <a:t>}</a:t>
             </a:r>
-            <a:endParaRPr lang="vi-VN" dirty="0"/>
           </a:p>
         </p:txBody>
       </p:sp>
@@ -4710,7 +4653,7 @@
           <p:cNvPr id="6" name="Chỗ dành sẵn cho Nội dung 3">
             <a:extLst>
               <a:ext uri="{FF2B5EF4-FFF2-40B4-BE49-F238E27FC236}">
-                <a16:creationId xmlns:a16="http://schemas.microsoft.com/office/drawing/2014/main" xmlns="" id="{E7382999-E9BD-45F8-97D5-A50B26B12803}"/>
+                <a16:creationId xmlns:a16="http://schemas.microsoft.com/office/drawing/2014/main" id="{E7382999-E9BD-45F8-97D5-A50B26B12803}"/>
               </a:ext>
             </a:extLst>
           </p:cNvPr>
@@ -4961,13 +4904,6 @@
   <p:clrMapOvr>
     <a:masterClrMapping/>
   </p:clrMapOvr>
-  <p:timing>
-    <p:tnLst>
-      <p:par>
-        <p:cTn id="1" dur="indefinite" restart="never" nodeType="tmRoot"/>
-      </p:par>
-    </p:tnLst>
-  </p:timing>
 </p:sld>
 </file>
 
@@ -5070,13 +5006,8 @@
           <a:p>
             <a:r>
               <a:rPr lang="en-US" dirty="0"/>
-              <a:t>      break</a:t>
-            </a:r>
-            <a:r>
-              <a:rPr lang="en-US" dirty="0" smtClean="0"/>
-              <a:t>;</a:t>
-            </a:r>
-            <a:endParaRPr lang="en-US" dirty="0"/>
+              <a:t>      break;</a:t>
+            </a:r>
           </a:p>
           <a:p>
             <a:r>
@@ -5105,11 +5036,7 @@
           <a:p>
             <a:r>
               <a:rPr lang="en-US" dirty="0"/>
-              <a:t>      break</a:t>
-            </a:r>
-            <a:r>
-              <a:rPr lang="en-US" dirty="0" smtClean="0"/>
-              <a:t>;</a:t>
+              <a:t>      break;</a:t>
             </a:r>
           </a:p>
           <a:p>
@@ -5139,11 +5066,7 @@
           <a:p>
             <a:r>
               <a:rPr lang="en-US" dirty="0"/>
-              <a:t>  // Follow (For statement</a:t>
-            </a:r>
-            <a:r>
-              <a:rPr lang="en-US" dirty="0" smtClean="0"/>
-              <a:t>)</a:t>
+              <a:t>  // Follow (For statement)</a:t>
             </a:r>
           </a:p>
           <a:p>
@@ -5368,12 +5291,8 @@
           </a:lstStyle>
           <a:p>
             <a:r>
-              <a:rPr lang="en-US" dirty="0" smtClean="0"/>
-              <a:t>// </a:t>
-            </a:r>
-            <a:r>
               <a:rPr lang="en-US" dirty="0"/>
-              <a:t>Follow (arguments2)</a:t>
+              <a:t>// Follow (arguments2)</a:t>
             </a:r>
           </a:p>
           <a:p>
@@ -5514,13 +5433,6 @@
   <p:clrMapOvr>
     <a:masterClrMapping/>
   </p:clrMapOvr>
-  <p:timing>
-    <p:tnLst>
-      <p:par>
-        <p:cTn id="1" dur="indefinite" restart="never" nodeType="tmRoot"/>
-      </p:par>
-    </p:tnLst>
-  </p:timing>
 </p:sld>
 </file>
 
@@ -5546,7 +5458,7 @@
           <p:cNvPr id="2" name="Title 1">
             <a:extLst>
               <a:ext uri="{FF2B5EF4-FFF2-40B4-BE49-F238E27FC236}">
-                <a16:creationId xmlns:a16="http://schemas.microsoft.com/office/drawing/2014/main" xmlns="" id="{97AE80AE-7311-46F5-85B1-A0A9E23E593D}"/>
+                <a16:creationId xmlns:a16="http://schemas.microsoft.com/office/drawing/2014/main" id="{97AE80AE-7311-46F5-85B1-A0A9E23E593D}"/>
               </a:ext>
             </a:extLst>
           </p:cNvPr>
@@ -5580,7 +5492,7 @@
           <p:cNvPr id="5" name="Chỗ dành sẵn cho Nội dung 4">
             <a:extLst>
               <a:ext uri="{FF2B5EF4-FFF2-40B4-BE49-F238E27FC236}">
-                <a16:creationId xmlns:a16="http://schemas.microsoft.com/office/drawing/2014/main" xmlns="" id="{C1B98B62-79E0-4981-BDFD-C14A9E3AD6A4}"/>
+                <a16:creationId xmlns:a16="http://schemas.microsoft.com/office/drawing/2014/main" id="{C1B98B62-79E0-4981-BDFD-C14A9E3AD6A4}"/>
               </a:ext>
             </a:extLst>
           </p:cNvPr>
@@ -5647,7 +5559,7 @@
           <p:cNvPr id="2050" name="Picture 2" descr="HÃ¬nh áº£nh cÃ³ liÃªn quan">
             <a:extLst>
               <a:ext uri="{FF2B5EF4-FFF2-40B4-BE49-F238E27FC236}">
-                <a16:creationId xmlns:a16="http://schemas.microsoft.com/office/drawing/2014/main" xmlns="" id="{9D9A1309-1337-4C6E-ABD1-4FC3B9921479}"/>
+                <a16:creationId xmlns:a16="http://schemas.microsoft.com/office/drawing/2014/main" id="{9D9A1309-1337-4C6E-ABD1-4FC3B9921479}"/>
               </a:ext>
             </a:extLst>
           </p:cNvPr>
@@ -5694,7 +5606,7 @@
           <p:cNvPr id="6" name="Hình chữ nhật 5">
             <a:extLst>
               <a:ext uri="{FF2B5EF4-FFF2-40B4-BE49-F238E27FC236}">
-                <a16:creationId xmlns:a16="http://schemas.microsoft.com/office/drawing/2014/main" xmlns="" id="{E8D2F1D0-4175-44C4-ADF8-52AD40705026}"/>
+                <a16:creationId xmlns:a16="http://schemas.microsoft.com/office/drawing/2014/main" id="{E8D2F1D0-4175-44C4-ADF8-52AD40705026}"/>
               </a:ext>
             </a:extLst>
           </p:cNvPr>
@@ -5733,13 +5645,6 @@
   <p:clrMapOvr>
     <a:masterClrMapping/>
   </p:clrMapOvr>
-  <p:timing>
-    <p:tnLst>
-      <p:par>
-        <p:cTn id="1" dur="indefinite" restart="never" nodeType="tmRoot"/>
-      </p:par>
-    </p:tnLst>
-  </p:timing>
 </p:sld>
 </file>
 
@@ -5765,7 +5670,7 @@
           <p:cNvPr id="2" name="Title 1">
             <a:extLst>
               <a:ext uri="{FF2B5EF4-FFF2-40B4-BE49-F238E27FC236}">
-                <a16:creationId xmlns:a16="http://schemas.microsoft.com/office/drawing/2014/main" xmlns="" id="{5ACC0826-E80F-43C0-912C-275EB710142B}"/>
+                <a16:creationId xmlns:a16="http://schemas.microsoft.com/office/drawing/2014/main" id="{5ACC0826-E80F-43C0-912C-275EB710142B}"/>
               </a:ext>
             </a:extLst>
           </p:cNvPr>
@@ -5794,7 +5699,7 @@
           <p:cNvPr id="4" name="Chỗ dành sẵn cho Nội dung 3">
             <a:extLst>
               <a:ext uri="{FF2B5EF4-FFF2-40B4-BE49-F238E27FC236}">
-                <a16:creationId xmlns:a16="http://schemas.microsoft.com/office/drawing/2014/main" xmlns="" id="{E7382999-E9BD-45F8-97D5-A50B26B12803}"/>
+                <a16:creationId xmlns:a16="http://schemas.microsoft.com/office/drawing/2014/main" id="{E7382999-E9BD-45F8-97D5-A50B26B12803}"/>
               </a:ext>
             </a:extLst>
           </p:cNvPr>
@@ -5904,7 +5809,7 @@
           <p:cNvPr id="3" name="Hình ảnh 2">
             <a:extLst>
               <a:ext uri="{FF2B5EF4-FFF2-40B4-BE49-F238E27FC236}">
-                <a16:creationId xmlns:a16="http://schemas.microsoft.com/office/drawing/2014/main" xmlns="" id="{F7A698DA-C062-4A19-AD9C-FDE8B240B6D4}"/>
+                <a16:creationId xmlns:a16="http://schemas.microsoft.com/office/drawing/2014/main" id="{F7A698DA-C062-4A19-AD9C-FDE8B240B6D4}"/>
               </a:ext>
             </a:extLst>
           </p:cNvPr>
@@ -5934,7 +5839,7 @@
           <p:cNvPr id="5" name="Hình ảnh 4">
             <a:extLst>
               <a:ext uri="{FF2B5EF4-FFF2-40B4-BE49-F238E27FC236}">
-                <a16:creationId xmlns:a16="http://schemas.microsoft.com/office/drawing/2014/main" xmlns="" id="{8633F968-44C4-4278-806D-B737BCF29216}"/>
+                <a16:creationId xmlns:a16="http://schemas.microsoft.com/office/drawing/2014/main" id="{8633F968-44C4-4278-806D-B737BCF29216}"/>
               </a:ext>
             </a:extLst>
           </p:cNvPr>
@@ -5969,13 +5874,6 @@
   <p:clrMapOvr>
     <a:masterClrMapping/>
   </p:clrMapOvr>
-  <p:timing>
-    <p:tnLst>
-      <p:par>
-        <p:cTn id="1" dur="indefinite" restart="never" nodeType="tmRoot"/>
-      </p:par>
-    </p:tnLst>
-  </p:timing>
 </p:sld>
 </file>
 
@@ -6001,7 +5899,7 @@
           <p:cNvPr id="2" name="Title 1">
             <a:extLst>
               <a:ext uri="{FF2B5EF4-FFF2-40B4-BE49-F238E27FC236}">
-                <a16:creationId xmlns:a16="http://schemas.microsoft.com/office/drawing/2014/main" xmlns="" id="{5ACC0826-E80F-43C0-912C-275EB710142B}"/>
+                <a16:creationId xmlns:a16="http://schemas.microsoft.com/office/drawing/2014/main" id="{5ACC0826-E80F-43C0-912C-275EB710142B}"/>
               </a:ext>
             </a:extLst>
           </p:cNvPr>
@@ -6030,7 +5928,7 @@
           <p:cNvPr id="4" name="Chỗ dành sẵn cho Nội dung 3">
             <a:extLst>
               <a:ext uri="{FF2B5EF4-FFF2-40B4-BE49-F238E27FC236}">
-                <a16:creationId xmlns:a16="http://schemas.microsoft.com/office/drawing/2014/main" xmlns="" id="{E7382999-E9BD-45F8-97D5-A50B26B12803}"/>
+                <a16:creationId xmlns:a16="http://schemas.microsoft.com/office/drawing/2014/main" id="{E7382999-E9BD-45F8-97D5-A50B26B12803}"/>
               </a:ext>
             </a:extLst>
           </p:cNvPr>
@@ -6058,7 +5956,7 @@
           <p:cNvPr id="6" name="Hình ảnh 5">
             <a:extLst>
               <a:ext uri="{FF2B5EF4-FFF2-40B4-BE49-F238E27FC236}">
-                <a16:creationId xmlns:a16="http://schemas.microsoft.com/office/drawing/2014/main" xmlns="" id="{0DEE32F3-97A6-4FC5-9AEC-59868DAD4015}"/>
+                <a16:creationId xmlns:a16="http://schemas.microsoft.com/office/drawing/2014/main" id="{0DEE32F3-97A6-4FC5-9AEC-59868DAD4015}"/>
               </a:ext>
             </a:extLst>
           </p:cNvPr>
@@ -6075,8 +5973,8 @@
         </p:blipFill>
         <p:spPr>
           <a:xfrm>
-            <a:off x="710215" y="1378089"/>
-            <a:ext cx="2468208" cy="1927006"/>
+            <a:off x="5778961" y="1260777"/>
+            <a:ext cx="2736389" cy="2136383"/>
           </a:xfrm>
           <a:prstGeom prst="rect">
             <a:avLst/>
@@ -6085,10 +5983,10 @@
       </p:pic>
       <p:pic>
         <p:nvPicPr>
-          <p:cNvPr id="7" name="Hình ảnh 6">
+          <p:cNvPr id="3" name="Hình ảnh 2">
             <a:extLst>
               <a:ext uri="{FF2B5EF4-FFF2-40B4-BE49-F238E27FC236}">
-                <a16:creationId xmlns:a16="http://schemas.microsoft.com/office/drawing/2014/main" xmlns="" id="{4DF761AF-121F-402B-A042-AFF3F2ED7C95}"/>
+                <a16:creationId xmlns:a16="http://schemas.microsoft.com/office/drawing/2014/main" id="{61225462-772F-402F-BDE1-AF33A3D30483}"/>
               </a:ext>
             </a:extLst>
           </p:cNvPr>
@@ -6105,38 +6003,8 @@
         </p:blipFill>
         <p:spPr>
           <a:xfrm>
-            <a:off x="3870508" y="1409977"/>
-            <a:ext cx="4726959" cy="2279370"/>
-          </a:xfrm>
-          <a:prstGeom prst="rect">
-            <a:avLst/>
-          </a:prstGeom>
-        </p:spPr>
-      </p:pic>
-      <p:pic>
-        <p:nvPicPr>
-          <p:cNvPr id="9" name="Hình ảnh 8">
-            <a:extLst>
-              <a:ext uri="{FF2B5EF4-FFF2-40B4-BE49-F238E27FC236}">
-                <a16:creationId xmlns:a16="http://schemas.microsoft.com/office/drawing/2014/main" xmlns="" id="{521A33BB-96ED-4313-A2B4-DBFF004538E8}"/>
-              </a:ext>
-            </a:extLst>
-          </p:cNvPr>
-          <p:cNvPicPr>
-            <a:picLocks noChangeAspect="1"/>
-          </p:cNvPicPr>
-          <p:nvPr/>
-        </p:nvPicPr>
-        <p:blipFill>
-          <a:blip r:embed="rId4"/>
-          <a:stretch>
-            <a:fillRect/>
-          </a:stretch>
-        </p:blipFill>
-        <p:spPr>
-          <a:xfrm>
-            <a:off x="3870509" y="3797299"/>
-            <a:ext cx="4726958" cy="2878760"/>
+            <a:off x="546533" y="1260777"/>
+            <a:ext cx="4815580" cy="3751174"/>
           </a:xfrm>
           <a:prstGeom prst="rect">
             <a:avLst/>
@@ -6145,10 +6013,10 @@
       </p:pic>
       <p:sp>
         <p:nvSpPr>
-          <p:cNvPr id="10" name="Hộp Văn bản 9">
+          <p:cNvPr id="5" name="Hộp Văn bản 4">
             <a:extLst>
               <a:ext uri="{FF2B5EF4-FFF2-40B4-BE49-F238E27FC236}">
-                <a16:creationId xmlns:a16="http://schemas.microsoft.com/office/drawing/2014/main" xmlns="" id="{494E8589-E9FE-4B5E-B8AD-99939A4259E5}"/>
+                <a16:creationId xmlns:a16="http://schemas.microsoft.com/office/drawing/2014/main" id="{FC21E7AD-CCFD-4F16-8319-9D3457C45A53}"/>
               </a:ext>
             </a:extLst>
           </p:cNvPr>
@@ -6157,8 +6025,8 @@
         </p:nvSpPr>
         <p:spPr>
           <a:xfrm>
-            <a:off x="710215" y="3689347"/>
-            <a:ext cx="2468208" cy="1061829"/>
+            <a:off x="488950" y="5214677"/>
+            <a:ext cx="8026400" cy="415498"/>
           </a:xfrm>
           <a:prstGeom prst="rect">
             <a:avLst/>
@@ -6173,7 +6041,7 @@
           <a:p>
             <a:r>
               <a:rPr lang="en-US" sz="2100"/>
-              <a:t>Khi nào thì xảy ra lỗi ERR_INVALIDPARAM ???</a:t>
+              <a:t>Khi nào xảy ra lỗi ERR_INVALIDPARAM ???</a:t>
             </a:r>
             <a:endParaRPr lang="vi-VN" sz="2100"/>
           </a:p>
@@ -6189,13 +6057,6 @@
   <p:clrMapOvr>
     <a:masterClrMapping/>
   </p:clrMapOvr>
-  <p:timing>
-    <p:tnLst>
-      <p:par>
-        <p:cTn id="1" dur="indefinite" restart="never" nodeType="tmRoot"/>
-      </p:par>
-    </p:tnLst>
-  </p:timing>
 </p:sld>
 </file>
 
@@ -6221,7 +6082,7 @@
           <p:cNvPr id="2" name="Title 1">
             <a:extLst>
               <a:ext uri="{FF2B5EF4-FFF2-40B4-BE49-F238E27FC236}">
-                <a16:creationId xmlns:a16="http://schemas.microsoft.com/office/drawing/2014/main" xmlns="" id="{5ACC0826-E80F-43C0-912C-275EB710142B}"/>
+                <a16:creationId xmlns:a16="http://schemas.microsoft.com/office/drawing/2014/main" id="{5ACC0826-E80F-43C0-912C-275EB710142B}"/>
               </a:ext>
             </a:extLst>
           </p:cNvPr>
@@ -6250,7 +6111,7 @@
           <p:cNvPr id="11" name="Content Placeholder 10">
             <a:extLst>
               <a:ext uri="{FF2B5EF4-FFF2-40B4-BE49-F238E27FC236}">
-                <a16:creationId xmlns:a16="http://schemas.microsoft.com/office/drawing/2014/main" xmlns="" id="{8B7FD5CB-296B-4C10-9CFB-0B78F9D496AC}"/>
+                <a16:creationId xmlns:a16="http://schemas.microsoft.com/office/drawing/2014/main" id="{8B7FD5CB-296B-4C10-9CFB-0B78F9D496AC}"/>
               </a:ext>
             </a:extLst>
           </p:cNvPr>
@@ -7147,7 +7008,7 @@
           <p:cNvPr id="13" name="Picture 12">
             <a:extLst>
               <a:ext uri="{FF2B5EF4-FFF2-40B4-BE49-F238E27FC236}">
-                <a16:creationId xmlns:a16="http://schemas.microsoft.com/office/drawing/2014/main" xmlns="" id="{C7B5BF98-9B33-4E7B-9AAF-5FE3D8AA6B68}"/>
+                <a16:creationId xmlns:a16="http://schemas.microsoft.com/office/drawing/2014/main" id="{C7B5BF98-9B33-4E7B-9AAF-5FE3D8AA6B68}"/>
               </a:ext>
             </a:extLst>
           </p:cNvPr>
@@ -7183,7 +7044,7 @@
           <p:cNvPr id="15" name="Picture 14" descr="A screenshot of a cell phone&#10;&#10;Description generated with very high confidence">
             <a:extLst>
               <a:ext uri="{FF2B5EF4-FFF2-40B4-BE49-F238E27FC236}">
-                <a16:creationId xmlns:a16="http://schemas.microsoft.com/office/drawing/2014/main" xmlns="" id="{65C5D60E-28F2-4DA9-9547-747FD23EEA18}"/>
+                <a16:creationId xmlns:a16="http://schemas.microsoft.com/office/drawing/2014/main" id="{65C5D60E-28F2-4DA9-9547-747FD23EEA18}"/>
               </a:ext>
             </a:extLst>
           </p:cNvPr>
@@ -7224,13 +7085,6 @@
   <p:clrMapOvr>
     <a:masterClrMapping/>
   </p:clrMapOvr>
-  <p:timing>
-    <p:tnLst>
-      <p:par>
-        <p:cTn id="1" dur="indefinite" restart="never" nodeType="tmRoot"/>
-      </p:par>
-    </p:tnLst>
-  </p:timing>
 </p:sld>
 </file>
 
@@ -7256,7 +7110,7 @@
           <p:cNvPr id="2" name="Title 1">
             <a:extLst>
               <a:ext uri="{FF2B5EF4-FFF2-40B4-BE49-F238E27FC236}">
-                <a16:creationId xmlns:a16="http://schemas.microsoft.com/office/drawing/2014/main" xmlns="" id="{5ACC0826-E80F-43C0-912C-275EB710142B}"/>
+                <a16:creationId xmlns:a16="http://schemas.microsoft.com/office/drawing/2014/main" id="{5ACC0826-E80F-43C0-912C-275EB710142B}"/>
               </a:ext>
             </a:extLst>
           </p:cNvPr>
@@ -7285,7 +7139,7 @@
           <p:cNvPr id="4" name="Chỗ dành sẵn cho Nội dung 3">
             <a:extLst>
               <a:ext uri="{FF2B5EF4-FFF2-40B4-BE49-F238E27FC236}">
-                <a16:creationId xmlns:a16="http://schemas.microsoft.com/office/drawing/2014/main" xmlns="" id="{E7382999-E9BD-45F8-97D5-A50B26B12803}"/>
+                <a16:creationId xmlns:a16="http://schemas.microsoft.com/office/drawing/2014/main" id="{E7382999-E9BD-45F8-97D5-A50B26B12803}"/>
               </a:ext>
             </a:extLst>
           </p:cNvPr>
@@ -7450,13 +7304,29 @@
           <a:p>
             <a:pPr lvl="1"/>
             <a:r>
-              <a:rPr lang="en-US" dirty="0">
-                <a:solidFill>
-                  <a:schemeClr val="tx1"/>
-                </a:solidFill>
-              </a:rPr>
-              <a:t>compileArguments2</a:t>
-            </a:r>
+              <a:rPr lang="en-US">
+                <a:solidFill>
+                  <a:schemeClr val="tx1"/>
+                </a:solidFill>
+              </a:rPr>
+              <a:t>compileFuncParams</a:t>
+            </a:r>
+          </a:p>
+          <a:p>
+            <a:pPr lvl="1"/>
+            <a:r>
+              <a:rPr lang="en-US">
+                <a:solidFill>
+                  <a:schemeClr val="tx1"/>
+                </a:solidFill>
+              </a:rPr>
+              <a:t>compileProcParams</a:t>
+            </a:r>
+            <a:endParaRPr lang="en-US" dirty="0">
+              <a:solidFill>
+                <a:schemeClr val="tx1"/>
+              </a:solidFill>
+            </a:endParaRPr>
           </a:p>
           <a:p>
             <a:pPr marL="342900" lvl="1" indent="0">
@@ -8447,7 +8317,7 @@
           <p:cNvPr id="3" name="Table 2">
             <a:extLst>
               <a:ext uri="{FF2B5EF4-FFF2-40B4-BE49-F238E27FC236}">
-                <a16:creationId xmlns:a16="http://schemas.microsoft.com/office/drawing/2014/main" xmlns="" id="{83153595-19DE-48AA-8ADD-EFE622709FF7}"/>
+                <a16:creationId xmlns:a16="http://schemas.microsoft.com/office/drawing/2014/main" id="{83153595-19DE-48AA-8ADD-EFE622709FF7}"/>
               </a:ext>
             </a:extLst>
           </p:cNvPr>
@@ -8455,12 +8325,16 @@
             <a:graphicFrameLocks noGrp="1"/>
           </p:cNvGraphicFramePr>
           <p:nvPr>
-            <p:extLst/>
+            <p:extLst>
+              <p:ext uri="{D42A27DB-BD31-4B8C-83A1-F6EECF244321}">
+                <p14:modId xmlns:p14="http://schemas.microsoft.com/office/powerpoint/2010/main" val="3302122358"/>
+              </p:ext>
+            </p:extLst>
           </p:nvPr>
         </p:nvGraphicFramePr>
         <p:xfrm>
           <a:off x="4367814" y="1346200"/>
-          <a:ext cx="4083728" cy="2248810"/>
+          <a:ext cx="4083728" cy="2369910"/>
         </p:xfrm>
         <a:graphic>
           <a:graphicData uri="http://schemas.openxmlformats.org/drawingml/2006/table">
@@ -8472,14 +8346,14 @@
                 <a:gridCol w="2041864">
                   <a:extLst>
                     <a:ext uri="{9D8B030D-6E8A-4147-A177-3AD203B41FA5}">
-                      <a16:colId xmlns:a16="http://schemas.microsoft.com/office/drawing/2014/main" xmlns="" val="837531061"/>
+                      <a16:colId xmlns:a16="http://schemas.microsoft.com/office/drawing/2014/main" val="837531061"/>
                     </a:ext>
                   </a:extLst>
                 </a:gridCol>
                 <a:gridCol w="2041864">
                   <a:extLst>
                     <a:ext uri="{9D8B030D-6E8A-4147-A177-3AD203B41FA5}">
-                      <a16:colId xmlns:a16="http://schemas.microsoft.com/office/drawing/2014/main" xmlns="" val="699040959"/>
+                      <a16:colId xmlns:a16="http://schemas.microsoft.com/office/drawing/2014/main" val="699040959"/>
                     </a:ext>
                   </a:extLst>
                 </a:gridCol>
@@ -8551,7 +8425,7 @@
                 </a:tc>
                 <a:extLst>
                   <a:ext uri="{0D108BD9-81ED-4DB2-BD59-A6C34878D82A}">
-                    <a16:rowId xmlns:a16="http://schemas.microsoft.com/office/drawing/2014/main" xmlns="" val="245940028"/>
+                    <a16:rowId xmlns:a16="http://schemas.microsoft.com/office/drawing/2014/main" val="245940028"/>
                   </a:ext>
                 </a:extLst>
               </a:tr>
@@ -8622,7 +8496,7 @@
                 </a:tc>
                 <a:extLst>
                   <a:ext uri="{0D108BD9-81ED-4DB2-BD59-A6C34878D82A}">
-                    <a16:rowId xmlns:a16="http://schemas.microsoft.com/office/drawing/2014/main" xmlns="" val="1713444634"/>
+                    <a16:rowId xmlns:a16="http://schemas.microsoft.com/office/drawing/2014/main" val="1713444634"/>
                   </a:ext>
                 </a:extLst>
               </a:tr>
@@ -8693,7 +8567,7 @@
                 </a:tc>
                 <a:extLst>
                   <a:ext uri="{0D108BD9-81ED-4DB2-BD59-A6C34878D82A}">
-                    <a16:rowId xmlns:a16="http://schemas.microsoft.com/office/drawing/2014/main" xmlns="" val="3577871903"/>
+                    <a16:rowId xmlns:a16="http://schemas.microsoft.com/office/drawing/2014/main" val="3577871903"/>
                   </a:ext>
                 </a:extLst>
               </a:tr>
@@ -8764,7 +8638,7 @@
                 </a:tc>
                 <a:extLst>
                   <a:ext uri="{0D108BD9-81ED-4DB2-BD59-A6C34878D82A}">
-                    <a16:rowId xmlns:a16="http://schemas.microsoft.com/office/drawing/2014/main" xmlns="" val="2577431294"/>
+                    <a16:rowId xmlns:a16="http://schemas.microsoft.com/office/drawing/2014/main" val="2577431294"/>
                   </a:ext>
                 </a:extLst>
               </a:tr>
@@ -8835,7 +8709,7 @@
                 </a:tc>
                 <a:extLst>
                   <a:ext uri="{0D108BD9-81ED-4DB2-BD59-A6C34878D82A}">
-                    <a16:rowId xmlns:a16="http://schemas.microsoft.com/office/drawing/2014/main" xmlns="" val="956168312"/>
+                    <a16:rowId xmlns:a16="http://schemas.microsoft.com/office/drawing/2014/main" val="956168312"/>
                   </a:ext>
                 </a:extLst>
               </a:tr>
@@ -8906,11 +8780,11 @@
                 </a:tc>
                 <a:extLst>
                   <a:ext uri="{0D108BD9-81ED-4DB2-BD59-A6C34878D82A}">
-                    <a16:rowId xmlns:a16="http://schemas.microsoft.com/office/drawing/2014/main" xmlns="" val="1849587814"/>
+                    <a16:rowId xmlns:a16="http://schemas.microsoft.com/office/drawing/2014/main" val="1849587814"/>
                   </a:ext>
                 </a:extLst>
               </a:tr>
-              <a:tr h="221800">
+              <a:tr h="110900">
                 <a:tc>
                   <a:txBody>
                     <a:bodyPr/>
@@ -8930,15 +8804,12 @@
                       <a:r>
                         <a:rPr lang="en-US" sz="1100">
                           <a:effectLst/>
+                          <a:latin typeface="Calibri" panose="020F0502020204030204" pitchFamily="34" charset="0"/>
+                          <a:ea typeface="Times New Roman" panose="02020603050405020304" pitchFamily="18" charset="0"/>
+                          <a:cs typeface="Times New Roman" panose="02020603050405020304" pitchFamily="18" charset="0"/>
                         </a:rPr>
-                        <a:t>Arguments2</a:t>
+                        <a:t>FuncParams</a:t>
                       </a:r>
-                      <a:endParaRPr lang="en-US" sz="1100">
-                        <a:effectLst/>
-                        <a:latin typeface="Calibri" panose="020F0502020204030204" pitchFamily="34" charset="0"/>
-                        <a:ea typeface="Times New Roman" panose="02020603050405020304" pitchFamily="18" charset="0"/>
-                        <a:cs typeface="Times New Roman" panose="02020603050405020304" pitchFamily="18" charset="0"/>
-                      </a:endParaRPr>
                     </a:p>
                   </a:txBody>
                   <a:tcPr marL="68580" marR="68580" marT="0" marB="0"/>
@@ -8960,24 +8831,86 @@
                         </a:spcAft>
                       </a:pPr>
                       <a:r>
-                        <a:rPr lang="en-US" sz="1100" dirty="0">
+                        <a:rPr lang="en-US" sz="1100">
                           <a:effectLst/>
+                          <a:latin typeface="Calibri" panose="020F0502020204030204" pitchFamily="34" charset="0"/>
+                          <a:ea typeface="Times New Roman" panose="02020603050405020304" pitchFamily="18" charset="0"/>
+                          <a:cs typeface="Times New Roman" panose="02020603050405020304" pitchFamily="18" charset="0"/>
                         </a:rPr>
-                        <a:t>)</a:t>
+                        <a:t>:</a:t>
                       </a:r>
-                      <a:endParaRPr lang="en-US" sz="1100" dirty="0">
-                        <a:effectLst/>
-                        <a:latin typeface="Calibri" panose="020F0502020204030204" pitchFamily="34" charset="0"/>
-                        <a:ea typeface="Times New Roman" panose="02020603050405020304" pitchFamily="18" charset="0"/>
-                        <a:cs typeface="Times New Roman" panose="02020603050405020304" pitchFamily="18" charset="0"/>
-                      </a:endParaRPr>
                     </a:p>
                   </a:txBody>
                   <a:tcPr marL="68580" marR="68580" marT="0" marB="0"/>
                 </a:tc>
                 <a:extLst>
                   <a:ext uri="{0D108BD9-81ED-4DB2-BD59-A6C34878D82A}">
-                    <a16:rowId xmlns:a16="http://schemas.microsoft.com/office/drawing/2014/main" xmlns="" val="697537971"/>
+                    <a16:rowId xmlns:a16="http://schemas.microsoft.com/office/drawing/2014/main" val="697537971"/>
+                  </a:ext>
+                </a:extLst>
+              </a:tr>
+              <a:tr h="0">
+                <a:tc>
+                  <a:txBody>
+                    <a:bodyPr/>
+                    <a:lstStyle/>
+                    <a:p>
+                      <a:pPr marL="0" marR="0">
+                        <a:lnSpc>
+                          <a:spcPct val="107000"/>
+                        </a:lnSpc>
+                        <a:spcBef>
+                          <a:spcPts val="0"/>
+                        </a:spcBef>
+                        <a:spcAft>
+                          <a:spcPts val="0"/>
+                        </a:spcAft>
+                      </a:pPr>
+                      <a:r>
+                        <a:rPr lang="en-US" sz="1100">
+                          <a:effectLst/>
+                          <a:latin typeface="Calibri" panose="020F0502020204030204" pitchFamily="34" charset="0"/>
+                          <a:ea typeface="Times New Roman" panose="02020603050405020304" pitchFamily="18" charset="0"/>
+                          <a:cs typeface="Times New Roman" panose="02020603050405020304" pitchFamily="18" charset="0"/>
+                        </a:rPr>
+                        <a:t>ProcParams</a:t>
+                      </a:r>
+                    </a:p>
+                  </a:txBody>
+                  <a:tcPr marL="68580" marR="68580" marT="0" marB="0"/>
+                </a:tc>
+                <a:tc>
+                  <a:txBody>
+                    <a:bodyPr/>
+                    <a:lstStyle/>
+                    <a:p>
+                      <a:pPr marL="0" marR="0">
+                        <a:lnSpc>
+                          <a:spcPct val="107000"/>
+                        </a:lnSpc>
+                        <a:spcBef>
+                          <a:spcPts val="0"/>
+                        </a:spcBef>
+                        <a:spcAft>
+                          <a:spcPts val="0"/>
+                        </a:spcAft>
+                      </a:pPr>
+                      <a:r>
+                        <a:rPr lang="en-US" sz="1100">
+                          <a:effectLst/>
+                          <a:latin typeface="Calibri" panose="020F0502020204030204" pitchFamily="34" charset="0"/>
+                          <a:ea typeface="Times New Roman" panose="02020603050405020304" pitchFamily="18" charset="0"/>
+                          <a:cs typeface="Times New Roman" panose="02020603050405020304" pitchFamily="18" charset="0"/>
+                        </a:rPr>
+                        <a:t>;</a:t>
+                      </a:r>
+                    </a:p>
+                  </a:txBody>
+                  <a:tcPr marL="68580" marR="68580" marT="0" marB="0"/>
+                </a:tc>
+                <a:extLst>
+                  <a:ext uri="{0D108BD9-81ED-4DB2-BD59-A6C34878D82A}">
+                    <a16:rowId xmlns:a16="http://schemas.microsoft.com/office/drawing/2014/main" val="1868920723"/>
                   </a:ext>
                 </a:extLst>
               </a:tr>
@@ -8995,13 +8928,6 @@
   <p:clrMapOvr>
     <a:masterClrMapping/>
   </p:clrMapOvr>
-  <p:timing>
-    <p:tnLst>
-      <p:par>
-        <p:cTn id="1" dur="indefinite" restart="never" nodeType="tmRoot"/>
-      </p:par>
-    </p:tnLst>
-  </p:timing>
 </p:sld>
 </file>
 
@@ -9027,7 +8953,7 @@
           <p:cNvPr id="2" name="Title 1">
             <a:extLst>
               <a:ext uri="{FF2B5EF4-FFF2-40B4-BE49-F238E27FC236}">
-                <a16:creationId xmlns:a16="http://schemas.microsoft.com/office/drawing/2014/main" xmlns="" id="{096466C5-78E1-4B38-97CC-2B30997F8BA4}"/>
+                <a16:creationId xmlns:a16="http://schemas.microsoft.com/office/drawing/2014/main" id="{096466C5-78E1-4B38-97CC-2B30997F8BA4}"/>
               </a:ext>
             </a:extLst>
           </p:cNvPr>
@@ -9084,7 +9010,7 @@
           <p:cNvPr id="5" name="Content Placeholder 4" descr="A screenshot of a cell phone&#10;&#10;Description generated with very high confidence">
             <a:extLst>
               <a:ext uri="{FF2B5EF4-FFF2-40B4-BE49-F238E27FC236}">
-                <a16:creationId xmlns:a16="http://schemas.microsoft.com/office/drawing/2014/main" xmlns="" id="{9955B5BA-68E3-4722-BF13-75CB62B4E611}"/>
+                <a16:creationId xmlns:a16="http://schemas.microsoft.com/office/drawing/2014/main" id="{9955B5BA-68E3-4722-BF13-75CB62B4E611}"/>
               </a:ext>
             </a:extLst>
           </p:cNvPr>
@@ -9119,7 +9045,7 @@
           <p:cNvPr id="7" name="Picture 6" descr="A close up of a sign&#10;&#10;Description generated with high confidence">
             <a:extLst>
               <a:ext uri="{FF2B5EF4-FFF2-40B4-BE49-F238E27FC236}">
-                <a16:creationId xmlns:a16="http://schemas.microsoft.com/office/drawing/2014/main" xmlns="" id="{B53B1F60-9ABB-4034-AE96-CFBA175DF1B5}"/>
+                <a16:creationId xmlns:a16="http://schemas.microsoft.com/office/drawing/2014/main" id="{B53B1F60-9ABB-4034-AE96-CFBA175DF1B5}"/>
               </a:ext>
             </a:extLst>
           </p:cNvPr>
@@ -9155,7 +9081,7 @@
           <p:cNvPr id="9" name="Picture 8" descr="A picture containing object, clock&#10;&#10;Description generated with high confidence">
             <a:extLst>
               <a:ext uri="{FF2B5EF4-FFF2-40B4-BE49-F238E27FC236}">
-                <a16:creationId xmlns:a16="http://schemas.microsoft.com/office/drawing/2014/main" xmlns="" id="{768A2B25-C45E-4A08-BCFF-C427E184772C}"/>
+                <a16:creationId xmlns:a16="http://schemas.microsoft.com/office/drawing/2014/main" id="{768A2B25-C45E-4A08-BCFF-C427E184772C}"/>
               </a:ext>
             </a:extLst>
           </p:cNvPr>
@@ -9191,7 +9117,7 @@
           <p:cNvPr id="11" name="Rectangle 10">
             <a:extLst>
               <a:ext uri="{FF2B5EF4-FFF2-40B4-BE49-F238E27FC236}">
-                <a16:creationId xmlns:a16="http://schemas.microsoft.com/office/drawing/2014/main" xmlns="" id="{8502CCD0-86C6-47E6-88F6-02A330746E9A}"/>
+                <a16:creationId xmlns:a16="http://schemas.microsoft.com/office/drawing/2014/main" id="{8502CCD0-86C6-47E6-88F6-02A330746E9A}"/>
               </a:ext>
             </a:extLst>
           </p:cNvPr>
@@ -9238,7 +9164,7 @@
           <p:cNvPr id="12" name="TextBox 11">
             <a:extLst>
               <a:ext uri="{FF2B5EF4-FFF2-40B4-BE49-F238E27FC236}">
-                <a16:creationId xmlns:a16="http://schemas.microsoft.com/office/drawing/2014/main" xmlns="" id="{7230174B-F02A-4D03-AD35-A47408E0D820}"/>
+                <a16:creationId xmlns:a16="http://schemas.microsoft.com/office/drawing/2014/main" id="{7230174B-F02A-4D03-AD35-A47408E0D820}"/>
               </a:ext>
             </a:extLst>
           </p:cNvPr>
@@ -9278,13 +9204,6 @@
   <p:clrMapOvr>
     <a:masterClrMapping/>
   </p:clrMapOvr>
-  <p:timing>
-    <p:tnLst>
-      <p:par>
-        <p:cTn id="1" dur="indefinite" restart="never" nodeType="tmRoot"/>
-      </p:par>
-    </p:tnLst>
-  </p:timing>
 </p:sld>
 </file>
 
@@ -9310,7 +9229,7 @@
           <p:cNvPr id="2" name="Hình chữ nhật 1">
             <a:extLst>
               <a:ext uri="{FF2B5EF4-FFF2-40B4-BE49-F238E27FC236}">
-                <a16:creationId xmlns:a16="http://schemas.microsoft.com/office/drawing/2014/main" xmlns="" id="{9248F4B9-394E-4451-A00C-ABE41F8BE311}"/>
+                <a16:creationId xmlns:a16="http://schemas.microsoft.com/office/drawing/2014/main" id="{9248F4B9-394E-4451-A00C-ABE41F8BE311}"/>
               </a:ext>
             </a:extLst>
           </p:cNvPr>
@@ -9390,13 +9309,6 @@
   <p:clrMapOvr>
     <a:masterClrMapping/>
   </p:clrMapOvr>
-  <p:timing>
-    <p:tnLst>
-      <p:par>
-        <p:cTn id="1" dur="indefinite" restart="never" nodeType="tmRoot"/>
-      </p:par>
-    </p:tnLst>
-  </p:timing>
 </p:sld>
 </file>
 
@@ -9422,7 +9334,7 @@
           <p:cNvPr id="2" name="Title 1">
             <a:extLst>
               <a:ext uri="{FF2B5EF4-FFF2-40B4-BE49-F238E27FC236}">
-                <a16:creationId xmlns:a16="http://schemas.microsoft.com/office/drawing/2014/main" xmlns="" id="{6CC34750-5D5C-4AA5-8662-B88DDDAEA223}"/>
+                <a16:creationId xmlns:a16="http://schemas.microsoft.com/office/drawing/2014/main" id="{6CC34750-5D5C-4AA5-8662-B88DDDAEA223}"/>
               </a:ext>
             </a:extLst>
           </p:cNvPr>
@@ -9451,7 +9363,7 @@
           <p:cNvPr id="5" name="Chỗ dành sẵn cho Nội dung 4">
             <a:extLst>
               <a:ext uri="{FF2B5EF4-FFF2-40B4-BE49-F238E27FC236}">
-                <a16:creationId xmlns:a16="http://schemas.microsoft.com/office/drawing/2014/main" xmlns="" id="{9B065BF1-7217-45FB-8679-2195603A8F4B}"/>
+                <a16:creationId xmlns:a16="http://schemas.microsoft.com/office/drawing/2014/main" id="{9B065BF1-7217-45FB-8679-2195603A8F4B}"/>
               </a:ext>
             </a:extLst>
           </p:cNvPr>
@@ -9505,13 +9417,6 @@
   <p:clrMapOvr>
     <a:masterClrMapping/>
   </p:clrMapOvr>
-  <p:timing>
-    <p:tnLst>
-      <p:par>
-        <p:cTn id="1" dur="indefinite" restart="never" nodeType="tmRoot"/>
-      </p:par>
-    </p:tnLst>
-  </p:timing>
 </p:sld>
 </file>
 
@@ -9537,7 +9442,7 @@
           <p:cNvPr id="2" name="Title 1">
             <a:extLst>
               <a:ext uri="{FF2B5EF4-FFF2-40B4-BE49-F238E27FC236}">
-                <a16:creationId xmlns:a16="http://schemas.microsoft.com/office/drawing/2014/main" xmlns="" id="{FCE199B2-7CBE-486F-B43D-C4035353FFE3}"/>
+                <a16:creationId xmlns:a16="http://schemas.microsoft.com/office/drawing/2014/main" id="{FCE199B2-7CBE-486F-B43D-C4035353FFE3}"/>
               </a:ext>
             </a:extLst>
           </p:cNvPr>
@@ -9572,7 +9477,7 @@
           <p:cNvPr id="5" name="Chỗ dành sẵn cho Nội dung 4">
             <a:extLst>
               <a:ext uri="{FF2B5EF4-FFF2-40B4-BE49-F238E27FC236}">
-                <a16:creationId xmlns:a16="http://schemas.microsoft.com/office/drawing/2014/main" xmlns="" id="{99E51776-A2A8-4DFF-8E7C-596BB67DEA80}"/>
+                <a16:creationId xmlns:a16="http://schemas.microsoft.com/office/drawing/2014/main" id="{99E51776-A2A8-4DFF-8E7C-596BB67DEA80}"/>
               </a:ext>
             </a:extLst>
           </p:cNvPr>
@@ -9666,13 +9571,6 @@
   <p:clrMapOvr>
     <a:masterClrMapping/>
   </p:clrMapOvr>
-  <p:timing>
-    <p:tnLst>
-      <p:par>
-        <p:cTn id="1" dur="indefinite" restart="never" nodeType="tmRoot"/>
-      </p:par>
-    </p:tnLst>
-  </p:timing>
 </p:sld>
 </file>
 
@@ -9698,7 +9596,7 @@
           <p:cNvPr id="2" name="Title 1">
             <a:extLst>
               <a:ext uri="{FF2B5EF4-FFF2-40B4-BE49-F238E27FC236}">
-                <a16:creationId xmlns:a16="http://schemas.microsoft.com/office/drawing/2014/main" xmlns="" id="{8563C0C6-0797-4F66-9AFA-1A5F7C174F4A}"/>
+                <a16:creationId xmlns:a16="http://schemas.microsoft.com/office/drawing/2014/main" id="{8563C0C6-0797-4F66-9AFA-1A5F7C174F4A}"/>
               </a:ext>
             </a:extLst>
           </p:cNvPr>
@@ -9727,7 +9625,7 @@
           <p:cNvPr id="5" name="Chỗ dành sẵn cho Nội dung 4">
             <a:extLst>
               <a:ext uri="{FF2B5EF4-FFF2-40B4-BE49-F238E27FC236}">
-                <a16:creationId xmlns:a16="http://schemas.microsoft.com/office/drawing/2014/main" xmlns="" id="{5221640B-0E6B-4266-8F5C-6736558D2E09}"/>
+                <a16:creationId xmlns:a16="http://schemas.microsoft.com/office/drawing/2014/main" id="{5221640B-0E6B-4266-8F5C-6736558D2E09}"/>
               </a:ext>
             </a:extLst>
           </p:cNvPr>
@@ -9752,7 +9650,7 @@
           <p:cNvPr id="6" name="Table 7">
             <a:extLst>
               <a:ext uri="{FF2B5EF4-FFF2-40B4-BE49-F238E27FC236}">
-                <a16:creationId xmlns:a16="http://schemas.microsoft.com/office/drawing/2014/main" xmlns="" id="{A4F55DB9-708A-48E8-893A-99909658049E}"/>
+                <a16:creationId xmlns:a16="http://schemas.microsoft.com/office/drawing/2014/main" id="{A4F55DB9-708A-48E8-893A-99909658049E}"/>
               </a:ext>
             </a:extLst>
           </p:cNvPr>
@@ -9775,21 +9673,21 @@
                 <a:gridCol w="642937">
                   <a:extLst>
                     <a:ext uri="{9D8B030D-6E8A-4147-A177-3AD203B41FA5}">
-                      <a16:colId xmlns:a16="http://schemas.microsoft.com/office/drawing/2014/main" xmlns="" val="20000"/>
+                      <a16:colId xmlns:a16="http://schemas.microsoft.com/office/drawing/2014/main" val="20000"/>
                     </a:ext>
                   </a:extLst>
                 </a:gridCol>
                 <a:gridCol w="2214562">
                   <a:extLst>
                     <a:ext uri="{9D8B030D-6E8A-4147-A177-3AD203B41FA5}">
-                      <a16:colId xmlns:a16="http://schemas.microsoft.com/office/drawing/2014/main" xmlns="" val="20001"/>
+                      <a16:colId xmlns:a16="http://schemas.microsoft.com/office/drawing/2014/main" val="20001"/>
                     </a:ext>
                   </a:extLst>
                 </a:gridCol>
                 <a:gridCol w="4786313">
                   <a:extLst>
                     <a:ext uri="{9D8B030D-6E8A-4147-A177-3AD203B41FA5}">
-                      <a16:colId xmlns:a16="http://schemas.microsoft.com/office/drawing/2014/main" xmlns="" val="20002"/>
+                      <a16:colId xmlns:a16="http://schemas.microsoft.com/office/drawing/2014/main" val="20002"/>
                     </a:ext>
                   </a:extLst>
                 </a:gridCol>
@@ -9850,7 +9748,7 @@
                 </a:tc>
                 <a:extLst>
                   <a:ext uri="{0D108BD9-81ED-4DB2-BD59-A6C34878D82A}">
-                    <a16:rowId xmlns:a16="http://schemas.microsoft.com/office/drawing/2014/main" xmlns="" val="10000"/>
+                    <a16:rowId xmlns:a16="http://schemas.microsoft.com/office/drawing/2014/main" val="10000"/>
                   </a:ext>
                 </a:extLst>
               </a:tr>
@@ -9897,7 +9795,7 @@
                 </a:tc>
                 <a:extLst>
                   <a:ext uri="{0D108BD9-81ED-4DB2-BD59-A6C34878D82A}">
-                    <a16:rowId xmlns:a16="http://schemas.microsoft.com/office/drawing/2014/main" xmlns="" val="10001"/>
+                    <a16:rowId xmlns:a16="http://schemas.microsoft.com/office/drawing/2014/main" val="10001"/>
                   </a:ext>
                 </a:extLst>
               </a:tr>
@@ -9965,7 +9863,7 @@
                 </a:tc>
                 <a:extLst>
                   <a:ext uri="{0D108BD9-81ED-4DB2-BD59-A6C34878D82A}">
-                    <a16:rowId xmlns:a16="http://schemas.microsoft.com/office/drawing/2014/main" xmlns="" val="10002"/>
+                    <a16:rowId xmlns:a16="http://schemas.microsoft.com/office/drawing/2014/main" val="10002"/>
                   </a:ext>
                 </a:extLst>
               </a:tr>
@@ -10045,7 +9943,7 @@
                 </a:tc>
                 <a:extLst>
                   <a:ext uri="{0D108BD9-81ED-4DB2-BD59-A6C34878D82A}">
-                    <a16:rowId xmlns:a16="http://schemas.microsoft.com/office/drawing/2014/main" xmlns="" val="10003"/>
+                    <a16:rowId xmlns:a16="http://schemas.microsoft.com/office/drawing/2014/main" val="10003"/>
                   </a:ext>
                 </a:extLst>
               </a:tr>
@@ -10129,7 +10027,7 @@
                 </a:tc>
                 <a:extLst>
                   <a:ext uri="{0D108BD9-81ED-4DB2-BD59-A6C34878D82A}">
-                    <a16:rowId xmlns:a16="http://schemas.microsoft.com/office/drawing/2014/main" xmlns="" val="10004"/>
+                    <a16:rowId xmlns:a16="http://schemas.microsoft.com/office/drawing/2014/main" val="10004"/>
                   </a:ext>
                 </a:extLst>
               </a:tr>
@@ -10237,7 +10135,7 @@
                 </a:tc>
                 <a:extLst>
                   <a:ext uri="{0D108BD9-81ED-4DB2-BD59-A6C34878D82A}">
-                    <a16:rowId xmlns:a16="http://schemas.microsoft.com/office/drawing/2014/main" xmlns="" val="10005"/>
+                    <a16:rowId xmlns:a16="http://schemas.microsoft.com/office/drawing/2014/main" val="10005"/>
                   </a:ext>
                 </a:extLst>
               </a:tr>
@@ -10309,7 +10207,7 @@
                 </a:tc>
                 <a:extLst>
                   <a:ext uri="{0D108BD9-81ED-4DB2-BD59-A6C34878D82A}">
-                    <a16:rowId xmlns:a16="http://schemas.microsoft.com/office/drawing/2014/main" xmlns="" val="10006"/>
+                    <a16:rowId xmlns:a16="http://schemas.microsoft.com/office/drawing/2014/main" val="10006"/>
                   </a:ext>
                 </a:extLst>
               </a:tr>
@@ -10405,7 +10303,7 @@
                 </a:tc>
                 <a:extLst>
                   <a:ext uri="{0D108BD9-81ED-4DB2-BD59-A6C34878D82A}">
-                    <a16:rowId xmlns:a16="http://schemas.microsoft.com/office/drawing/2014/main" xmlns="" val="10007"/>
+                    <a16:rowId xmlns:a16="http://schemas.microsoft.com/office/drawing/2014/main" val="10007"/>
                   </a:ext>
                 </a:extLst>
               </a:tr>
@@ -10469,7 +10367,7 @@
                 </a:tc>
                 <a:extLst>
                   <a:ext uri="{0D108BD9-81ED-4DB2-BD59-A6C34878D82A}">
-                    <a16:rowId xmlns:a16="http://schemas.microsoft.com/office/drawing/2014/main" xmlns="" val="10008"/>
+                    <a16:rowId xmlns:a16="http://schemas.microsoft.com/office/drawing/2014/main" val="10008"/>
                   </a:ext>
                 </a:extLst>
               </a:tr>
@@ -10487,13 +10385,6 @@
   <p:clrMapOvr>
     <a:masterClrMapping/>
   </p:clrMapOvr>
-  <p:timing>
-    <p:tnLst>
-      <p:par>
-        <p:cTn id="1" dur="indefinite" restart="never" nodeType="tmRoot"/>
-      </p:par>
-    </p:tnLst>
-  </p:timing>
 </p:sld>
 </file>
 
@@ -10519,7 +10410,7 @@
           <p:cNvPr id="2" name="Title 1">
             <a:extLst>
               <a:ext uri="{FF2B5EF4-FFF2-40B4-BE49-F238E27FC236}">
-                <a16:creationId xmlns:a16="http://schemas.microsoft.com/office/drawing/2014/main" xmlns="" id="{5ACC0826-E80F-43C0-912C-275EB710142B}"/>
+                <a16:creationId xmlns:a16="http://schemas.microsoft.com/office/drawing/2014/main" id="{5ACC0826-E80F-43C0-912C-275EB710142B}"/>
               </a:ext>
             </a:extLst>
           </p:cNvPr>
@@ -10548,7 +10439,7 @@
           <p:cNvPr id="4" name="Chỗ dành sẵn cho Nội dung 3">
             <a:extLst>
               <a:ext uri="{FF2B5EF4-FFF2-40B4-BE49-F238E27FC236}">
-                <a16:creationId xmlns:a16="http://schemas.microsoft.com/office/drawing/2014/main" xmlns="" id="{E7382999-E9BD-45F8-97D5-A50B26B12803}"/>
+                <a16:creationId xmlns:a16="http://schemas.microsoft.com/office/drawing/2014/main" id="{E7382999-E9BD-45F8-97D5-A50B26B12803}"/>
               </a:ext>
             </a:extLst>
           </p:cNvPr>
@@ -10573,7 +10464,7 @@
           <p:cNvPr id="5" name="Picture 4">
             <a:extLst>
               <a:ext uri="{FF2B5EF4-FFF2-40B4-BE49-F238E27FC236}">
-                <a16:creationId xmlns:a16="http://schemas.microsoft.com/office/drawing/2014/main" xmlns="" id="{ABBF4BD0-B692-4128-B6AB-A03A37FA93BC}"/>
+                <a16:creationId xmlns:a16="http://schemas.microsoft.com/office/drawing/2014/main" id="{ABBF4BD0-B692-4128-B6AB-A03A37FA93BC}"/>
               </a:ext>
             </a:extLst>
           </p:cNvPr>
@@ -10633,7 +10524,7 @@
           <p:cNvPr id="6" name="Picture 5">
             <a:extLst>
               <a:ext uri="{FF2B5EF4-FFF2-40B4-BE49-F238E27FC236}">
-                <a16:creationId xmlns:a16="http://schemas.microsoft.com/office/drawing/2014/main" xmlns="" id="{48E33D2A-26BC-47F7-A001-9B9CE66B4350}"/>
+                <a16:creationId xmlns:a16="http://schemas.microsoft.com/office/drawing/2014/main" id="{48E33D2A-26BC-47F7-A001-9B9CE66B4350}"/>
               </a:ext>
             </a:extLst>
           </p:cNvPr>
@@ -10698,13 +10589,6 @@
   <p:clrMapOvr>
     <a:masterClrMapping/>
   </p:clrMapOvr>
-  <p:timing>
-    <p:tnLst>
-      <p:par>
-        <p:cTn id="1" dur="indefinite" restart="never" nodeType="tmRoot"/>
-      </p:par>
-    </p:tnLst>
-  </p:timing>
 </p:sld>
 </file>
 
@@ -10730,7 +10614,7 @@
           <p:cNvPr id="2" name="Title 1">
             <a:extLst>
               <a:ext uri="{FF2B5EF4-FFF2-40B4-BE49-F238E27FC236}">
-                <a16:creationId xmlns:a16="http://schemas.microsoft.com/office/drawing/2014/main" xmlns="" id="{5ACC0826-E80F-43C0-912C-275EB710142B}"/>
+                <a16:creationId xmlns:a16="http://schemas.microsoft.com/office/drawing/2014/main" id="{5ACC0826-E80F-43C0-912C-275EB710142B}"/>
               </a:ext>
             </a:extLst>
           </p:cNvPr>
@@ -10759,7 +10643,7 @@
           <p:cNvPr id="5" name="Content Placeholder 4">
             <a:extLst>
               <a:ext uri="{FF2B5EF4-FFF2-40B4-BE49-F238E27FC236}">
-                <a16:creationId xmlns:a16="http://schemas.microsoft.com/office/drawing/2014/main" xmlns="" id="{90CF760C-0EFC-4A07-B0AF-B3A02068800E}"/>
+                <a16:creationId xmlns:a16="http://schemas.microsoft.com/office/drawing/2014/main" id="{90CF760C-0EFC-4A07-B0AF-B3A02068800E}"/>
               </a:ext>
             </a:extLst>
           </p:cNvPr>
@@ -10826,13 +10710,6 @@
   <p:clrMapOvr>
     <a:masterClrMapping/>
   </p:clrMapOvr>
-  <p:timing>
-    <p:tnLst>
-      <p:par>
-        <p:cTn id="1" dur="indefinite" restart="never" nodeType="tmRoot"/>
-      </p:par>
-    </p:tnLst>
-  </p:timing>
 </p:sld>
 </file>
 
@@ -10858,7 +10735,7 @@
           <p:cNvPr id="2" name="Title 1">
             <a:extLst>
               <a:ext uri="{FF2B5EF4-FFF2-40B4-BE49-F238E27FC236}">
-                <a16:creationId xmlns:a16="http://schemas.microsoft.com/office/drawing/2014/main" xmlns="" id="{5ACC0826-E80F-43C0-912C-275EB710142B}"/>
+                <a16:creationId xmlns:a16="http://schemas.microsoft.com/office/drawing/2014/main" id="{5ACC0826-E80F-43C0-912C-275EB710142B}"/>
               </a:ext>
             </a:extLst>
           </p:cNvPr>
@@ -10887,7 +10764,7 @@
           <p:cNvPr id="5" name="Content Placeholder 4">
             <a:extLst>
               <a:ext uri="{FF2B5EF4-FFF2-40B4-BE49-F238E27FC236}">
-                <a16:creationId xmlns:a16="http://schemas.microsoft.com/office/drawing/2014/main" xmlns="" id="{7AC94E8F-F2A0-4093-BCE4-F497CB9329E5}"/>
+                <a16:creationId xmlns:a16="http://schemas.microsoft.com/office/drawing/2014/main" id="{7AC94E8F-F2A0-4093-BCE4-F497CB9329E5}"/>
               </a:ext>
             </a:extLst>
           </p:cNvPr>
@@ -10954,13 +10831,6 @@
   <p:clrMapOvr>
     <a:masterClrMapping/>
   </p:clrMapOvr>
-  <p:timing>
-    <p:tnLst>
-      <p:par>
-        <p:cTn id="1" dur="indefinite" restart="never" nodeType="tmRoot"/>
-      </p:par>
-    </p:tnLst>
-  </p:timing>
 </p:sld>
 </file>
 
@@ -10986,7 +10856,7 @@
           <p:cNvPr id="2" name="Title 1">
             <a:extLst>
               <a:ext uri="{FF2B5EF4-FFF2-40B4-BE49-F238E27FC236}">
-                <a16:creationId xmlns:a16="http://schemas.microsoft.com/office/drawing/2014/main" xmlns="" id="{5ACC0826-E80F-43C0-912C-275EB710142B}"/>
+                <a16:creationId xmlns:a16="http://schemas.microsoft.com/office/drawing/2014/main" id="{5ACC0826-E80F-43C0-912C-275EB710142B}"/>
               </a:ext>
             </a:extLst>
           </p:cNvPr>
@@ -11015,7 +10885,7 @@
           <p:cNvPr id="6" name="Picture 4">
             <a:extLst>
               <a:ext uri="{FF2B5EF4-FFF2-40B4-BE49-F238E27FC236}">
-                <a16:creationId xmlns:a16="http://schemas.microsoft.com/office/drawing/2014/main" xmlns="" id="{32A01167-BC61-4189-A4B3-43DD3A1B0F07}"/>
+                <a16:creationId xmlns:a16="http://schemas.microsoft.com/office/drawing/2014/main" id="{32A01167-BC61-4189-A4B3-43DD3A1B0F07}"/>
               </a:ext>
             </a:extLst>
           </p:cNvPr>
@@ -11082,13 +10952,6 @@
   <p:clrMapOvr>
     <a:masterClrMapping/>
   </p:clrMapOvr>
-  <p:timing>
-    <p:tnLst>
-      <p:par>
-        <p:cTn id="1" dur="indefinite" restart="never" nodeType="tmRoot"/>
-      </p:par>
-    </p:tnLst>
-  </p:timing>
 </p:sld>
 </file>
 
@@ -11347,7 +11210,7 @@
   <a:extraClrSchemeLst/>
   <a:extLst>
     <a:ext uri="{05A4C25C-085E-4340-85A3-A5531E510DB2}">
-      <thm15:themeFamily xmlns:thm15="http://schemas.microsoft.com/office/thememl/2012/main" xmlns="" name="Presentation1" id="{7A4D7F9D-CF2C-4E80-8360-F21AE36D35D4}" vid="{71563601-04E0-4A9A-AE8B-FC38A55497EE}"/>
+      <thm15:themeFamily xmlns:thm15="http://schemas.microsoft.com/office/thememl/2012/main" name="Presentation1" id="{7A4D7F9D-CF2C-4E80-8360-F21AE36D35D4}" vid="{71563601-04E0-4A9A-AE8B-FC38A55497EE}"/>
     </a:ext>
   </a:extLst>
 </a:theme>

</xml_diff>